<commit_message>
more detailed control of text parsing safe log added doc updated
</commit_message>
<xml_diff>
--- a/T1S Autoconfig - Tooling.pptx
+++ b/T1S Autoconfig - Tooling.pptx
@@ -5,10 +5,10 @@
     <p:sldMasterId id="2147483648" r:id="rId5"/>
   </p:sldMasterIdLst>
   <p:notesMasterIdLst>
-    <p:notesMasterId r:id="rId28"/>
+    <p:notesMasterId r:id="rId30"/>
   </p:notesMasterIdLst>
   <p:handoutMasterIdLst>
-    <p:handoutMasterId r:id="rId29"/>
+    <p:handoutMasterId r:id="rId31"/>
   </p:handoutMasterIdLst>
   <p:sldIdLst>
     <p:sldId id="1954" r:id="rId6"/>
@@ -28,11 +28,13 @@
     <p:sldId id="2015" r:id="rId20"/>
     <p:sldId id="2024" r:id="rId21"/>
     <p:sldId id="2016" r:id="rId22"/>
-    <p:sldId id="2019" r:id="rId23"/>
-    <p:sldId id="2006" r:id="rId24"/>
-    <p:sldId id="2007" r:id="rId25"/>
-    <p:sldId id="2017" r:id="rId26"/>
-    <p:sldId id="2018" r:id="rId27"/>
+    <p:sldId id="2025" r:id="rId23"/>
+    <p:sldId id="2026" r:id="rId24"/>
+    <p:sldId id="2019" r:id="rId25"/>
+    <p:sldId id="2006" r:id="rId26"/>
+    <p:sldId id="2007" r:id="rId27"/>
+    <p:sldId id="2017" r:id="rId28"/>
+    <p:sldId id="2018" r:id="rId29"/>
   </p:sldIdLst>
   <p:sldSz cx="12188825" cy="6858000"/>
   <p:notesSz cx="6858000" cy="9144000"/>
@@ -921,7 +923,7 @@
           <a:p>
             <a:fld id="{98615C2D-FB91-8740-95C2-23C11A10F2F2}" type="datetimeFigureOut">
               <a:rPr lang="en-US" smtClean="0"/>
-              <a:t>10/16/2023</a:t>
+              <a:t>10/26/2023</a:t>
             </a:fld>
             <a:endParaRPr lang="en-US"/>
           </a:p>
@@ -1099,7 +1101,7 @@
           <a:p>
             <a:fld id="{F154E49F-5C3A-ED4E-A68A-CCB3AA3B5D59}" type="datetimeFigureOut">
               <a:rPr lang="en-US" smtClean="0"/>
-              <a:t>10/16/2023</a:t>
+              <a:t>10/26/2023</a:t>
             </a:fld>
             <a:endParaRPr lang="en-US"/>
           </a:p>
@@ -8439,6 +8441,665 @@
 </file>
 
 <file path=ppt/slides/slide18.xml><?xml version="1.0" encoding="utf-8"?>
+<p:sld xmlns:a="http://schemas.openxmlformats.org/drawingml/2006/main" xmlns:r="http://schemas.openxmlformats.org/officeDocument/2006/relationships" xmlns:p="http://schemas.openxmlformats.org/presentationml/2006/main">
+  <p:cSld>
+    <p:spTree>
+      <p:nvGrpSpPr>
+        <p:cNvPr id="1" name=""/>
+        <p:cNvGrpSpPr/>
+        <p:nvPr/>
+      </p:nvGrpSpPr>
+      <p:grpSpPr>
+        <a:xfrm>
+          <a:off x="0" y="0"/>
+          <a:ext cx="0" cy="0"/>
+          <a:chOff x="0" y="0"/>
+          <a:chExt cx="0" cy="0"/>
+        </a:xfrm>
+      </p:grpSpPr>
+      <p:sp>
+        <p:nvSpPr>
+          <p:cNvPr id="2" name="Title 1">
+            <a:extLst>
+              <a:ext uri="{FF2B5EF4-FFF2-40B4-BE49-F238E27FC236}">
+                <a16:creationId xmlns:a16="http://schemas.microsoft.com/office/drawing/2014/main" id="{0644FA54-3F5A-30E3-4868-7D48857C347E}"/>
+              </a:ext>
+            </a:extLst>
+          </p:cNvPr>
+          <p:cNvSpPr>
+            <a:spLocks noGrp="1"/>
+          </p:cNvSpPr>
+          <p:nvPr>
+            <p:ph type="title"/>
+          </p:nvPr>
+        </p:nvSpPr>
+        <p:spPr/>
+        <p:txBody>
+          <a:bodyPr/>
+          <a:lstStyle/>
+          <a:p>
+            <a:r>
+              <a:rPr lang="de-DE" dirty="0"/>
+              <a:t>Python Modules Dependencies „terminal.pyw“</a:t>
+            </a:r>
+          </a:p>
+        </p:txBody>
+      </p:sp>
+      <p:sp>
+        <p:nvSpPr>
+          <p:cNvPr id="3" name="Content Placeholder 2">
+            <a:extLst>
+              <a:ext uri="{FF2B5EF4-FFF2-40B4-BE49-F238E27FC236}">
+                <a16:creationId xmlns:a16="http://schemas.microsoft.com/office/drawing/2014/main" id="{69B0A739-0D8D-293F-CA27-09C5DE877038}"/>
+              </a:ext>
+            </a:extLst>
+          </p:cNvPr>
+          <p:cNvSpPr>
+            <a:spLocks noGrp="1"/>
+          </p:cNvSpPr>
+          <p:nvPr>
+            <p:ph sz="quarter" idx="13"/>
+          </p:nvPr>
+        </p:nvSpPr>
+        <p:spPr/>
+        <p:txBody>
+          <a:bodyPr>
+            <a:normAutofit fontScale="85000" lnSpcReduction="10000"/>
+          </a:bodyPr>
+          <a:lstStyle/>
+          <a:p>
+            <a:pPr marL="0" indent="0">
+              <a:buNone/>
+            </a:pPr>
+            <a:endParaRPr lang="de-DE" dirty="0"/>
+          </a:p>
+          <a:p>
+            <a:pPr marL="0" indent="0">
+              <a:buNone/>
+            </a:pPr>
+            <a:r>
+              <a:rPr lang="de-DE" dirty="0"/>
+              <a:t>pip install pyserial</a:t>
+            </a:r>
+          </a:p>
+          <a:p>
+            <a:pPr marL="0" indent="0">
+              <a:buNone/>
+            </a:pPr>
+            <a:endParaRPr lang="de-DE" dirty="0"/>
+          </a:p>
+          <a:p>
+            <a:pPr marL="0" indent="0">
+              <a:buNone/>
+            </a:pPr>
+            <a:endParaRPr lang="de-DE" dirty="0"/>
+          </a:p>
+          <a:p>
+            <a:pPr marL="0" indent="0" algn="ctr">
+              <a:buNone/>
+            </a:pPr>
+            <a:endParaRPr lang="de-DE" dirty="0">
+              <a:hlinkClick r:id="rId2"/>
+            </a:endParaRPr>
+          </a:p>
+          <a:p>
+            <a:pPr marL="0" indent="0" algn="ctr">
+              <a:buNone/>
+            </a:pPr>
+            <a:endParaRPr lang="de-DE" dirty="0">
+              <a:hlinkClick r:id="rId2"/>
+            </a:endParaRPr>
+          </a:p>
+          <a:p>
+            <a:pPr marL="0" indent="0" algn="ctr">
+              <a:buNone/>
+            </a:pPr>
+            <a:endParaRPr lang="de-DE" dirty="0">
+              <a:hlinkClick r:id="rId2"/>
+            </a:endParaRPr>
+          </a:p>
+          <a:p>
+            <a:pPr marL="0" indent="0" algn="ctr">
+              <a:buNone/>
+            </a:pPr>
+            <a:r>
+              <a:rPr lang="de-DE" dirty="0">
+                <a:hlinkClick r:id="rId2"/>
+              </a:rPr>
+              <a:t>https://pythonhosted.org/pyserial/index.html</a:t>
+            </a:r>
+            <a:endParaRPr lang="de-DE" dirty="0"/>
+          </a:p>
+          <a:p>
+            <a:pPr marL="0" indent="0" algn="ctr">
+              <a:buNone/>
+            </a:pPr>
+            <a:endParaRPr lang="de-DE" dirty="0"/>
+          </a:p>
+          <a:p>
+            <a:pPr marL="0" indent="0" algn="ctr">
+              <a:buNone/>
+            </a:pPr>
+            <a:r>
+              <a:rPr lang="en-US" b="0" i="0" dirty="0">
+                <a:solidFill>
+                  <a:srgbClr val="000000"/>
+                </a:solidFill>
+                <a:effectLst/>
+                <a:latin typeface="Arial" panose="020B0604020202020204" pitchFamily="34" charset="0"/>
+              </a:rPr>
+              <a:t>This module encapsulates the access for the serial port. It provides backends for </a:t>
+            </a:r>
+            <a:r>
+              <a:rPr lang="en-US" b="0" i="0" u="none" strike="noStrike" dirty="0">
+                <a:solidFill>
+                  <a:srgbClr val="355F7C"/>
+                </a:solidFill>
+                <a:effectLst/>
+                <a:latin typeface="Arial" panose="020B0604020202020204" pitchFamily="34" charset="0"/>
+                <a:hlinkClick r:id="rId3"/>
+              </a:rPr>
+              <a:t>Python</a:t>
+            </a:r>
+            <a:r>
+              <a:rPr lang="en-US" b="0" i="0" dirty="0">
+                <a:solidFill>
+                  <a:srgbClr val="000000"/>
+                </a:solidFill>
+                <a:effectLst/>
+                <a:latin typeface="Arial" panose="020B0604020202020204" pitchFamily="34" charset="0"/>
+              </a:rPr>
+              <a:t> running on Windows, OSX, Linux, BSD (possibly any POSIX compliant system) and </a:t>
+            </a:r>
+            <a:r>
+              <a:rPr lang="en-US" b="0" i="0" dirty="0" err="1">
+                <a:solidFill>
+                  <a:srgbClr val="000000"/>
+                </a:solidFill>
+                <a:effectLst/>
+                <a:latin typeface="Arial" panose="020B0604020202020204" pitchFamily="34" charset="0"/>
+              </a:rPr>
+              <a:t>IronPython</a:t>
+            </a:r>
+            <a:r>
+              <a:rPr lang="en-US" b="0" i="0" dirty="0">
+                <a:solidFill>
+                  <a:srgbClr val="000000"/>
+                </a:solidFill>
+                <a:effectLst/>
+                <a:latin typeface="Arial" panose="020B0604020202020204" pitchFamily="34" charset="0"/>
+              </a:rPr>
+              <a:t>. The module named “serial” automatically selects the appropriate backend.</a:t>
+            </a:r>
+            <a:endParaRPr lang="de-DE" dirty="0"/>
+          </a:p>
+          <a:p>
+            <a:pPr marL="0" indent="0">
+              <a:buNone/>
+            </a:pPr>
+            <a:endParaRPr lang="de-DE" dirty="0"/>
+          </a:p>
+          <a:p>
+            <a:pPr marL="0" indent="0">
+              <a:buNone/>
+            </a:pPr>
+            <a:endParaRPr lang="de-DE" dirty="0"/>
+          </a:p>
+          <a:p>
+            <a:pPr marL="0" indent="0">
+              <a:buNone/>
+            </a:pPr>
+            <a:endParaRPr lang="de-DE" dirty="0"/>
+          </a:p>
+        </p:txBody>
+      </p:sp>
+      <p:pic>
+        <p:nvPicPr>
+          <p:cNvPr id="1028" name="Picture 4" descr="Logo">
+            <a:extLst>
+              <a:ext uri="{FF2B5EF4-FFF2-40B4-BE49-F238E27FC236}">
+                <a16:creationId xmlns:a16="http://schemas.microsoft.com/office/drawing/2014/main" id="{7BAE9EFE-8097-ED49-A397-6C935BE8A6B5}"/>
+              </a:ext>
+            </a:extLst>
+          </p:cNvPr>
+          <p:cNvPicPr>
+            <a:picLocks noChangeAspect="1" noChangeArrowheads="1"/>
+          </p:cNvPicPr>
+          <p:nvPr/>
+        </p:nvPicPr>
+        <p:blipFill>
+          <a:blip r:embed="rId4">
+            <a:extLst>
+              <a:ext uri="{28A0092B-C50C-407E-A947-70E740481C1C}">
+                <a14:useLocalDpi xmlns:a14="http://schemas.microsoft.com/office/drawing/2010/main" val="0"/>
+              </a:ext>
+            </a:extLst>
+          </a:blip>
+          <a:srcRect/>
+          <a:stretch>
+            <a:fillRect/>
+          </a:stretch>
+        </p:blipFill>
+        <p:spPr bwMode="auto">
+          <a:xfrm>
+            <a:off x="4962508" y="2362200"/>
+            <a:ext cx="1962150" cy="1066800"/>
+          </a:xfrm>
+          <a:prstGeom prst="rect">
+            <a:avLst/>
+          </a:prstGeom>
+          <a:noFill/>
+          <a:extLst>
+            <a:ext uri="{909E8E84-426E-40DD-AFC4-6F175D3DCCD1}">
+              <a14:hiddenFill xmlns:a14="http://schemas.microsoft.com/office/drawing/2010/main">
+                <a:solidFill>
+                  <a:srgbClr val="FFFFFF"/>
+                </a:solidFill>
+              </a14:hiddenFill>
+            </a:ext>
+          </a:extLst>
+        </p:spPr>
+      </p:pic>
+    </p:spTree>
+    <p:extLst>
+      <p:ext uri="{BB962C8B-B14F-4D97-AF65-F5344CB8AC3E}">
+        <p14:creationId xmlns:p14="http://schemas.microsoft.com/office/powerpoint/2010/main" val="1991260888"/>
+      </p:ext>
+    </p:extLst>
+  </p:cSld>
+  <p:clrMapOvr>
+    <a:masterClrMapping/>
+  </p:clrMapOvr>
+</p:sld>
+</file>
+
+<file path=ppt/slides/slide19.xml><?xml version="1.0" encoding="utf-8"?>
+<p:sld xmlns:a="http://schemas.openxmlformats.org/drawingml/2006/main" xmlns:r="http://schemas.openxmlformats.org/officeDocument/2006/relationships" xmlns:p="http://schemas.openxmlformats.org/presentationml/2006/main">
+  <p:cSld>
+    <p:spTree>
+      <p:nvGrpSpPr>
+        <p:cNvPr id="1" name=""/>
+        <p:cNvGrpSpPr/>
+        <p:nvPr/>
+      </p:nvGrpSpPr>
+      <p:grpSpPr>
+        <a:xfrm>
+          <a:off x="0" y="0"/>
+          <a:ext cx="0" cy="0"/>
+          <a:chOff x="0" y="0"/>
+          <a:chExt cx="0" cy="0"/>
+        </a:xfrm>
+      </p:grpSpPr>
+      <p:sp>
+        <p:nvSpPr>
+          <p:cNvPr id="2" name="Title 1">
+            <a:extLst>
+              <a:ext uri="{FF2B5EF4-FFF2-40B4-BE49-F238E27FC236}">
+                <a16:creationId xmlns:a16="http://schemas.microsoft.com/office/drawing/2014/main" id="{0644FA54-3F5A-30E3-4868-7D48857C347E}"/>
+              </a:ext>
+            </a:extLst>
+          </p:cNvPr>
+          <p:cNvSpPr>
+            <a:spLocks noGrp="1"/>
+          </p:cNvSpPr>
+          <p:nvPr>
+            <p:ph type="title"/>
+          </p:nvPr>
+        </p:nvSpPr>
+        <p:spPr/>
+        <p:txBody>
+          <a:bodyPr/>
+          <a:lstStyle/>
+          <a:p>
+            <a:r>
+              <a:rPr lang="de-DE" dirty="0"/>
+              <a:t>Python Modules Dependencies „terminal.pyw“</a:t>
+            </a:r>
+          </a:p>
+        </p:txBody>
+      </p:sp>
+      <p:sp>
+        <p:nvSpPr>
+          <p:cNvPr id="3" name="Content Placeholder 2">
+            <a:extLst>
+              <a:ext uri="{FF2B5EF4-FFF2-40B4-BE49-F238E27FC236}">
+                <a16:creationId xmlns:a16="http://schemas.microsoft.com/office/drawing/2014/main" id="{69B0A739-0D8D-293F-CA27-09C5DE877038}"/>
+              </a:ext>
+            </a:extLst>
+          </p:cNvPr>
+          <p:cNvSpPr>
+            <a:spLocks noGrp="1"/>
+          </p:cNvSpPr>
+          <p:nvPr>
+            <p:ph sz="quarter" idx="13"/>
+          </p:nvPr>
+        </p:nvSpPr>
+        <p:spPr/>
+        <p:txBody>
+          <a:bodyPr>
+            <a:normAutofit fontScale="92500" lnSpcReduction="20000"/>
+          </a:bodyPr>
+          <a:lstStyle/>
+          <a:p>
+            <a:pPr marL="0" indent="0">
+              <a:buNone/>
+            </a:pPr>
+            <a:endParaRPr lang="de-DE" dirty="0"/>
+          </a:p>
+          <a:p>
+            <a:pPr marL="0" indent="0">
+              <a:buNone/>
+            </a:pPr>
+            <a:r>
+              <a:rPr lang="de-DE" dirty="0"/>
+              <a:t>pip install matplotlib</a:t>
+            </a:r>
+          </a:p>
+          <a:p>
+            <a:pPr marL="0" indent="0">
+              <a:buNone/>
+            </a:pPr>
+            <a:endParaRPr lang="de-DE" dirty="0"/>
+          </a:p>
+          <a:p>
+            <a:pPr marL="0" indent="0">
+              <a:buNone/>
+            </a:pPr>
+            <a:endParaRPr lang="de-DE" dirty="0"/>
+          </a:p>
+          <a:p>
+            <a:pPr marL="0" indent="0" algn="ctr">
+              <a:buNone/>
+            </a:pPr>
+            <a:endParaRPr lang="de-DE" dirty="0">
+              <a:hlinkClick r:id="rId2"/>
+            </a:endParaRPr>
+          </a:p>
+          <a:p>
+            <a:pPr marL="0" indent="0" algn="ctr">
+              <a:buNone/>
+            </a:pPr>
+            <a:endParaRPr lang="de-DE" dirty="0">
+              <a:hlinkClick r:id="rId2"/>
+            </a:endParaRPr>
+          </a:p>
+          <a:p>
+            <a:pPr marL="0" indent="0" algn="ctr">
+              <a:buNone/>
+            </a:pPr>
+            <a:endParaRPr lang="de-DE" dirty="0">
+              <a:hlinkClick r:id="rId2"/>
+            </a:endParaRPr>
+          </a:p>
+          <a:p>
+            <a:pPr marL="0" indent="0" algn="ctr">
+              <a:buNone/>
+            </a:pPr>
+            <a:r>
+              <a:rPr lang="de-DE" dirty="0">
+                <a:hlinkClick r:id="rId3"/>
+              </a:rPr>
+              <a:t>https://matplotlib.org/</a:t>
+            </a:r>
+            <a:endParaRPr lang="de-DE" dirty="0"/>
+          </a:p>
+          <a:p>
+            <a:pPr marL="0" indent="0" algn="ctr">
+              <a:buNone/>
+            </a:pPr>
+            <a:endParaRPr lang="de-DE" dirty="0"/>
+          </a:p>
+          <a:p>
+            <a:pPr marL="0" indent="0" algn="ctr">
+              <a:buNone/>
+            </a:pPr>
+            <a:r>
+              <a:rPr lang="en-US" b="0" i="0" dirty="0">
+                <a:solidFill>
+                  <a:srgbClr val="333333"/>
+                </a:solidFill>
+                <a:effectLst/>
+                <a:latin typeface="-apple-system"/>
+              </a:rPr>
+              <a:t>Matplotlib is a comprehensive library for creating static, animated, and interactive visualizations in Python. Matplotlib makes easy things easy and hard things possible.</a:t>
+            </a:r>
+            <a:endParaRPr lang="de-DE" dirty="0"/>
+          </a:p>
+          <a:p>
+            <a:pPr marL="0" indent="0">
+              <a:buNone/>
+            </a:pPr>
+            <a:endParaRPr lang="de-DE" dirty="0"/>
+          </a:p>
+          <a:p>
+            <a:pPr marL="0" indent="0">
+              <a:buNone/>
+            </a:pPr>
+            <a:endParaRPr lang="de-DE" dirty="0"/>
+          </a:p>
+        </p:txBody>
+      </p:sp>
+      <p:pic>
+        <p:nvPicPr>
+          <p:cNvPr id="6" name="Picture 5">
+            <a:extLst>
+              <a:ext uri="{FF2B5EF4-FFF2-40B4-BE49-F238E27FC236}">
+                <a16:creationId xmlns:a16="http://schemas.microsoft.com/office/drawing/2014/main" id="{A8E591E4-9D25-4B47-D824-6257B123C6AD}"/>
+              </a:ext>
+            </a:extLst>
+          </p:cNvPr>
+          <p:cNvPicPr>
+            <a:picLocks noChangeAspect="1"/>
+          </p:cNvPicPr>
+          <p:nvPr/>
+        </p:nvPicPr>
+        <p:blipFill>
+          <a:blip r:embed="rId4"/>
+          <a:stretch>
+            <a:fillRect/>
+          </a:stretch>
+        </p:blipFill>
+        <p:spPr>
+          <a:xfrm>
+            <a:off x="4523668" y="2571099"/>
+            <a:ext cx="2607069" cy="641083"/>
+          </a:xfrm>
+          <a:prstGeom prst="rect">
+            <a:avLst/>
+          </a:prstGeom>
+        </p:spPr>
+      </p:pic>
+    </p:spTree>
+    <p:extLst>
+      <p:ext uri="{BB962C8B-B14F-4D97-AF65-F5344CB8AC3E}">
+        <p14:creationId xmlns:p14="http://schemas.microsoft.com/office/powerpoint/2010/main" val="1015774141"/>
+      </p:ext>
+    </p:extLst>
+  </p:cSld>
+  <p:clrMapOvr>
+    <a:masterClrMapping/>
+  </p:clrMapOvr>
+</p:sld>
+</file>
+
+<file path=ppt/slides/slide2.xml><?xml version="1.0" encoding="utf-8"?>
+<p:sld xmlns:a="http://schemas.openxmlformats.org/drawingml/2006/main" xmlns:r="http://schemas.openxmlformats.org/officeDocument/2006/relationships" xmlns:p="http://schemas.openxmlformats.org/presentationml/2006/main">
+  <p:cSld>
+    <p:spTree>
+      <p:nvGrpSpPr>
+        <p:cNvPr id="1" name=""/>
+        <p:cNvGrpSpPr/>
+        <p:nvPr/>
+      </p:nvGrpSpPr>
+      <p:grpSpPr>
+        <a:xfrm>
+          <a:off x="0" y="0"/>
+          <a:ext cx="0" cy="0"/>
+          <a:chOff x="0" y="0"/>
+          <a:chExt cx="0" cy="0"/>
+        </a:xfrm>
+      </p:grpSpPr>
+      <p:sp>
+        <p:nvSpPr>
+          <p:cNvPr id="2" name="Title 1">
+            <a:extLst>
+              <a:ext uri="{FF2B5EF4-FFF2-40B4-BE49-F238E27FC236}">
+                <a16:creationId xmlns:a16="http://schemas.microsoft.com/office/drawing/2014/main" id="{91BC8492-FF9E-12C9-233D-FC871B6AED16}"/>
+              </a:ext>
+            </a:extLst>
+          </p:cNvPr>
+          <p:cNvSpPr>
+            <a:spLocks noGrp="1"/>
+          </p:cNvSpPr>
+          <p:nvPr>
+            <p:ph type="title"/>
+          </p:nvPr>
+        </p:nvSpPr>
+        <p:spPr/>
+        <p:txBody>
+          <a:bodyPr/>
+          <a:lstStyle/>
+          <a:p>
+            <a:r>
+              <a:rPr lang="de-DE" dirty="0"/>
+              <a:t>Motivation</a:t>
+            </a:r>
+          </a:p>
+        </p:txBody>
+      </p:sp>
+      <p:sp>
+        <p:nvSpPr>
+          <p:cNvPr id="3" name="Content Placeholder 2">
+            <a:extLst>
+              <a:ext uri="{FF2B5EF4-FFF2-40B4-BE49-F238E27FC236}">
+                <a16:creationId xmlns:a16="http://schemas.microsoft.com/office/drawing/2014/main" id="{6940DDCE-05C4-D14D-09D8-5C700B0FB6B3}"/>
+              </a:ext>
+            </a:extLst>
+          </p:cNvPr>
+          <p:cNvSpPr>
+            <a:spLocks noGrp="1"/>
+          </p:cNvSpPr>
+          <p:nvPr>
+            <p:ph sz="quarter" idx="13"/>
+          </p:nvPr>
+        </p:nvSpPr>
+        <p:spPr/>
+        <p:txBody>
+          <a:bodyPr>
+            <a:normAutofit fontScale="70000" lnSpcReduction="20000"/>
+          </a:bodyPr>
+          <a:lstStyle/>
+          <a:p>
+            <a:r>
+              <a:rPr lang="de-DE" dirty="0"/>
+              <a:t>To give us ESE a learning curve in</a:t>
+            </a:r>
+          </a:p>
+          <a:p>
+            <a:pPr lvl="1"/>
+            <a:r>
+              <a:rPr lang="de-DE" dirty="0"/>
+              <a:t>T1S Technology</a:t>
+            </a:r>
+          </a:p>
+          <a:p>
+            <a:pPr lvl="1"/>
+            <a:r>
+              <a:rPr lang="de-DE" dirty="0"/>
+              <a:t>C and Pyhton Coding</a:t>
+            </a:r>
+          </a:p>
+          <a:p>
+            <a:pPr lvl="1"/>
+            <a:r>
+              <a:rPr lang="de-DE" dirty="0"/>
+              <a:t>Project Working</a:t>
+            </a:r>
+          </a:p>
+          <a:p>
+            <a:pPr lvl="1"/>
+            <a:r>
+              <a:rPr lang="de-DE" dirty="0"/>
+              <a:t>git and Github</a:t>
+            </a:r>
+          </a:p>
+          <a:p>
+            <a:pPr lvl="1"/>
+            <a:r>
+              <a:rPr lang="de-DE" dirty="0"/>
+              <a:t>MDB Core</a:t>
+            </a:r>
+          </a:p>
+          <a:p>
+            <a:pPr lvl="1"/>
+            <a:r>
+              <a:rPr lang="de-DE" dirty="0"/>
+              <a:t>Soft- and Hardware Testing</a:t>
+            </a:r>
+          </a:p>
+          <a:p>
+            <a:pPr lvl="1"/>
+            <a:endParaRPr lang="de-DE" dirty="0"/>
+          </a:p>
+          <a:p>
+            <a:r>
+              <a:rPr lang="en-US" dirty="0"/>
+              <a:t>This project is not about to create a Software Engineering Company within the Microchip Sales Organization. It is about to learn the processes, structures and vocabulary that our customer are dealing with</a:t>
+            </a:r>
+            <a:br>
+              <a:rPr lang="en-US" dirty="0"/>
+            </a:br>
+            <a:endParaRPr lang="en-US" dirty="0"/>
+          </a:p>
+          <a:p>
+            <a:r>
+              <a:rPr lang="de-DE" dirty="0"/>
+              <a:t>All items in the list above could be used in total different customer support processes</a:t>
+            </a:r>
+            <a:br>
+              <a:rPr lang="de-DE" dirty="0"/>
+            </a:br>
+            <a:endParaRPr lang="de-DE" dirty="0"/>
+          </a:p>
+          <a:p>
+            <a:r>
+              <a:rPr lang="de-DE"/>
+              <a:t>And maybe another result could be a </a:t>
+            </a:r>
+            <a:r>
+              <a:rPr lang="de-DE" dirty="0"/>
+              <a:t>proof of concept </a:t>
+            </a:r>
+            <a:r>
+              <a:rPr lang="de-DE"/>
+              <a:t>for customers </a:t>
+            </a:r>
+            <a:r>
+              <a:rPr lang="de-DE" dirty="0"/>
+              <a:t>in the </a:t>
+            </a:r>
+            <a:r>
+              <a:rPr lang="de-DE"/>
+              <a:t>industrial area for an T1S autoconfiguration scenario</a:t>
+            </a:r>
+            <a:endParaRPr lang="de-DE" dirty="0"/>
+          </a:p>
+        </p:txBody>
+      </p:sp>
+    </p:spTree>
+    <p:extLst>
+      <p:ext uri="{BB962C8B-B14F-4D97-AF65-F5344CB8AC3E}">
+        <p14:creationId xmlns:p14="http://schemas.microsoft.com/office/powerpoint/2010/main" val="2240505436"/>
+      </p:ext>
+    </p:extLst>
+  </p:cSld>
+  <p:clrMapOvr>
+    <a:masterClrMapping/>
+  </p:clrMapOvr>
+</p:sld>
+</file>
+
+<file path=ppt/slides/slide20.xml><?xml version="1.0" encoding="utf-8"?>
 <p:sld xmlns:a="http://schemas.openxmlformats.org/drawingml/2006/main" xmlns:r="http://schemas.openxmlformats.org/officeDocument/2006/relationships" xmlns:p="http://schemas.openxmlformats.org/presentationml/2006/main">
   <p:cSld>
     <p:spTree>
@@ -9917,7 +10578,7 @@
 </p:sld>
 </file>
 
-<file path=ppt/slides/slide19.xml><?xml version="1.0" encoding="utf-8"?>
+<file path=ppt/slides/slide21.xml><?xml version="1.0" encoding="utf-8"?>
 <p:sld xmlns:a="http://schemas.openxmlformats.org/drawingml/2006/main" xmlns:r="http://schemas.openxmlformats.org/officeDocument/2006/relationships" xmlns:p="http://schemas.openxmlformats.org/presentationml/2006/main">
   <p:cSld>
     <p:spTree>
@@ -10190,184 +10851,7 @@
 </p:sld>
 </file>
 
-<file path=ppt/slides/slide2.xml><?xml version="1.0" encoding="utf-8"?>
-<p:sld xmlns:a="http://schemas.openxmlformats.org/drawingml/2006/main" xmlns:r="http://schemas.openxmlformats.org/officeDocument/2006/relationships" xmlns:p="http://schemas.openxmlformats.org/presentationml/2006/main">
-  <p:cSld>
-    <p:spTree>
-      <p:nvGrpSpPr>
-        <p:cNvPr id="1" name=""/>
-        <p:cNvGrpSpPr/>
-        <p:nvPr/>
-      </p:nvGrpSpPr>
-      <p:grpSpPr>
-        <a:xfrm>
-          <a:off x="0" y="0"/>
-          <a:ext cx="0" cy="0"/>
-          <a:chOff x="0" y="0"/>
-          <a:chExt cx="0" cy="0"/>
-        </a:xfrm>
-      </p:grpSpPr>
-      <p:sp>
-        <p:nvSpPr>
-          <p:cNvPr id="2" name="Title 1">
-            <a:extLst>
-              <a:ext uri="{FF2B5EF4-FFF2-40B4-BE49-F238E27FC236}">
-                <a16:creationId xmlns:a16="http://schemas.microsoft.com/office/drawing/2014/main" id="{91BC8492-FF9E-12C9-233D-FC871B6AED16}"/>
-              </a:ext>
-            </a:extLst>
-          </p:cNvPr>
-          <p:cNvSpPr>
-            <a:spLocks noGrp="1"/>
-          </p:cNvSpPr>
-          <p:nvPr>
-            <p:ph type="title"/>
-          </p:nvPr>
-        </p:nvSpPr>
-        <p:spPr/>
-        <p:txBody>
-          <a:bodyPr/>
-          <a:lstStyle/>
-          <a:p>
-            <a:r>
-              <a:rPr lang="de-DE" dirty="0"/>
-              <a:t>Motivation</a:t>
-            </a:r>
-          </a:p>
-        </p:txBody>
-      </p:sp>
-      <p:sp>
-        <p:nvSpPr>
-          <p:cNvPr id="3" name="Content Placeholder 2">
-            <a:extLst>
-              <a:ext uri="{FF2B5EF4-FFF2-40B4-BE49-F238E27FC236}">
-                <a16:creationId xmlns:a16="http://schemas.microsoft.com/office/drawing/2014/main" id="{6940DDCE-05C4-D14D-09D8-5C700B0FB6B3}"/>
-              </a:ext>
-            </a:extLst>
-          </p:cNvPr>
-          <p:cNvSpPr>
-            <a:spLocks noGrp="1"/>
-          </p:cNvSpPr>
-          <p:nvPr>
-            <p:ph sz="quarter" idx="13"/>
-          </p:nvPr>
-        </p:nvSpPr>
-        <p:spPr/>
-        <p:txBody>
-          <a:bodyPr>
-            <a:normAutofit fontScale="70000" lnSpcReduction="20000"/>
-          </a:bodyPr>
-          <a:lstStyle/>
-          <a:p>
-            <a:r>
-              <a:rPr lang="de-DE" dirty="0"/>
-              <a:t>To give us ESE a learning curve in</a:t>
-            </a:r>
-          </a:p>
-          <a:p>
-            <a:pPr lvl="1"/>
-            <a:r>
-              <a:rPr lang="de-DE" dirty="0"/>
-              <a:t>T1S Technology</a:t>
-            </a:r>
-          </a:p>
-          <a:p>
-            <a:pPr lvl="1"/>
-            <a:r>
-              <a:rPr lang="de-DE" dirty="0"/>
-              <a:t>C and Pyhton Coding</a:t>
-            </a:r>
-          </a:p>
-          <a:p>
-            <a:pPr lvl="1"/>
-            <a:r>
-              <a:rPr lang="de-DE" dirty="0"/>
-              <a:t>Project Working</a:t>
-            </a:r>
-          </a:p>
-          <a:p>
-            <a:pPr lvl="1"/>
-            <a:r>
-              <a:rPr lang="de-DE" dirty="0"/>
-              <a:t>git and Github</a:t>
-            </a:r>
-          </a:p>
-          <a:p>
-            <a:pPr lvl="1"/>
-            <a:r>
-              <a:rPr lang="de-DE" dirty="0"/>
-              <a:t>MDB Core</a:t>
-            </a:r>
-          </a:p>
-          <a:p>
-            <a:pPr lvl="1"/>
-            <a:r>
-              <a:rPr lang="de-DE" dirty="0"/>
-              <a:t>Soft- and Hardware Testing</a:t>
-            </a:r>
-          </a:p>
-          <a:p>
-            <a:pPr lvl="1"/>
-            <a:endParaRPr lang="de-DE" dirty="0"/>
-          </a:p>
-          <a:p>
-            <a:r>
-              <a:rPr lang="en-US" dirty="0"/>
-              <a:t>This project is not about to create a Software Engineering Company within the Microchip Sales Organization. It is about to learn the processes, structures and vocabulary that our customer are dealing with</a:t>
-            </a:r>
-            <a:br>
-              <a:rPr lang="en-US" dirty="0"/>
-            </a:br>
-            <a:endParaRPr lang="en-US" dirty="0"/>
-          </a:p>
-          <a:p>
-            <a:r>
-              <a:rPr lang="de-DE" dirty="0"/>
-              <a:t>All items in the list above could be used in total different customer support processes</a:t>
-            </a:r>
-            <a:br>
-              <a:rPr lang="de-DE" dirty="0"/>
-            </a:br>
-            <a:endParaRPr lang="de-DE" dirty="0"/>
-          </a:p>
-          <a:p>
-            <a:r>
-              <a:rPr lang="de-DE"/>
-              <a:t>And maybe another result could be a </a:t>
-            </a:r>
-            <a:r>
-              <a:rPr lang="de-DE" dirty="0"/>
-              <a:t>proof of concept </a:t>
-            </a:r>
-            <a:r>
-              <a:rPr lang="de-DE"/>
-              <a:t>for customers </a:t>
-            </a:r>
-            <a:r>
-              <a:rPr lang="de-DE" dirty="0"/>
-              <a:t>in the </a:t>
-            </a:r>
-            <a:r>
-              <a:rPr lang="de-DE"/>
-              <a:t>industrial area for an T1S autoconfiguration scenario</a:t>
-            </a:r>
-            <a:endParaRPr lang="de-DE" dirty="0"/>
-          </a:p>
-        </p:txBody>
-      </p:sp>
-    </p:spTree>
-    <p:extLst>
-      <p:ext uri="{BB962C8B-B14F-4D97-AF65-F5344CB8AC3E}">
-        <p14:creationId xmlns:p14="http://schemas.microsoft.com/office/powerpoint/2010/main" val="2240505436"/>
-      </p:ext>
-    </p:extLst>
-  </p:cSld>
-  <p:clrMapOvr>
-    <a:masterClrMapping/>
-  </p:clrMapOvr>
-</p:sld>
-</file>
-
-<file path=ppt/slides/slide20.xml><?xml version="1.0" encoding="utf-8"?>
+<file path=ppt/slides/slide22.xml><?xml version="1.0" encoding="utf-8"?>
 <p:sld xmlns:a="http://schemas.openxmlformats.org/drawingml/2006/main" xmlns:r="http://schemas.openxmlformats.org/officeDocument/2006/relationships" xmlns:p="http://schemas.openxmlformats.org/presentationml/2006/main">
   <p:cSld>
     <p:spTree>
@@ -10652,7 +11136,7 @@
 </p:sld>
 </file>
 
-<file path=ppt/slides/slide21.xml><?xml version="1.0" encoding="utf-8"?>
+<file path=ppt/slides/slide23.xml><?xml version="1.0" encoding="utf-8"?>
 <p:sld xmlns:a="http://schemas.openxmlformats.org/drawingml/2006/main" xmlns:r="http://schemas.openxmlformats.org/officeDocument/2006/relationships" xmlns:p="http://schemas.openxmlformats.org/presentationml/2006/main">
   <p:cSld>
     <p:spTree>
@@ -10937,7 +11421,7 @@
 </p:sld>
 </file>
 
-<file path=ppt/slides/slide22.xml><?xml version="1.0" encoding="utf-8"?>
+<file path=ppt/slides/slide24.xml><?xml version="1.0" encoding="utf-8"?>
 <p:sld xmlns:a="http://schemas.openxmlformats.org/drawingml/2006/main" xmlns:r="http://schemas.openxmlformats.org/officeDocument/2006/relationships" xmlns:p="http://schemas.openxmlformats.org/presentationml/2006/main">
   <p:cSld>
     <p:spTree>
@@ -15721,49 +16205,16 @@
 </file>
 
 <file path=customXml/item2.xml><?xml version="1.0" encoding="utf-8"?>
-<?mso-contentType ?>
-<spe:Receivers xmlns:spe="http://schemas.microsoft.com/sharepoint/events">
-  <Receiver>
-    <Name>Document ID Generator</Name>
-    <Synchronization>Synchronous</Synchronization>
-    <Type>10001</Type>
-    <SequenceNumber>1000</SequenceNumber>
-    <Assembly>Microsoft.Office.DocumentManagement, Version=14.0.0.0, Culture=neutral, PublicKeyToken=71e9bce111e9429c</Assembly>
-    <Class>Microsoft.Office.DocumentManagement.Internal.DocIdHandler</Class>
-    <Data/>
-    <Filter/>
-  </Receiver>
-  <Receiver>
-    <Name>Document ID Generator</Name>
-    <Synchronization>Synchronous</Synchronization>
-    <Type>10002</Type>
-    <SequenceNumber>1001</SequenceNumber>
-    <Assembly>Microsoft.Office.DocumentManagement, Version=14.0.0.0, Culture=neutral, PublicKeyToken=71e9bce111e9429c</Assembly>
-    <Class>Microsoft.Office.DocumentManagement.Internal.DocIdHandler</Class>
-    <Data/>
-    <Filter/>
-  </Receiver>
-  <Receiver>
-    <Name>Document ID Generator</Name>
-    <Synchronization>Synchronous</Synchronization>
-    <Type>10004</Type>
-    <SequenceNumber>1002</SequenceNumber>
-    <Assembly>Microsoft.Office.DocumentManagement, Version=14.0.0.0, Culture=neutral, PublicKeyToken=71e9bce111e9429c</Assembly>
-    <Class>Microsoft.Office.DocumentManagement.Internal.DocIdHandler</Class>
-    <Data/>
-    <Filter/>
-  </Receiver>
-  <Receiver>
-    <Name>Document ID Generator</Name>
-    <Synchronization>Synchronous</Synchronization>
-    <Type>10006</Type>
-    <SequenceNumber>1003</SequenceNumber>
-    <Assembly>Microsoft.Office.DocumentManagement, Version=14.0.0.0, Culture=neutral, PublicKeyToken=71e9bce111e9429c</Assembly>
-    <Class>Microsoft.Office.DocumentManagement.Internal.DocIdHandler</Class>
-    <Data/>
-    <Filter/>
-  </Receiver>
-</spe:Receivers>
+<p:properties xmlns:p="http://schemas.microsoft.com/office/2006/metadata/properties" xmlns:xsi="http://www.w3.org/2001/XMLSchema-instance" xmlns:pc="http://schemas.microsoft.com/office/infopath/2007/PartnerControls">
+  <documentManagement>
+    <Content_x0020_Archived xmlns="df7acb31-37ac-40e2-81bb-c44e3630f613">false</Content_x0020_Archived>
+    <_dlc_DocId xmlns="38ef598d-997c-498b-b737-2f6b2c50ccab">SV5CHKDEWJXD-84-133</_dlc_DocId>
+    <_dlc_DocIdUrl xmlns="38ef598d-997c-498b-b737-2f6b2c50ccab">
+      <Url>http://mchpweb-2010/marcom/home/Resources/_layouts/DocIdRedir.aspx?ID=SV5CHKDEWJXD-84-133</Url>
+      <Description>SV5CHKDEWJXD-84-133</Description>
+    </_dlc_DocIdUrl>
+  </documentManagement>
+</p:properties>
 </file>
 
 <file path=customXml/item3.xml><?xml version="1.0" encoding="utf-8"?>
@@ -15923,16 +16374,49 @@
 </file>
 
 <file path=customXml/item4.xml><?xml version="1.0" encoding="utf-8"?>
-<p:properties xmlns:p="http://schemas.microsoft.com/office/2006/metadata/properties" xmlns:xsi="http://www.w3.org/2001/XMLSchema-instance" xmlns:pc="http://schemas.microsoft.com/office/infopath/2007/PartnerControls">
-  <documentManagement>
-    <Content_x0020_Archived xmlns="df7acb31-37ac-40e2-81bb-c44e3630f613">false</Content_x0020_Archived>
-    <_dlc_DocId xmlns="38ef598d-997c-498b-b737-2f6b2c50ccab">SV5CHKDEWJXD-84-133</_dlc_DocId>
-    <_dlc_DocIdUrl xmlns="38ef598d-997c-498b-b737-2f6b2c50ccab">
-      <Url>http://mchpweb-2010/marcom/home/Resources/_layouts/DocIdRedir.aspx?ID=SV5CHKDEWJXD-84-133</Url>
-      <Description>SV5CHKDEWJXD-84-133</Description>
-    </_dlc_DocIdUrl>
-  </documentManagement>
-</p:properties>
+<?mso-contentType ?>
+<spe:Receivers xmlns:spe="http://schemas.microsoft.com/sharepoint/events">
+  <Receiver>
+    <Name>Document ID Generator</Name>
+    <Synchronization>Synchronous</Synchronization>
+    <Type>10001</Type>
+    <SequenceNumber>1000</SequenceNumber>
+    <Assembly>Microsoft.Office.DocumentManagement, Version=14.0.0.0, Culture=neutral, PublicKeyToken=71e9bce111e9429c</Assembly>
+    <Class>Microsoft.Office.DocumentManagement.Internal.DocIdHandler</Class>
+    <Data/>
+    <Filter/>
+  </Receiver>
+  <Receiver>
+    <Name>Document ID Generator</Name>
+    <Synchronization>Synchronous</Synchronization>
+    <Type>10002</Type>
+    <SequenceNumber>1001</SequenceNumber>
+    <Assembly>Microsoft.Office.DocumentManagement, Version=14.0.0.0, Culture=neutral, PublicKeyToken=71e9bce111e9429c</Assembly>
+    <Class>Microsoft.Office.DocumentManagement.Internal.DocIdHandler</Class>
+    <Data/>
+    <Filter/>
+  </Receiver>
+  <Receiver>
+    <Name>Document ID Generator</Name>
+    <Synchronization>Synchronous</Synchronization>
+    <Type>10004</Type>
+    <SequenceNumber>1002</SequenceNumber>
+    <Assembly>Microsoft.Office.DocumentManagement, Version=14.0.0.0, Culture=neutral, PublicKeyToken=71e9bce111e9429c</Assembly>
+    <Class>Microsoft.Office.DocumentManagement.Internal.DocIdHandler</Class>
+    <Data/>
+    <Filter/>
+  </Receiver>
+  <Receiver>
+    <Name>Document ID Generator</Name>
+    <Synchronization>Synchronous</Synchronization>
+    <Type>10006</Type>
+    <SequenceNumber>1003</SequenceNumber>
+    <Assembly>Microsoft.Office.DocumentManagement, Version=14.0.0.0, Culture=neutral, PublicKeyToken=71e9bce111e9429c</Assembly>
+    <Class>Microsoft.Office.DocumentManagement.Internal.DocIdHandler</Class>
+    <Data/>
+    <Filter/>
+  </Receiver>
+</spe:Receivers>
 </file>
 
 <file path=customXml/itemProps1.xml><?xml version="1.0" encoding="utf-8"?>
@@ -15944,9 +16428,12 @@
 </file>
 
 <file path=customXml/itemProps2.xml><?xml version="1.0" encoding="utf-8"?>
-<ds:datastoreItem xmlns:ds="http://schemas.openxmlformats.org/officeDocument/2006/customXml" ds:itemID="{36ECED7C-7E24-4B80-B6AD-5BF0A508FB7B}">
+<ds:datastoreItem xmlns:ds="http://schemas.openxmlformats.org/officeDocument/2006/customXml" ds:itemID="{15774815-801A-4D0C-AAC8-304A8EA5EAE0}">
   <ds:schemaRefs>
-    <ds:schemaRef ds:uri="http://schemas.microsoft.com/sharepoint/events"/>
+    <ds:schemaRef ds:uri="38ef598d-997c-498b-b737-2f6b2c50ccab"/>
+    <ds:schemaRef ds:uri="df7acb31-37ac-40e2-81bb-c44e3630f613"/>
+    <ds:schemaRef ds:uri="http://schemas.microsoft.com/office/2006/metadata/properties"/>
+    <ds:schemaRef ds:uri="http://schemas.microsoft.com/office/infopath/2007/PartnerControls"/>
   </ds:schemaRefs>
 </ds:datastoreItem>
 </file>
@@ -15971,12 +16458,9 @@
 </file>
 
 <file path=customXml/itemProps4.xml><?xml version="1.0" encoding="utf-8"?>
-<ds:datastoreItem xmlns:ds="http://schemas.openxmlformats.org/officeDocument/2006/customXml" ds:itemID="{15774815-801A-4D0C-AAC8-304A8EA5EAE0}">
+<ds:datastoreItem xmlns:ds="http://schemas.openxmlformats.org/officeDocument/2006/customXml" ds:itemID="{36ECED7C-7E24-4B80-B6AD-5BF0A508FB7B}">
   <ds:schemaRefs>
-    <ds:schemaRef ds:uri="38ef598d-997c-498b-b737-2f6b2c50ccab"/>
-    <ds:schemaRef ds:uri="df7acb31-37ac-40e2-81bb-c44e3630f613"/>
-    <ds:schemaRef ds:uri="http://schemas.microsoft.com/office/2006/metadata/properties"/>
-    <ds:schemaRef ds:uri="http://schemas.microsoft.com/office/infopath/2007/PartnerControls"/>
+    <ds:schemaRef ds:uri="http://schemas.microsoft.com/sharepoint/events"/>
   </ds:schemaRefs>
 </ds:datastoreItem>
 </file>
</xml_diff>

<commit_message>
Parsing not selecting serial window. Parsing is done in all windows
</commit_message>
<xml_diff>
--- a/T1S Autoconfig - Tooling.pptx
+++ b/T1S Autoconfig - Tooling.pptx
@@ -5,10 +5,10 @@
     <p:sldMasterId id="2147483648" r:id="rId5"/>
   </p:sldMasterIdLst>
   <p:notesMasterIdLst>
-    <p:notesMasterId r:id="rId30"/>
+    <p:notesMasterId r:id="rId34"/>
   </p:notesMasterIdLst>
   <p:handoutMasterIdLst>
-    <p:handoutMasterId r:id="rId31"/>
+    <p:handoutMasterId r:id="rId35"/>
   </p:handoutMasterIdLst>
   <p:sldIdLst>
     <p:sldId id="1954" r:id="rId6"/>
@@ -35,6 +35,10 @@
     <p:sldId id="2007" r:id="rId27"/>
     <p:sldId id="2017" r:id="rId28"/>
     <p:sldId id="2018" r:id="rId29"/>
+    <p:sldId id="2027" r:id="rId30"/>
+    <p:sldId id="2028" r:id="rId31"/>
+    <p:sldId id="2029" r:id="rId32"/>
+    <p:sldId id="2030" r:id="rId33"/>
   </p:sldIdLst>
   <p:sldSz cx="12188825" cy="6858000"/>
   <p:notesSz cx="6858000" cy="9144000"/>
@@ -923,7 +927,7 @@
           <a:p>
             <a:fld id="{98615C2D-FB91-8740-95C2-23C11A10F2F2}" type="datetimeFigureOut">
               <a:rPr lang="en-US" smtClean="0"/>
-              <a:t>10/26/2023</a:t>
+              <a:t>10/31/2023</a:t>
             </a:fld>
             <a:endParaRPr lang="en-US"/>
           </a:p>
@@ -1101,7 +1105,7 @@
           <a:p>
             <a:fld id="{F154E49F-5C3A-ED4E-A68A-CCB3AA3B5D59}" type="datetimeFigureOut">
               <a:rPr lang="en-US" smtClean="0"/>
-              <a:t>10/26/2023</a:t>
+              <a:t>10/31/2023</a:t>
             </a:fld>
             <a:endParaRPr lang="en-US"/>
           </a:p>
@@ -11810,6 +11814,508 @@
       <p:bldP spid="8" grpId="0" animBg="1"/>
     </p:bldLst>
   </p:timing>
+</p:sld>
+</file>
+
+<file path=ppt/slides/slide25.xml><?xml version="1.0" encoding="utf-8"?>
+<p:sld xmlns:a="http://schemas.openxmlformats.org/drawingml/2006/main" xmlns:r="http://schemas.openxmlformats.org/officeDocument/2006/relationships" xmlns:p="http://schemas.openxmlformats.org/presentationml/2006/main">
+  <p:cSld>
+    <p:spTree>
+      <p:nvGrpSpPr>
+        <p:cNvPr id="1" name=""/>
+        <p:cNvGrpSpPr/>
+        <p:nvPr/>
+      </p:nvGrpSpPr>
+      <p:grpSpPr>
+        <a:xfrm>
+          <a:off x="0" y="0"/>
+          <a:ext cx="0" cy="0"/>
+          <a:chOff x="0" y="0"/>
+          <a:chExt cx="0" cy="0"/>
+        </a:xfrm>
+      </p:grpSpPr>
+      <p:sp>
+        <p:nvSpPr>
+          <p:cNvPr id="2" name="Title 1">
+            <a:extLst>
+              <a:ext uri="{FF2B5EF4-FFF2-40B4-BE49-F238E27FC236}">
+                <a16:creationId xmlns:a16="http://schemas.microsoft.com/office/drawing/2014/main" id="{67300353-5A4C-37C1-93AA-7C733D82938C}"/>
+              </a:ext>
+            </a:extLst>
+          </p:cNvPr>
+          <p:cNvSpPr>
+            <a:spLocks noGrp="1"/>
+          </p:cNvSpPr>
+          <p:nvPr>
+            <p:ph type="title"/>
+          </p:nvPr>
+        </p:nvSpPr>
+        <p:spPr/>
+        <p:txBody>
+          <a:bodyPr/>
+          <a:lstStyle/>
+          <a:p>
+            <a:r>
+              <a:rPr lang="de-DE" dirty="0"/>
+              <a:t>Test 1: Configure Boards Successive</a:t>
+            </a:r>
+          </a:p>
+        </p:txBody>
+      </p:sp>
+      <p:pic>
+        <p:nvPicPr>
+          <p:cNvPr id="5" name="Picture 4">
+            <a:extLst>
+              <a:ext uri="{FF2B5EF4-FFF2-40B4-BE49-F238E27FC236}">
+                <a16:creationId xmlns:a16="http://schemas.microsoft.com/office/drawing/2014/main" id="{FD42B1BE-3FC9-8883-877F-F94551C67536}"/>
+              </a:ext>
+            </a:extLst>
+          </p:cNvPr>
+          <p:cNvPicPr>
+            <a:picLocks noChangeAspect="1"/>
+          </p:cNvPicPr>
+          <p:nvPr/>
+        </p:nvPicPr>
+        <p:blipFill>
+          <a:blip r:embed="rId2"/>
+          <a:stretch>
+            <a:fillRect/>
+          </a:stretch>
+        </p:blipFill>
+        <p:spPr>
+          <a:xfrm>
+            <a:off x="3217143" y="1602267"/>
+            <a:ext cx="5677392" cy="3955123"/>
+          </a:xfrm>
+          <a:prstGeom prst="rect">
+            <a:avLst/>
+          </a:prstGeom>
+        </p:spPr>
+      </p:pic>
+    </p:spTree>
+    <p:extLst>
+      <p:ext uri="{BB962C8B-B14F-4D97-AF65-F5344CB8AC3E}">
+        <p14:creationId xmlns:p14="http://schemas.microsoft.com/office/powerpoint/2010/main" val="2972643268"/>
+      </p:ext>
+    </p:extLst>
+  </p:cSld>
+  <p:clrMapOvr>
+    <a:masterClrMapping/>
+  </p:clrMapOvr>
+</p:sld>
+</file>
+
+<file path=ppt/slides/slide26.xml><?xml version="1.0" encoding="utf-8"?>
+<p:sld xmlns:a="http://schemas.openxmlformats.org/drawingml/2006/main" xmlns:r="http://schemas.openxmlformats.org/officeDocument/2006/relationships" xmlns:p="http://schemas.openxmlformats.org/presentationml/2006/main">
+  <p:cSld>
+    <p:spTree>
+      <p:nvGrpSpPr>
+        <p:cNvPr id="1" name=""/>
+        <p:cNvGrpSpPr/>
+        <p:nvPr/>
+      </p:nvGrpSpPr>
+      <p:grpSpPr>
+        <a:xfrm>
+          <a:off x="0" y="0"/>
+          <a:ext cx="0" cy="0"/>
+          <a:chOff x="0" y="0"/>
+          <a:chExt cx="0" cy="0"/>
+        </a:xfrm>
+      </p:grpSpPr>
+      <p:sp>
+        <p:nvSpPr>
+          <p:cNvPr id="2" name="Title 1">
+            <a:extLst>
+              <a:ext uri="{FF2B5EF4-FFF2-40B4-BE49-F238E27FC236}">
+                <a16:creationId xmlns:a16="http://schemas.microsoft.com/office/drawing/2014/main" id="{67300353-5A4C-37C1-93AA-7C733D82938C}"/>
+              </a:ext>
+            </a:extLst>
+          </p:cNvPr>
+          <p:cNvSpPr>
+            <a:spLocks noGrp="1"/>
+          </p:cNvSpPr>
+          <p:nvPr>
+            <p:ph type="title"/>
+          </p:nvPr>
+        </p:nvSpPr>
+        <p:spPr/>
+        <p:txBody>
+          <a:bodyPr/>
+          <a:lstStyle/>
+          <a:p>
+            <a:r>
+              <a:rPr lang="de-DE" dirty="0"/>
+              <a:t>Test 1.2: Configure Boards Simultan</a:t>
+            </a:r>
+          </a:p>
+        </p:txBody>
+      </p:sp>
+      <p:pic>
+        <p:nvPicPr>
+          <p:cNvPr id="4" name="Picture 3">
+            <a:extLst>
+              <a:ext uri="{FF2B5EF4-FFF2-40B4-BE49-F238E27FC236}">
+                <a16:creationId xmlns:a16="http://schemas.microsoft.com/office/drawing/2014/main" id="{73C9A4BC-8E15-0CEA-AFFD-F24627F58369}"/>
+              </a:ext>
+            </a:extLst>
+          </p:cNvPr>
+          <p:cNvPicPr>
+            <a:picLocks noChangeAspect="1"/>
+          </p:cNvPicPr>
+          <p:nvPr/>
+        </p:nvPicPr>
+        <p:blipFill>
+          <a:blip r:embed="rId2"/>
+          <a:stretch>
+            <a:fillRect/>
+          </a:stretch>
+        </p:blipFill>
+        <p:spPr>
+          <a:xfrm>
+            <a:off x="3091402" y="1726742"/>
+            <a:ext cx="5928874" cy="3779848"/>
+          </a:xfrm>
+          <a:prstGeom prst="rect">
+            <a:avLst/>
+          </a:prstGeom>
+        </p:spPr>
+      </p:pic>
+    </p:spTree>
+    <p:extLst>
+      <p:ext uri="{BB962C8B-B14F-4D97-AF65-F5344CB8AC3E}">
+        <p14:creationId xmlns:p14="http://schemas.microsoft.com/office/powerpoint/2010/main" val="419535598"/>
+      </p:ext>
+    </p:extLst>
+  </p:cSld>
+  <p:clrMapOvr>
+    <a:masterClrMapping/>
+  </p:clrMapOvr>
+</p:sld>
+</file>
+
+<file path=ppt/slides/slide27.xml><?xml version="1.0" encoding="utf-8"?>
+<p:sld xmlns:a="http://schemas.openxmlformats.org/drawingml/2006/main" xmlns:r="http://schemas.openxmlformats.org/officeDocument/2006/relationships" xmlns:p="http://schemas.openxmlformats.org/presentationml/2006/main">
+  <p:cSld>
+    <p:spTree>
+      <p:nvGrpSpPr>
+        <p:cNvPr id="1" name=""/>
+        <p:cNvGrpSpPr/>
+        <p:nvPr/>
+      </p:nvGrpSpPr>
+      <p:grpSpPr>
+        <a:xfrm>
+          <a:off x="0" y="0"/>
+          <a:ext cx="0" cy="0"/>
+          <a:chOff x="0" y="0"/>
+          <a:chExt cx="0" cy="0"/>
+        </a:xfrm>
+      </p:grpSpPr>
+      <p:sp>
+        <p:nvSpPr>
+          <p:cNvPr id="2" name="Title 1">
+            <a:extLst>
+              <a:ext uri="{FF2B5EF4-FFF2-40B4-BE49-F238E27FC236}">
+                <a16:creationId xmlns:a16="http://schemas.microsoft.com/office/drawing/2014/main" id="{67300353-5A4C-37C1-93AA-7C733D82938C}"/>
+              </a:ext>
+            </a:extLst>
+          </p:cNvPr>
+          <p:cNvSpPr>
+            <a:spLocks noGrp="1"/>
+          </p:cNvSpPr>
+          <p:nvPr>
+            <p:ph type="title"/>
+          </p:nvPr>
+        </p:nvSpPr>
+        <p:spPr/>
+        <p:txBody>
+          <a:bodyPr/>
+          <a:lstStyle/>
+          <a:p>
+            <a:r>
+              <a:rPr lang="de-DE" dirty="0"/>
+              <a:t>Test 2: iperf between two boards and varying the Max Nodes value</a:t>
+            </a:r>
+          </a:p>
+        </p:txBody>
+      </p:sp>
+      <p:pic>
+        <p:nvPicPr>
+          <p:cNvPr id="5" name="Picture 4">
+            <a:extLst>
+              <a:ext uri="{FF2B5EF4-FFF2-40B4-BE49-F238E27FC236}">
+                <a16:creationId xmlns:a16="http://schemas.microsoft.com/office/drawing/2014/main" id="{5EE1065D-6653-F255-2C6B-81E62ADF1928}"/>
+              </a:ext>
+            </a:extLst>
+          </p:cNvPr>
+          <p:cNvPicPr>
+            <a:picLocks noChangeAspect="1"/>
+          </p:cNvPicPr>
+          <p:nvPr/>
+        </p:nvPicPr>
+        <p:blipFill>
+          <a:blip r:embed="rId2"/>
+          <a:stretch>
+            <a:fillRect/>
+          </a:stretch>
+        </p:blipFill>
+        <p:spPr>
+          <a:xfrm>
+            <a:off x="826184" y="1981076"/>
+            <a:ext cx="6187976" cy="2865368"/>
+          </a:xfrm>
+          <a:prstGeom prst="rect">
+            <a:avLst/>
+          </a:prstGeom>
+        </p:spPr>
+      </p:pic>
+      <p:pic>
+        <p:nvPicPr>
+          <p:cNvPr id="7" name="Picture 6">
+            <a:extLst>
+              <a:ext uri="{FF2B5EF4-FFF2-40B4-BE49-F238E27FC236}">
+                <a16:creationId xmlns:a16="http://schemas.microsoft.com/office/drawing/2014/main" id="{86EA99AC-F133-A7EE-80FC-6C3CAFBD269C}"/>
+              </a:ext>
+            </a:extLst>
+          </p:cNvPr>
+          <p:cNvPicPr>
+            <a:picLocks noChangeAspect="1"/>
+          </p:cNvPicPr>
+          <p:nvPr/>
+        </p:nvPicPr>
+        <p:blipFill>
+          <a:blip r:embed="rId3"/>
+          <a:stretch>
+            <a:fillRect/>
+          </a:stretch>
+        </p:blipFill>
+        <p:spPr>
+          <a:xfrm>
+            <a:off x="7203440" y="1667831"/>
+            <a:ext cx="4665952" cy="3522337"/>
+          </a:xfrm>
+          <a:prstGeom prst="rect">
+            <a:avLst/>
+          </a:prstGeom>
+        </p:spPr>
+      </p:pic>
+      <p:pic>
+        <p:nvPicPr>
+          <p:cNvPr id="9" name="Picture 8">
+            <a:extLst>
+              <a:ext uri="{FF2B5EF4-FFF2-40B4-BE49-F238E27FC236}">
+                <a16:creationId xmlns:a16="http://schemas.microsoft.com/office/drawing/2014/main" id="{47B2B8F2-FE70-ADC4-2134-15F63F722501}"/>
+              </a:ext>
+            </a:extLst>
+          </p:cNvPr>
+          <p:cNvPicPr>
+            <a:picLocks noChangeAspect="1"/>
+          </p:cNvPicPr>
+          <p:nvPr/>
+        </p:nvPicPr>
+        <p:blipFill>
+          <a:blip r:embed="rId4"/>
+          <a:stretch>
+            <a:fillRect/>
+          </a:stretch>
+        </p:blipFill>
+        <p:spPr>
+          <a:xfrm>
+            <a:off x="4768589" y="5511986"/>
+            <a:ext cx="2400508" cy="441998"/>
+          </a:xfrm>
+          <a:prstGeom prst="rect">
+            <a:avLst/>
+          </a:prstGeom>
+        </p:spPr>
+      </p:pic>
+      <p:pic>
+        <p:nvPicPr>
+          <p:cNvPr id="13" name="Picture 12">
+            <a:extLst>
+              <a:ext uri="{FF2B5EF4-FFF2-40B4-BE49-F238E27FC236}">
+                <a16:creationId xmlns:a16="http://schemas.microsoft.com/office/drawing/2014/main" id="{FE8CDD7A-A2AC-5D43-25C5-EFD19BCD9BC8}"/>
+              </a:ext>
+            </a:extLst>
+          </p:cNvPr>
+          <p:cNvPicPr>
+            <a:picLocks noChangeAspect="1"/>
+          </p:cNvPicPr>
+          <p:nvPr/>
+        </p:nvPicPr>
+        <p:blipFill>
+          <a:blip r:embed="rId5"/>
+          <a:stretch>
+            <a:fillRect/>
+          </a:stretch>
+        </p:blipFill>
+        <p:spPr>
+          <a:xfrm>
+            <a:off x="7511462" y="5190168"/>
+            <a:ext cx="4244708" cy="1173582"/>
+          </a:xfrm>
+          <a:prstGeom prst="rect">
+            <a:avLst/>
+          </a:prstGeom>
+        </p:spPr>
+      </p:pic>
+      <p:pic>
+        <p:nvPicPr>
+          <p:cNvPr id="15" name="Picture 14">
+            <a:extLst>
+              <a:ext uri="{FF2B5EF4-FFF2-40B4-BE49-F238E27FC236}">
+                <a16:creationId xmlns:a16="http://schemas.microsoft.com/office/drawing/2014/main" id="{73767FD3-D12A-277C-DA9C-0C98DCD8D28F}"/>
+              </a:ext>
+            </a:extLst>
+          </p:cNvPr>
+          <p:cNvPicPr>
+            <a:picLocks noChangeAspect="1"/>
+          </p:cNvPicPr>
+          <p:nvPr/>
+        </p:nvPicPr>
+        <p:blipFill>
+          <a:blip r:embed="rId6"/>
+          <a:stretch>
+            <a:fillRect/>
+          </a:stretch>
+        </p:blipFill>
+        <p:spPr>
+          <a:xfrm>
+            <a:off x="734064" y="5232082"/>
+            <a:ext cx="3726503" cy="1089754"/>
+          </a:xfrm>
+          <a:prstGeom prst="rect">
+            <a:avLst/>
+          </a:prstGeom>
+        </p:spPr>
+      </p:pic>
+    </p:spTree>
+    <p:extLst>
+      <p:ext uri="{BB962C8B-B14F-4D97-AF65-F5344CB8AC3E}">
+        <p14:creationId xmlns:p14="http://schemas.microsoft.com/office/powerpoint/2010/main" val="340969633"/>
+      </p:ext>
+    </p:extLst>
+  </p:cSld>
+  <p:clrMapOvr>
+    <a:masterClrMapping/>
+  </p:clrMapOvr>
+</p:sld>
+</file>
+
+<file path=ppt/slides/slide28.xml><?xml version="1.0" encoding="utf-8"?>
+<p:sld xmlns:a="http://schemas.openxmlformats.org/drawingml/2006/main" xmlns:r="http://schemas.openxmlformats.org/officeDocument/2006/relationships" xmlns:p="http://schemas.openxmlformats.org/presentationml/2006/main">
+  <p:cSld>
+    <p:spTree>
+      <p:nvGrpSpPr>
+        <p:cNvPr id="1" name=""/>
+        <p:cNvGrpSpPr/>
+        <p:nvPr/>
+      </p:nvGrpSpPr>
+      <p:grpSpPr>
+        <a:xfrm>
+          <a:off x="0" y="0"/>
+          <a:ext cx="0" cy="0"/>
+          <a:chOff x="0" y="0"/>
+          <a:chExt cx="0" cy="0"/>
+        </a:xfrm>
+      </p:grpSpPr>
+      <p:sp>
+        <p:nvSpPr>
+          <p:cNvPr id="2" name="Title 1">
+            <a:extLst>
+              <a:ext uri="{FF2B5EF4-FFF2-40B4-BE49-F238E27FC236}">
+                <a16:creationId xmlns:a16="http://schemas.microsoft.com/office/drawing/2014/main" id="{67300353-5A4C-37C1-93AA-7C733D82938C}"/>
+              </a:ext>
+            </a:extLst>
+          </p:cNvPr>
+          <p:cNvSpPr>
+            <a:spLocks noGrp="1"/>
+          </p:cNvSpPr>
+          <p:nvPr>
+            <p:ph type="title"/>
+          </p:nvPr>
+        </p:nvSpPr>
+        <p:spPr/>
+        <p:txBody>
+          <a:bodyPr/>
+          <a:lstStyle/>
+          <a:p>
+            <a:r>
+              <a:rPr lang="de-DE" dirty="0"/>
+              <a:t>Test 2: iperf between two boards and varying the Max Nodes value</a:t>
+            </a:r>
+          </a:p>
+        </p:txBody>
+      </p:sp>
+      <p:pic>
+        <p:nvPicPr>
+          <p:cNvPr id="4" name="Picture 3">
+            <a:extLst>
+              <a:ext uri="{FF2B5EF4-FFF2-40B4-BE49-F238E27FC236}">
+                <a16:creationId xmlns:a16="http://schemas.microsoft.com/office/drawing/2014/main" id="{0D3974D3-673D-7A30-5D02-1FC748F8A0F6}"/>
+              </a:ext>
+            </a:extLst>
+          </p:cNvPr>
+          <p:cNvPicPr>
+            <a:picLocks noChangeAspect="1"/>
+          </p:cNvPicPr>
+          <p:nvPr/>
+        </p:nvPicPr>
+        <p:blipFill>
+          <a:blip r:embed="rId2"/>
+          <a:stretch>
+            <a:fillRect/>
+          </a:stretch>
+        </p:blipFill>
+        <p:spPr>
+          <a:xfrm>
+            <a:off x="4685121" y="1684224"/>
+            <a:ext cx="5939832" cy="4432325"/>
+          </a:xfrm>
+          <a:prstGeom prst="rect">
+            <a:avLst/>
+          </a:prstGeom>
+        </p:spPr>
+      </p:pic>
+      <p:pic>
+        <p:nvPicPr>
+          <p:cNvPr id="8" name="Picture 7">
+            <a:extLst>
+              <a:ext uri="{FF2B5EF4-FFF2-40B4-BE49-F238E27FC236}">
+                <a16:creationId xmlns:a16="http://schemas.microsoft.com/office/drawing/2014/main" id="{BBD98E49-FEE7-1D32-E43E-FE44BBE51CA6}"/>
+              </a:ext>
+            </a:extLst>
+          </p:cNvPr>
+          <p:cNvPicPr>
+            <a:picLocks noChangeAspect="1"/>
+          </p:cNvPicPr>
+          <p:nvPr/>
+        </p:nvPicPr>
+        <p:blipFill>
+          <a:blip r:embed="rId3"/>
+          <a:stretch>
+            <a:fillRect/>
+          </a:stretch>
+        </p:blipFill>
+        <p:spPr>
+          <a:xfrm>
+            <a:off x="1268847" y="3429000"/>
+            <a:ext cx="2354784" cy="251482"/>
+          </a:xfrm>
+          <a:prstGeom prst="rect">
+            <a:avLst/>
+          </a:prstGeom>
+        </p:spPr>
+      </p:pic>
+    </p:spTree>
+    <p:extLst>
+      <p:ext uri="{BB962C8B-B14F-4D97-AF65-F5344CB8AC3E}">
+        <p14:creationId xmlns:p14="http://schemas.microsoft.com/office/powerpoint/2010/main" val="2465625645"/>
+      </p:ext>
+    </p:extLst>
+  </p:cSld>
+  <p:clrMapOvr>
+    <a:masterClrMapping/>
+  </p:clrMapOvr>
 </p:sld>
 </file>
 
@@ -16205,16 +16711,49 @@
 </file>
 
 <file path=customXml/item2.xml><?xml version="1.0" encoding="utf-8"?>
-<p:properties xmlns:p="http://schemas.microsoft.com/office/2006/metadata/properties" xmlns:xsi="http://www.w3.org/2001/XMLSchema-instance" xmlns:pc="http://schemas.microsoft.com/office/infopath/2007/PartnerControls">
-  <documentManagement>
-    <Content_x0020_Archived xmlns="df7acb31-37ac-40e2-81bb-c44e3630f613">false</Content_x0020_Archived>
-    <_dlc_DocId xmlns="38ef598d-997c-498b-b737-2f6b2c50ccab">SV5CHKDEWJXD-84-133</_dlc_DocId>
-    <_dlc_DocIdUrl xmlns="38ef598d-997c-498b-b737-2f6b2c50ccab">
-      <Url>http://mchpweb-2010/marcom/home/Resources/_layouts/DocIdRedir.aspx?ID=SV5CHKDEWJXD-84-133</Url>
-      <Description>SV5CHKDEWJXD-84-133</Description>
-    </_dlc_DocIdUrl>
-  </documentManagement>
-</p:properties>
+<?mso-contentType ?>
+<spe:Receivers xmlns:spe="http://schemas.microsoft.com/sharepoint/events">
+  <Receiver>
+    <Name>Document ID Generator</Name>
+    <Synchronization>Synchronous</Synchronization>
+    <Type>10001</Type>
+    <SequenceNumber>1000</SequenceNumber>
+    <Assembly>Microsoft.Office.DocumentManagement, Version=14.0.0.0, Culture=neutral, PublicKeyToken=71e9bce111e9429c</Assembly>
+    <Class>Microsoft.Office.DocumentManagement.Internal.DocIdHandler</Class>
+    <Data/>
+    <Filter/>
+  </Receiver>
+  <Receiver>
+    <Name>Document ID Generator</Name>
+    <Synchronization>Synchronous</Synchronization>
+    <Type>10002</Type>
+    <SequenceNumber>1001</SequenceNumber>
+    <Assembly>Microsoft.Office.DocumentManagement, Version=14.0.0.0, Culture=neutral, PublicKeyToken=71e9bce111e9429c</Assembly>
+    <Class>Microsoft.Office.DocumentManagement.Internal.DocIdHandler</Class>
+    <Data/>
+    <Filter/>
+  </Receiver>
+  <Receiver>
+    <Name>Document ID Generator</Name>
+    <Synchronization>Synchronous</Synchronization>
+    <Type>10004</Type>
+    <SequenceNumber>1002</SequenceNumber>
+    <Assembly>Microsoft.Office.DocumentManagement, Version=14.0.0.0, Culture=neutral, PublicKeyToken=71e9bce111e9429c</Assembly>
+    <Class>Microsoft.Office.DocumentManagement.Internal.DocIdHandler</Class>
+    <Data/>
+    <Filter/>
+  </Receiver>
+  <Receiver>
+    <Name>Document ID Generator</Name>
+    <Synchronization>Synchronous</Synchronization>
+    <Type>10006</Type>
+    <SequenceNumber>1003</SequenceNumber>
+    <Assembly>Microsoft.Office.DocumentManagement, Version=14.0.0.0, Culture=neutral, PublicKeyToken=71e9bce111e9429c</Assembly>
+    <Class>Microsoft.Office.DocumentManagement.Internal.DocIdHandler</Class>
+    <Data/>
+    <Filter/>
+  </Receiver>
+</spe:Receivers>
 </file>
 
 <file path=customXml/item3.xml><?xml version="1.0" encoding="utf-8"?>
@@ -16374,49 +16913,16 @@
 </file>
 
 <file path=customXml/item4.xml><?xml version="1.0" encoding="utf-8"?>
-<?mso-contentType ?>
-<spe:Receivers xmlns:spe="http://schemas.microsoft.com/sharepoint/events">
-  <Receiver>
-    <Name>Document ID Generator</Name>
-    <Synchronization>Synchronous</Synchronization>
-    <Type>10001</Type>
-    <SequenceNumber>1000</SequenceNumber>
-    <Assembly>Microsoft.Office.DocumentManagement, Version=14.0.0.0, Culture=neutral, PublicKeyToken=71e9bce111e9429c</Assembly>
-    <Class>Microsoft.Office.DocumentManagement.Internal.DocIdHandler</Class>
-    <Data/>
-    <Filter/>
-  </Receiver>
-  <Receiver>
-    <Name>Document ID Generator</Name>
-    <Synchronization>Synchronous</Synchronization>
-    <Type>10002</Type>
-    <SequenceNumber>1001</SequenceNumber>
-    <Assembly>Microsoft.Office.DocumentManagement, Version=14.0.0.0, Culture=neutral, PublicKeyToken=71e9bce111e9429c</Assembly>
-    <Class>Microsoft.Office.DocumentManagement.Internal.DocIdHandler</Class>
-    <Data/>
-    <Filter/>
-  </Receiver>
-  <Receiver>
-    <Name>Document ID Generator</Name>
-    <Synchronization>Synchronous</Synchronization>
-    <Type>10004</Type>
-    <SequenceNumber>1002</SequenceNumber>
-    <Assembly>Microsoft.Office.DocumentManagement, Version=14.0.0.0, Culture=neutral, PublicKeyToken=71e9bce111e9429c</Assembly>
-    <Class>Microsoft.Office.DocumentManagement.Internal.DocIdHandler</Class>
-    <Data/>
-    <Filter/>
-  </Receiver>
-  <Receiver>
-    <Name>Document ID Generator</Name>
-    <Synchronization>Synchronous</Synchronization>
-    <Type>10006</Type>
-    <SequenceNumber>1003</SequenceNumber>
-    <Assembly>Microsoft.Office.DocumentManagement, Version=14.0.0.0, Culture=neutral, PublicKeyToken=71e9bce111e9429c</Assembly>
-    <Class>Microsoft.Office.DocumentManagement.Internal.DocIdHandler</Class>
-    <Data/>
-    <Filter/>
-  </Receiver>
-</spe:Receivers>
+<p:properties xmlns:p="http://schemas.microsoft.com/office/2006/metadata/properties" xmlns:xsi="http://www.w3.org/2001/XMLSchema-instance" xmlns:pc="http://schemas.microsoft.com/office/infopath/2007/PartnerControls">
+  <documentManagement>
+    <Content_x0020_Archived xmlns="df7acb31-37ac-40e2-81bb-c44e3630f613">false</Content_x0020_Archived>
+    <_dlc_DocId xmlns="38ef598d-997c-498b-b737-2f6b2c50ccab">SV5CHKDEWJXD-84-133</_dlc_DocId>
+    <_dlc_DocIdUrl xmlns="38ef598d-997c-498b-b737-2f6b2c50ccab">
+      <Url>http://mchpweb-2010/marcom/home/Resources/_layouts/DocIdRedir.aspx?ID=SV5CHKDEWJXD-84-133</Url>
+      <Description>SV5CHKDEWJXD-84-133</Description>
+    </_dlc_DocIdUrl>
+  </documentManagement>
+</p:properties>
 </file>
 
 <file path=customXml/itemProps1.xml><?xml version="1.0" encoding="utf-8"?>
@@ -16428,12 +16934,9 @@
 </file>
 
 <file path=customXml/itemProps2.xml><?xml version="1.0" encoding="utf-8"?>
-<ds:datastoreItem xmlns:ds="http://schemas.openxmlformats.org/officeDocument/2006/customXml" ds:itemID="{15774815-801A-4D0C-AAC8-304A8EA5EAE0}">
+<ds:datastoreItem xmlns:ds="http://schemas.openxmlformats.org/officeDocument/2006/customXml" ds:itemID="{36ECED7C-7E24-4B80-B6AD-5BF0A508FB7B}">
   <ds:schemaRefs>
-    <ds:schemaRef ds:uri="38ef598d-997c-498b-b737-2f6b2c50ccab"/>
-    <ds:schemaRef ds:uri="df7acb31-37ac-40e2-81bb-c44e3630f613"/>
-    <ds:schemaRef ds:uri="http://schemas.microsoft.com/office/2006/metadata/properties"/>
-    <ds:schemaRef ds:uri="http://schemas.microsoft.com/office/infopath/2007/PartnerControls"/>
+    <ds:schemaRef ds:uri="http://schemas.microsoft.com/sharepoint/events"/>
   </ds:schemaRefs>
 </ds:datastoreItem>
 </file>
@@ -16458,9 +16961,12 @@
 </file>
 
 <file path=customXml/itemProps4.xml><?xml version="1.0" encoding="utf-8"?>
-<ds:datastoreItem xmlns:ds="http://schemas.openxmlformats.org/officeDocument/2006/customXml" ds:itemID="{36ECED7C-7E24-4B80-B6AD-5BF0A508FB7B}">
+<ds:datastoreItem xmlns:ds="http://schemas.openxmlformats.org/officeDocument/2006/customXml" ds:itemID="{15774815-801A-4D0C-AAC8-304A8EA5EAE0}">
   <ds:schemaRefs>
-    <ds:schemaRef ds:uri="http://schemas.microsoft.com/sharepoint/events"/>
+    <ds:schemaRef ds:uri="38ef598d-997c-498b-b737-2f6b2c50ccab"/>
+    <ds:schemaRef ds:uri="df7acb31-37ac-40e2-81bb-c44e3630f613"/>
+    <ds:schemaRef ds:uri="http://schemas.microsoft.com/office/2006/metadata/properties"/>
+    <ds:schemaRef ds:uri="http://schemas.microsoft.com/office/infopath/2007/PartnerControls"/>
   </ds:schemaRefs>
 </ds:datastoreItem>
 </file>
</xml_diff>

<commit_message>
Updated ppt wiht our Goals
</commit_message>
<xml_diff>
--- a/T1S Autoconfig - Tooling.pptx
+++ b/T1S Autoconfig - Tooling.pptx
@@ -5,40 +5,41 @@
     <p:sldMasterId id="2147483648" r:id="rId5"/>
   </p:sldMasterIdLst>
   <p:notesMasterIdLst>
-    <p:notesMasterId r:id="rId34"/>
+    <p:notesMasterId r:id="rId35"/>
   </p:notesMasterIdLst>
   <p:handoutMasterIdLst>
-    <p:handoutMasterId r:id="rId35"/>
+    <p:handoutMasterId r:id="rId36"/>
   </p:handoutMasterIdLst>
   <p:sldIdLst>
     <p:sldId id="1954" r:id="rId6"/>
     <p:sldId id="1990" r:id="rId7"/>
     <p:sldId id="2020" r:id="rId8"/>
-    <p:sldId id="1959" r:id="rId9"/>
-    <p:sldId id="2004" r:id="rId10"/>
-    <p:sldId id="2023" r:id="rId11"/>
-    <p:sldId id="2009" r:id="rId12"/>
-    <p:sldId id="2022" r:id="rId13"/>
-    <p:sldId id="2011" r:id="rId14"/>
-    <p:sldId id="2012" r:id="rId15"/>
-    <p:sldId id="2010" r:id="rId16"/>
-    <p:sldId id="2005" r:id="rId17"/>
-    <p:sldId id="2021" r:id="rId18"/>
-    <p:sldId id="2014" r:id="rId19"/>
-    <p:sldId id="2015" r:id="rId20"/>
-    <p:sldId id="2024" r:id="rId21"/>
-    <p:sldId id="2016" r:id="rId22"/>
-    <p:sldId id="2025" r:id="rId23"/>
-    <p:sldId id="2026" r:id="rId24"/>
-    <p:sldId id="2019" r:id="rId25"/>
-    <p:sldId id="2006" r:id="rId26"/>
-    <p:sldId id="2007" r:id="rId27"/>
-    <p:sldId id="2017" r:id="rId28"/>
-    <p:sldId id="2018" r:id="rId29"/>
-    <p:sldId id="2027" r:id="rId30"/>
-    <p:sldId id="2028" r:id="rId31"/>
-    <p:sldId id="2029" r:id="rId32"/>
-    <p:sldId id="2030" r:id="rId33"/>
+    <p:sldId id="2031" r:id="rId9"/>
+    <p:sldId id="1959" r:id="rId10"/>
+    <p:sldId id="2004" r:id="rId11"/>
+    <p:sldId id="2023" r:id="rId12"/>
+    <p:sldId id="2009" r:id="rId13"/>
+    <p:sldId id="2022" r:id="rId14"/>
+    <p:sldId id="2011" r:id="rId15"/>
+    <p:sldId id="2012" r:id="rId16"/>
+    <p:sldId id="2010" r:id="rId17"/>
+    <p:sldId id="2005" r:id="rId18"/>
+    <p:sldId id="2021" r:id="rId19"/>
+    <p:sldId id="2014" r:id="rId20"/>
+    <p:sldId id="2015" r:id="rId21"/>
+    <p:sldId id="2024" r:id="rId22"/>
+    <p:sldId id="2016" r:id="rId23"/>
+    <p:sldId id="2025" r:id="rId24"/>
+    <p:sldId id="2026" r:id="rId25"/>
+    <p:sldId id="2019" r:id="rId26"/>
+    <p:sldId id="2006" r:id="rId27"/>
+    <p:sldId id="2007" r:id="rId28"/>
+    <p:sldId id="2017" r:id="rId29"/>
+    <p:sldId id="2018" r:id="rId30"/>
+    <p:sldId id="2027" r:id="rId31"/>
+    <p:sldId id="2028" r:id="rId32"/>
+    <p:sldId id="2029" r:id="rId33"/>
+    <p:sldId id="2030" r:id="rId34"/>
   </p:sldIdLst>
   <p:sldSz cx="12188825" cy="6858000"/>
   <p:notesSz cx="6858000" cy="9144000"/>
@@ -172,13 +173,124 @@
 <file path=ppt/revisionInfo.xml><?xml version="1.0" encoding="utf-8"?>
 <p1510:revInfo xmlns:a="http://schemas.openxmlformats.org/drawingml/2006/main" xmlns:r="http://schemas.openxmlformats.org/officeDocument/2006/relationships" xmlns:p1510="http://schemas.microsoft.com/office/powerpoint/2015/10/main">
   <p1510:revLst>
-    <p1510:client id="{0823DEFC-0073-4929-B035-0E84275F2DB5}" v="1852" dt="2023-10-09T15:49:58.465"/>
+    <p1510:client id="{55952A1F-DAE6-46A6-A67C-D2F10EDCA31B}" v="2" dt="2023-12-05T12:49:36.743"/>
   </p1510:revLst>
 </p1510:revInfo>
 </file>
 
 <file path=ppt/changesInfos/changesInfo1.xml><?xml version="1.0" encoding="utf-8"?>
 <pc:chgInfo xmlns:a="http://schemas.openxmlformats.org/drawingml/2006/main" xmlns:r="http://schemas.openxmlformats.org/officeDocument/2006/relationships" xmlns:ac="http://schemas.microsoft.com/office/drawing/2013/main/command" xmlns:pc="http://schemas.microsoft.com/office/powerpoint/2013/main/command">
+  <pc:docChgLst>
+    <pc:chgData name="Kevin Bogdon - M67456" userId="0f4eb218-6187-4584-87a0-06bf6a0fe118" providerId="ADAL" clId="{55952A1F-DAE6-46A6-A67C-D2F10EDCA31B}"/>
+    <pc:docChg chg="undo custSel addSld modSld">
+      <pc:chgData name="Kevin Bogdon - M67456" userId="0f4eb218-6187-4584-87a0-06bf6a0fe118" providerId="ADAL" clId="{55952A1F-DAE6-46A6-A67C-D2F10EDCA31B}" dt="2023-12-05T12:50:03.727" v="331" actId="478"/>
+      <pc:docMkLst>
+        <pc:docMk/>
+      </pc:docMkLst>
+      <pc:sldChg chg="modSp mod">
+        <pc:chgData name="Kevin Bogdon - M67456" userId="0f4eb218-6187-4584-87a0-06bf6a0fe118" providerId="ADAL" clId="{55952A1F-DAE6-46A6-A67C-D2F10EDCA31B}" dt="2023-12-05T12:45:43.982" v="4" actId="20577"/>
+        <pc:sldMkLst>
+          <pc:docMk/>
+          <pc:sldMk cId="2240505436" sldId="1990"/>
+        </pc:sldMkLst>
+        <pc:spChg chg="mod">
+          <ac:chgData name="Kevin Bogdon - M67456" userId="0f4eb218-6187-4584-87a0-06bf6a0fe118" providerId="ADAL" clId="{55952A1F-DAE6-46A6-A67C-D2F10EDCA31B}" dt="2023-12-05T12:45:43.982" v="4" actId="20577"/>
+          <ac:spMkLst>
+            <pc:docMk/>
+            <pc:sldMk cId="2240505436" sldId="1990"/>
+            <ac:spMk id="3" creationId="{6940DDCE-05C4-D14D-09D8-5C700B0FB6B3}"/>
+          </ac:spMkLst>
+        </pc:spChg>
+      </pc:sldChg>
+      <pc:sldChg chg="addSp delSp modSp add mod modClrScheme chgLayout">
+        <pc:chgData name="Kevin Bogdon - M67456" userId="0f4eb218-6187-4584-87a0-06bf6a0fe118" providerId="ADAL" clId="{55952A1F-DAE6-46A6-A67C-D2F10EDCA31B}" dt="2023-12-05T12:50:03.727" v="331" actId="478"/>
+        <pc:sldMkLst>
+          <pc:docMk/>
+          <pc:sldMk cId="1459359035" sldId="2031"/>
+        </pc:sldMkLst>
+        <pc:spChg chg="add del mod">
+          <ac:chgData name="Kevin Bogdon - M67456" userId="0f4eb218-6187-4584-87a0-06bf6a0fe118" providerId="ADAL" clId="{55952A1F-DAE6-46A6-A67C-D2F10EDCA31B}" dt="2023-12-05T12:49:58.274" v="329" actId="478"/>
+          <ac:spMkLst>
+            <pc:docMk/>
+            <pc:sldMk cId="1459359035" sldId="2031"/>
+            <ac:spMk id="2" creationId="{4AA33942-852B-E475-399A-829A3998827B}"/>
+          </ac:spMkLst>
+        </pc:spChg>
+        <pc:spChg chg="add del mod">
+          <ac:chgData name="Kevin Bogdon - M67456" userId="0f4eb218-6187-4584-87a0-06bf6a0fe118" providerId="ADAL" clId="{55952A1F-DAE6-46A6-A67C-D2F10EDCA31B}" dt="2023-12-05T12:49:36.743" v="323"/>
+          <ac:spMkLst>
+            <pc:docMk/>
+            <pc:sldMk cId="1459359035" sldId="2031"/>
+            <ac:spMk id="4" creationId="{2E0DC69B-C5FA-F43F-B5E1-EC2E686325C4}"/>
+          </ac:spMkLst>
+        </pc:spChg>
+        <pc:spChg chg="mod">
+          <ac:chgData name="Kevin Bogdon - M67456" userId="0f4eb218-6187-4584-87a0-06bf6a0fe118" providerId="ADAL" clId="{55952A1F-DAE6-46A6-A67C-D2F10EDCA31B}" dt="2023-12-05T12:49:44.908" v="327" actId="26606"/>
+          <ac:spMkLst>
+            <pc:docMk/>
+            <pc:sldMk cId="1459359035" sldId="2031"/>
+            <ac:spMk id="8" creationId="{CA150BCA-6874-AD39-D378-3519A98F1789}"/>
+          </ac:spMkLst>
+        </pc:spChg>
+        <pc:spChg chg="del mod">
+          <ac:chgData name="Kevin Bogdon - M67456" userId="0f4eb218-6187-4584-87a0-06bf6a0fe118" providerId="ADAL" clId="{55952A1F-DAE6-46A6-A67C-D2F10EDCA31B}" dt="2023-12-05T12:49:27.610" v="322"/>
+          <ac:spMkLst>
+            <pc:docMk/>
+            <pc:sldMk cId="1459359035" sldId="2031"/>
+            <ac:spMk id="9" creationId="{BE9617CA-5228-D180-8F8F-9A8C1706CB9B}"/>
+          </ac:spMkLst>
+        </pc:spChg>
+        <pc:spChg chg="add del mod">
+          <ac:chgData name="Kevin Bogdon - M67456" userId="0f4eb218-6187-4584-87a0-06bf6a0fe118" providerId="ADAL" clId="{55952A1F-DAE6-46A6-A67C-D2F10EDCA31B}" dt="2023-12-05T12:49:58.274" v="329" actId="478"/>
+          <ac:spMkLst>
+            <pc:docMk/>
+            <pc:sldMk cId="1459359035" sldId="2031"/>
+            <ac:spMk id="11" creationId="{87A0F110-2164-2B84-3EA9-3AF66C2A1438}"/>
+          </ac:spMkLst>
+        </pc:spChg>
+        <pc:spChg chg="add del mod">
+          <ac:chgData name="Kevin Bogdon - M67456" userId="0f4eb218-6187-4584-87a0-06bf6a0fe118" providerId="ADAL" clId="{55952A1F-DAE6-46A6-A67C-D2F10EDCA31B}" dt="2023-12-05T12:50:03.727" v="331" actId="478"/>
+          <ac:spMkLst>
+            <pc:docMk/>
+            <pc:sldMk cId="1459359035" sldId="2031"/>
+            <ac:spMk id="13" creationId="{F08C73DD-CAF0-B722-A326-A31C3EE004F8}"/>
+          </ac:spMkLst>
+        </pc:spChg>
+        <pc:spChg chg="add del mod">
+          <ac:chgData name="Kevin Bogdon - M67456" userId="0f4eb218-6187-4584-87a0-06bf6a0fe118" providerId="ADAL" clId="{55952A1F-DAE6-46A6-A67C-D2F10EDCA31B}" dt="2023-12-05T12:50:02.217" v="330" actId="478"/>
+          <ac:spMkLst>
+            <pc:docMk/>
+            <pc:sldMk cId="1459359035" sldId="2031"/>
+            <ac:spMk id="15" creationId="{4C7EBF05-AE96-3B92-4553-8503D999D437}"/>
+          </ac:spMkLst>
+        </pc:spChg>
+        <pc:picChg chg="del">
+          <ac:chgData name="Kevin Bogdon - M67456" userId="0f4eb218-6187-4584-87a0-06bf6a0fe118" providerId="ADAL" clId="{55952A1F-DAE6-46A6-A67C-D2F10EDCA31B}" dt="2023-12-05T12:49:27.608" v="320" actId="478"/>
+          <ac:picMkLst>
+            <pc:docMk/>
+            <pc:sldMk cId="1459359035" sldId="2031"/>
+            <ac:picMk id="5" creationId="{59D046A2-4A2E-09EE-6D4C-DEF9A18027BF}"/>
+          </ac:picMkLst>
+        </pc:picChg>
+        <pc:picChg chg="add mod">
+          <ac:chgData name="Kevin Bogdon - M67456" userId="0f4eb218-6187-4584-87a0-06bf6a0fe118" providerId="ADAL" clId="{55952A1F-DAE6-46A6-A67C-D2F10EDCA31B}" dt="2023-12-05T12:49:44.908" v="327" actId="26606"/>
+          <ac:picMkLst>
+            <pc:docMk/>
+            <pc:sldMk cId="1459359035" sldId="2031"/>
+            <ac:picMk id="6" creationId="{DD6538F6-C6D1-AA84-3412-46616C238E32}"/>
+          </ac:picMkLst>
+        </pc:picChg>
+        <pc:picChg chg="del">
+          <ac:chgData name="Kevin Bogdon - M67456" userId="0f4eb218-6187-4584-87a0-06bf6a0fe118" providerId="ADAL" clId="{55952A1F-DAE6-46A6-A67C-D2F10EDCA31B}" dt="2023-12-05T12:48:41.412" v="229" actId="478"/>
+          <ac:picMkLst>
+            <pc:docMk/>
+            <pc:sldMk cId="1459359035" sldId="2031"/>
+            <ac:picMk id="7" creationId="{1F0A7CD4-ACEE-CD56-DD26-4CB16A037011}"/>
+          </ac:picMkLst>
+        </pc:picChg>
+      </pc:sldChg>
+    </pc:docChg>
+  </pc:docChgLst>
   <pc:docChgLst>
     <pc:chgData name="Martin Ruppert - M91221" userId="7fe7afe2-cb92-4781-8254-d27073042507" providerId="ADAL" clId="{0823DEFC-0073-4929-B035-0E84275F2DB5}"/>
     <pc:docChg chg="undo custSel addSld delSld modSld sldOrd">
@@ -927,7 +1039,7 @@
           <a:p>
             <a:fld id="{98615C2D-FB91-8740-95C2-23C11A10F2F2}" type="datetimeFigureOut">
               <a:rPr lang="en-US" smtClean="0"/>
-              <a:t>10/31/2023</a:t>
+              <a:t>12/5/2023</a:t>
             </a:fld>
             <a:endParaRPr lang="en-US"/>
           </a:p>
@@ -1105,7 +1217,7 @@
           <a:p>
             <a:fld id="{F154E49F-5C3A-ED4E-A68A-CCB3AA3B5D59}" type="datetimeFigureOut">
               <a:rPr lang="en-US" smtClean="0"/>
-              <a:t>10/31/2023</a:t>
+              <a:t>12/5/2023</a:t>
             </a:fld>
             <a:endParaRPr lang="en-US"/>
           </a:p>
@@ -5435,6 +5547,639 @@
           <a:p>
             <a:r>
               <a:rPr lang="de-DE" dirty="0"/>
+              <a:t>Generate Makefiles</a:t>
+            </a:r>
+          </a:p>
+        </p:txBody>
+      </p:sp>
+      <p:pic>
+        <p:nvPicPr>
+          <p:cNvPr id="5" name="Picture 4">
+            <a:extLst>
+              <a:ext uri="{FF2B5EF4-FFF2-40B4-BE49-F238E27FC236}">
+                <a16:creationId xmlns:a16="http://schemas.microsoft.com/office/drawing/2014/main" id="{0B513042-A54B-3A27-E0C4-D3E93BE6ABB4}"/>
+              </a:ext>
+            </a:extLst>
+          </p:cNvPr>
+          <p:cNvPicPr>
+            <a:picLocks noChangeAspect="1"/>
+          </p:cNvPicPr>
+          <p:nvPr/>
+        </p:nvPicPr>
+        <p:blipFill>
+          <a:blip r:embed="rId3"/>
+          <a:stretch>
+            <a:fillRect/>
+          </a:stretch>
+        </p:blipFill>
+        <p:spPr>
+          <a:xfrm>
+            <a:off x="764437" y="2623055"/>
+            <a:ext cx="1896230" cy="2079736"/>
+          </a:xfrm>
+          <a:prstGeom prst="rect">
+            <a:avLst/>
+          </a:prstGeom>
+        </p:spPr>
+      </p:pic>
+      <p:sp>
+        <p:nvSpPr>
+          <p:cNvPr id="9" name="Rectangle 8">
+            <a:extLst>
+              <a:ext uri="{FF2B5EF4-FFF2-40B4-BE49-F238E27FC236}">
+                <a16:creationId xmlns:a16="http://schemas.microsoft.com/office/drawing/2014/main" id="{99D2AAEB-550E-CD78-4D50-EB22BB93B423}"/>
+              </a:ext>
+            </a:extLst>
+          </p:cNvPr>
+          <p:cNvSpPr/>
+          <p:nvPr/>
+        </p:nvSpPr>
+        <p:spPr>
+          <a:xfrm>
+            <a:off x="3067736" y="3047600"/>
+            <a:ext cx="3271101" cy="312663"/>
+          </a:xfrm>
+          <a:prstGeom prst="rect">
+            <a:avLst/>
+          </a:prstGeom>
+          <a:noFill/>
+          <a:ln/>
+        </p:spPr>
+        <p:style>
+          <a:lnRef idx="2">
+            <a:schemeClr val="accent2"/>
+          </a:lnRef>
+          <a:fillRef idx="1">
+            <a:schemeClr val="lt1"/>
+          </a:fillRef>
+          <a:effectRef idx="0">
+            <a:schemeClr val="accent2"/>
+          </a:effectRef>
+          <a:fontRef idx="minor">
+            <a:schemeClr val="dk1"/>
+          </a:fontRef>
+        </p:style>
+        <p:txBody>
+          <a:bodyPr rot="0" spcFirstLastPara="0" vertOverflow="overflow" horzOverflow="overflow" vert="horz" wrap="square" lIns="91440" tIns="45720" rIns="91440" bIns="45720" numCol="1" spcCol="0" rtlCol="0" fromWordArt="0" anchor="ctr" anchorCtr="0" forceAA="0" compatLnSpc="1">
+            <a:prstTxWarp prst="textNoShape">
+              <a:avLst/>
+            </a:prstTxWarp>
+            <a:noAutofit/>
+          </a:bodyPr>
+          <a:lstStyle/>
+          <a:p>
+            <a:pPr algn="ctr"/>
+            <a:endParaRPr lang="de-DE"/>
+          </a:p>
+        </p:txBody>
+      </p:sp>
+      <p:sp>
+        <p:nvSpPr>
+          <p:cNvPr id="17" name="TextBox 16">
+            <a:extLst>
+              <a:ext uri="{FF2B5EF4-FFF2-40B4-BE49-F238E27FC236}">
+                <a16:creationId xmlns:a16="http://schemas.microsoft.com/office/drawing/2014/main" id="{B535091C-88EB-9173-F05B-9F0627A2F16B}"/>
+              </a:ext>
+            </a:extLst>
+          </p:cNvPr>
+          <p:cNvSpPr txBox="1"/>
+          <p:nvPr/>
+        </p:nvSpPr>
+        <p:spPr>
+          <a:xfrm>
+            <a:off x="6745907" y="348792"/>
+            <a:ext cx="4406002" cy="3046988"/>
+          </a:xfrm>
+          <a:prstGeom prst="rect">
+            <a:avLst/>
+          </a:prstGeom>
+          <a:noFill/>
+        </p:spPr>
+        <p:txBody>
+          <a:bodyPr wrap="square" rtlCol="0">
+            <a:spAutoFit/>
+          </a:bodyPr>
+          <a:lstStyle/>
+          <a:p>
+            <a:r>
+              <a:rPr lang="de-DE" dirty="0"/>
+              <a:t>The script setup.bat calls the „prjMakefilesGenerator.bat“</a:t>
+            </a:r>
+          </a:p>
+          <a:p>
+            <a:endParaRPr lang="de-DE" dirty="0"/>
+          </a:p>
+          <a:p>
+            <a:r>
+              <a:rPr lang="de-DE" dirty="0"/>
+              <a:t>i.e. It creates all Makefiles. This is normally done by MPLABX when the project is opened. And allows to build the projects without using MPLABX</a:t>
+            </a:r>
+          </a:p>
+        </p:txBody>
+      </p:sp>
+      <p:pic>
+        <p:nvPicPr>
+          <p:cNvPr id="6" name="Picture 5">
+            <a:extLst>
+              <a:ext uri="{FF2B5EF4-FFF2-40B4-BE49-F238E27FC236}">
+                <a16:creationId xmlns:a16="http://schemas.microsoft.com/office/drawing/2014/main" id="{7BA6A497-C67D-DFCD-5F92-FEAED324A85C}"/>
+              </a:ext>
+            </a:extLst>
+          </p:cNvPr>
+          <p:cNvPicPr>
+            <a:picLocks noChangeAspect="1"/>
+          </p:cNvPicPr>
+          <p:nvPr/>
+        </p:nvPicPr>
+        <p:blipFill>
+          <a:blip r:embed="rId4"/>
+          <a:stretch>
+            <a:fillRect/>
+          </a:stretch>
+        </p:blipFill>
+        <p:spPr>
+          <a:xfrm>
+            <a:off x="6637416" y="3725599"/>
+            <a:ext cx="5118754" cy="2210882"/>
+          </a:xfrm>
+          <a:prstGeom prst="rect">
+            <a:avLst/>
+          </a:prstGeom>
+        </p:spPr>
+      </p:pic>
+      <p:sp>
+        <p:nvSpPr>
+          <p:cNvPr id="4" name="Rectangle 3">
+            <a:extLst>
+              <a:ext uri="{FF2B5EF4-FFF2-40B4-BE49-F238E27FC236}">
+                <a16:creationId xmlns:a16="http://schemas.microsoft.com/office/drawing/2014/main" id="{477CD761-2EF6-BE89-0D97-ABB4A7A770FB}"/>
+              </a:ext>
+            </a:extLst>
+          </p:cNvPr>
+          <p:cNvSpPr/>
+          <p:nvPr/>
+        </p:nvSpPr>
+        <p:spPr>
+          <a:xfrm>
+            <a:off x="9320785" y="5596128"/>
+            <a:ext cx="2377440" cy="166085"/>
+          </a:xfrm>
+          <a:prstGeom prst="rect">
+            <a:avLst/>
+          </a:prstGeom>
+          <a:noFill/>
+          <a:ln/>
+        </p:spPr>
+        <p:style>
+          <a:lnRef idx="2">
+            <a:schemeClr val="accent2"/>
+          </a:lnRef>
+          <a:fillRef idx="1">
+            <a:schemeClr val="lt1"/>
+          </a:fillRef>
+          <a:effectRef idx="0">
+            <a:schemeClr val="accent2"/>
+          </a:effectRef>
+          <a:fontRef idx="minor">
+            <a:schemeClr val="dk1"/>
+          </a:fontRef>
+        </p:style>
+        <p:txBody>
+          <a:bodyPr rot="0" spcFirstLastPara="0" vertOverflow="overflow" horzOverflow="overflow" vert="horz" wrap="square" lIns="91440" tIns="45720" rIns="91440" bIns="45720" numCol="1" spcCol="0" rtlCol="0" fromWordArt="0" anchor="ctr" anchorCtr="0" forceAA="0" compatLnSpc="1">
+            <a:prstTxWarp prst="textNoShape">
+              <a:avLst/>
+            </a:prstTxWarp>
+            <a:noAutofit/>
+          </a:bodyPr>
+          <a:lstStyle/>
+          <a:p>
+            <a:pPr algn="ctr"/>
+            <a:endParaRPr lang="de-DE"/>
+          </a:p>
+        </p:txBody>
+      </p:sp>
+      <p:sp>
+        <p:nvSpPr>
+          <p:cNvPr id="7" name="Rectangle 6">
+            <a:extLst>
+              <a:ext uri="{FF2B5EF4-FFF2-40B4-BE49-F238E27FC236}">
+                <a16:creationId xmlns:a16="http://schemas.microsoft.com/office/drawing/2014/main" id="{74B8477E-E393-F6B3-BD90-4D0B87149C77}"/>
+              </a:ext>
+            </a:extLst>
+          </p:cNvPr>
+          <p:cNvSpPr/>
+          <p:nvPr/>
+        </p:nvSpPr>
+        <p:spPr>
+          <a:xfrm>
+            <a:off x="9320785" y="3864865"/>
+            <a:ext cx="2377440" cy="1609344"/>
+          </a:xfrm>
+          <a:prstGeom prst="rect">
+            <a:avLst/>
+          </a:prstGeom>
+          <a:noFill/>
+          <a:ln/>
+        </p:spPr>
+        <p:style>
+          <a:lnRef idx="2">
+            <a:schemeClr val="accent2"/>
+          </a:lnRef>
+          <a:fillRef idx="1">
+            <a:schemeClr val="lt1"/>
+          </a:fillRef>
+          <a:effectRef idx="0">
+            <a:schemeClr val="accent2"/>
+          </a:effectRef>
+          <a:fontRef idx="minor">
+            <a:schemeClr val="dk1"/>
+          </a:fontRef>
+        </p:style>
+        <p:txBody>
+          <a:bodyPr rot="0" spcFirstLastPara="0" vertOverflow="overflow" horzOverflow="overflow" vert="horz" wrap="square" lIns="91440" tIns="45720" rIns="91440" bIns="45720" numCol="1" spcCol="0" rtlCol="0" fromWordArt="0" anchor="ctr" anchorCtr="0" forceAA="0" compatLnSpc="1">
+            <a:prstTxWarp prst="textNoShape">
+              <a:avLst/>
+            </a:prstTxWarp>
+            <a:noAutofit/>
+          </a:bodyPr>
+          <a:lstStyle/>
+          <a:p>
+            <a:pPr algn="ctr"/>
+            <a:endParaRPr lang="de-DE"/>
+          </a:p>
+        </p:txBody>
+      </p:sp>
+      <p:sp>
+        <p:nvSpPr>
+          <p:cNvPr id="11" name="Rectangle 10">
+            <a:extLst>
+              <a:ext uri="{FF2B5EF4-FFF2-40B4-BE49-F238E27FC236}">
+                <a16:creationId xmlns:a16="http://schemas.microsoft.com/office/drawing/2014/main" id="{4E43293E-0F77-4962-9BD7-E1A054466267}"/>
+              </a:ext>
+            </a:extLst>
+          </p:cNvPr>
+          <p:cNvSpPr/>
+          <p:nvPr/>
+        </p:nvSpPr>
+        <p:spPr>
+          <a:xfrm>
+            <a:off x="355509" y="1797031"/>
+            <a:ext cx="11603770" cy="2905760"/>
+          </a:xfrm>
+          <a:prstGeom prst="rect">
+            <a:avLst/>
+          </a:prstGeom>
+          <a:ln/>
+        </p:spPr>
+        <p:style>
+          <a:lnRef idx="2">
+            <a:schemeClr val="accent2"/>
+          </a:lnRef>
+          <a:fillRef idx="1">
+            <a:schemeClr val="lt1"/>
+          </a:fillRef>
+          <a:effectRef idx="0">
+            <a:schemeClr val="accent2"/>
+          </a:effectRef>
+          <a:fontRef idx="minor">
+            <a:schemeClr val="dk1"/>
+          </a:fontRef>
+        </p:style>
+        <p:txBody>
+          <a:bodyPr rot="0" spcFirstLastPara="0" vertOverflow="overflow" horzOverflow="overflow" vert="horz" wrap="square" lIns="91440" tIns="45720" rIns="91440" bIns="45720" numCol="1" spcCol="0" rtlCol="0" fromWordArt="0" anchor="t" anchorCtr="0" forceAA="0" compatLnSpc="1">
+            <a:prstTxWarp prst="textNoShape">
+              <a:avLst/>
+            </a:prstTxWarp>
+            <a:noAutofit/>
+          </a:bodyPr>
+          <a:lstStyle/>
+          <a:p>
+            <a:endParaRPr lang="de-DE" dirty="0"/>
+          </a:p>
+          <a:p>
+            <a:r>
+              <a:rPr lang="de-DE" dirty="0"/>
+              <a:t>If another MPLABX Version should be used than v6.15, this must be changed in the script</a:t>
+            </a:r>
+          </a:p>
+          <a:p>
+            <a:endParaRPr lang="de-DE" dirty="0"/>
+          </a:p>
+          <a:p>
+            <a:endParaRPr lang="de-DE" dirty="0"/>
+          </a:p>
+        </p:txBody>
+      </p:sp>
+      <p:pic>
+        <p:nvPicPr>
+          <p:cNvPr id="13" name="Picture 12">
+            <a:extLst>
+              <a:ext uri="{FF2B5EF4-FFF2-40B4-BE49-F238E27FC236}">
+                <a16:creationId xmlns:a16="http://schemas.microsoft.com/office/drawing/2014/main" id="{FB2E71D1-7C70-A297-8AA3-0D50045852DB}"/>
+              </a:ext>
+            </a:extLst>
+          </p:cNvPr>
+          <p:cNvPicPr>
+            <a:picLocks noChangeAspect="1"/>
+          </p:cNvPicPr>
+          <p:nvPr/>
+        </p:nvPicPr>
+        <p:blipFill>
+          <a:blip r:embed="rId5"/>
+          <a:stretch>
+            <a:fillRect/>
+          </a:stretch>
+        </p:blipFill>
+        <p:spPr>
+          <a:xfrm>
+            <a:off x="653261" y="2785054"/>
+            <a:ext cx="10882303" cy="1287892"/>
+          </a:xfrm>
+          <a:prstGeom prst="rect">
+            <a:avLst/>
+          </a:prstGeom>
+        </p:spPr>
+      </p:pic>
+    </p:spTree>
+    <p:extLst>
+      <p:ext uri="{BB962C8B-B14F-4D97-AF65-F5344CB8AC3E}">
+        <p14:creationId xmlns:p14="http://schemas.microsoft.com/office/powerpoint/2010/main" val="2483439385"/>
+      </p:ext>
+    </p:extLst>
+  </p:cSld>
+  <p:clrMapOvr>
+    <a:masterClrMapping/>
+  </p:clrMapOvr>
+  <p:timing>
+    <p:tnLst>
+      <p:par>
+        <p:cTn id="1" dur="indefinite" restart="never" nodeType="tmRoot">
+          <p:childTnLst>
+            <p:seq concurrent="1" nextAc="seek">
+              <p:cTn id="2" dur="indefinite" nodeType="mainSeq">
+                <p:childTnLst>
+                  <p:par>
+                    <p:cTn id="3" fill="hold">
+                      <p:stCondLst>
+                        <p:cond delay="indefinite"/>
+                      </p:stCondLst>
+                      <p:childTnLst>
+                        <p:par>
+                          <p:cTn id="4" fill="hold">
+                            <p:stCondLst>
+                              <p:cond delay="0"/>
+                            </p:stCondLst>
+                            <p:childTnLst>
+                              <p:par>
+                                <p:cTn id="5" presetID="1" presetClass="entr" presetSubtype="0" fill="hold" grpId="0" nodeType="clickEffect">
+                                  <p:stCondLst>
+                                    <p:cond delay="0"/>
+                                  </p:stCondLst>
+                                  <p:childTnLst>
+                                    <p:set>
+                                      <p:cBhvr>
+                                        <p:cTn id="6" dur="1" fill="hold">
+                                          <p:stCondLst>
+                                            <p:cond delay="0"/>
+                                          </p:stCondLst>
+                                        </p:cTn>
+                                        <p:tgtEl>
+                                          <p:spTgt spid="4"/>
+                                        </p:tgtEl>
+                                        <p:attrNameLst>
+                                          <p:attrName>style.visibility</p:attrName>
+                                        </p:attrNameLst>
+                                      </p:cBhvr>
+                                      <p:to>
+                                        <p:strVal val="visible"/>
+                                      </p:to>
+                                    </p:set>
+                                  </p:childTnLst>
+                                </p:cTn>
+                              </p:par>
+                            </p:childTnLst>
+                          </p:cTn>
+                        </p:par>
+                      </p:childTnLst>
+                    </p:cTn>
+                  </p:par>
+                  <p:par>
+                    <p:cTn id="7" fill="hold">
+                      <p:stCondLst>
+                        <p:cond delay="indefinite"/>
+                      </p:stCondLst>
+                      <p:childTnLst>
+                        <p:par>
+                          <p:cTn id="8" fill="hold">
+                            <p:stCondLst>
+                              <p:cond delay="0"/>
+                            </p:stCondLst>
+                            <p:childTnLst>
+                              <p:par>
+                                <p:cTn id="9" presetID="1" presetClass="entr" presetSubtype="0" fill="hold" grpId="0" nodeType="clickEffect">
+                                  <p:stCondLst>
+                                    <p:cond delay="0"/>
+                                  </p:stCondLst>
+                                  <p:childTnLst>
+                                    <p:set>
+                                      <p:cBhvr>
+                                        <p:cTn id="10" dur="1" fill="hold">
+                                          <p:stCondLst>
+                                            <p:cond delay="0"/>
+                                          </p:stCondLst>
+                                        </p:cTn>
+                                        <p:tgtEl>
+                                          <p:spTgt spid="7"/>
+                                        </p:tgtEl>
+                                        <p:attrNameLst>
+                                          <p:attrName>style.visibility</p:attrName>
+                                        </p:attrNameLst>
+                                      </p:cBhvr>
+                                      <p:to>
+                                        <p:strVal val="visible"/>
+                                      </p:to>
+                                    </p:set>
+                                  </p:childTnLst>
+                                </p:cTn>
+                              </p:par>
+                            </p:childTnLst>
+                          </p:cTn>
+                        </p:par>
+                      </p:childTnLst>
+                    </p:cTn>
+                  </p:par>
+                  <p:par>
+                    <p:cTn id="11" fill="hold">
+                      <p:stCondLst>
+                        <p:cond delay="indefinite"/>
+                      </p:stCondLst>
+                      <p:childTnLst>
+                        <p:par>
+                          <p:cTn id="12" fill="hold">
+                            <p:stCondLst>
+                              <p:cond delay="0"/>
+                            </p:stCondLst>
+                            <p:childTnLst>
+                              <p:par>
+                                <p:cTn id="13" presetID="1" presetClass="entr" presetSubtype="0" fill="hold" grpId="0" nodeType="clickEffect">
+                                  <p:stCondLst>
+                                    <p:cond delay="0"/>
+                                  </p:stCondLst>
+                                  <p:childTnLst>
+                                    <p:set>
+                                      <p:cBhvr>
+                                        <p:cTn id="14" dur="1" fill="hold">
+                                          <p:stCondLst>
+                                            <p:cond delay="0"/>
+                                          </p:stCondLst>
+                                        </p:cTn>
+                                        <p:tgtEl>
+                                          <p:spTgt spid="11"/>
+                                        </p:tgtEl>
+                                        <p:attrNameLst>
+                                          <p:attrName>style.visibility</p:attrName>
+                                        </p:attrNameLst>
+                                      </p:cBhvr>
+                                      <p:to>
+                                        <p:strVal val="visible"/>
+                                      </p:to>
+                                    </p:set>
+                                  </p:childTnLst>
+                                </p:cTn>
+                              </p:par>
+                              <p:par>
+                                <p:cTn id="15" presetID="1" presetClass="entr" presetSubtype="0" fill="hold" nodeType="withEffect">
+                                  <p:stCondLst>
+                                    <p:cond delay="0"/>
+                                  </p:stCondLst>
+                                  <p:childTnLst>
+                                    <p:set>
+                                      <p:cBhvr>
+                                        <p:cTn id="16" dur="1" fill="hold">
+                                          <p:stCondLst>
+                                            <p:cond delay="0"/>
+                                          </p:stCondLst>
+                                        </p:cTn>
+                                        <p:tgtEl>
+                                          <p:spTgt spid="13"/>
+                                        </p:tgtEl>
+                                        <p:attrNameLst>
+                                          <p:attrName>style.visibility</p:attrName>
+                                        </p:attrNameLst>
+                                      </p:cBhvr>
+                                      <p:to>
+                                        <p:strVal val="visible"/>
+                                      </p:to>
+                                    </p:set>
+                                  </p:childTnLst>
+                                </p:cTn>
+                              </p:par>
+                            </p:childTnLst>
+                          </p:cTn>
+                        </p:par>
+                      </p:childTnLst>
+                    </p:cTn>
+                  </p:par>
+                </p:childTnLst>
+              </p:cTn>
+              <p:prevCondLst>
+                <p:cond evt="onPrev" delay="0">
+                  <p:tgtEl>
+                    <p:sldTgt/>
+                  </p:tgtEl>
+                </p:cond>
+              </p:prevCondLst>
+              <p:nextCondLst>
+                <p:cond evt="onNext" delay="0">
+                  <p:tgtEl>
+                    <p:sldTgt/>
+                  </p:tgtEl>
+                </p:cond>
+              </p:nextCondLst>
+            </p:seq>
+          </p:childTnLst>
+        </p:cTn>
+      </p:par>
+    </p:tnLst>
+    <p:bldLst>
+      <p:bldP spid="4" grpId="0" animBg="1"/>
+      <p:bldP spid="7" grpId="0" animBg="1"/>
+      <p:bldP spid="11" grpId="0" animBg="1"/>
+    </p:bldLst>
+  </p:timing>
+</p:sld>
+</file>
+
+<file path=ppt/slides/slide11.xml><?xml version="1.0" encoding="utf-8"?>
+<p:sld xmlns:a="http://schemas.openxmlformats.org/drawingml/2006/main" xmlns:r="http://schemas.openxmlformats.org/officeDocument/2006/relationships" xmlns:p="http://schemas.openxmlformats.org/presentationml/2006/main">
+  <p:cSld>
+    <p:spTree>
+      <p:nvGrpSpPr>
+        <p:cNvPr id="1" name=""/>
+        <p:cNvGrpSpPr/>
+        <p:nvPr/>
+      </p:nvGrpSpPr>
+      <p:grpSpPr>
+        <a:xfrm>
+          <a:off x="0" y="0"/>
+          <a:ext cx="0" cy="0"/>
+          <a:chOff x="0" y="0"/>
+          <a:chExt cx="0" cy="0"/>
+        </a:xfrm>
+      </p:grpSpPr>
+      <p:pic>
+        <p:nvPicPr>
+          <p:cNvPr id="3" name="Picture 2">
+            <a:extLst>
+              <a:ext uri="{FF2B5EF4-FFF2-40B4-BE49-F238E27FC236}">
+                <a16:creationId xmlns:a16="http://schemas.microsoft.com/office/drawing/2014/main" id="{492953FD-C4A6-945C-CFBE-23CE8BD23EC6}"/>
+              </a:ext>
+            </a:extLst>
+          </p:cNvPr>
+          <p:cNvPicPr>
+            <a:picLocks noChangeAspect="1"/>
+          </p:cNvPicPr>
+          <p:nvPr/>
+        </p:nvPicPr>
+        <p:blipFill>
+          <a:blip r:embed="rId2"/>
+          <a:stretch>
+            <a:fillRect/>
+          </a:stretch>
+        </p:blipFill>
+        <p:spPr>
+          <a:xfrm>
+            <a:off x="3185549" y="1926106"/>
+            <a:ext cx="3035477" cy="4010375"/>
+          </a:xfrm>
+          <a:prstGeom prst="rect">
+            <a:avLst/>
+          </a:prstGeom>
+        </p:spPr>
+      </p:pic>
+      <p:sp>
+        <p:nvSpPr>
+          <p:cNvPr id="2" name="Title 1">
+            <a:extLst>
+              <a:ext uri="{FF2B5EF4-FFF2-40B4-BE49-F238E27FC236}">
+                <a16:creationId xmlns:a16="http://schemas.microsoft.com/office/drawing/2014/main" id="{DDFA33AF-EF16-A9A1-1FDA-0BA58D176E2A}"/>
+              </a:ext>
+            </a:extLst>
+          </p:cNvPr>
+          <p:cNvSpPr>
+            <a:spLocks noGrp="1"/>
+          </p:cNvSpPr>
+          <p:nvPr>
+            <p:ph type="title"/>
+          </p:nvPr>
+        </p:nvSpPr>
+        <p:spPr/>
+        <p:txBody>
+          <a:bodyPr/>
+          <a:lstStyle/>
+          <a:p>
+            <a:r>
+              <a:rPr lang="de-DE" dirty="0"/>
               <a:t>Build all configurations</a:t>
             </a:r>
           </a:p>
@@ -5765,7 +6510,7 @@
 </p:sld>
 </file>
 
-<file path=ppt/slides/slide11.xml><?xml version="1.0" encoding="utf-8"?>
+<file path=ppt/slides/slide12.xml><?xml version="1.0" encoding="utf-8"?>
 <p:sld xmlns:a="http://schemas.openxmlformats.org/drawingml/2006/main" xmlns:r="http://schemas.openxmlformats.org/officeDocument/2006/relationships" xmlns:p="http://schemas.openxmlformats.org/presentationml/2006/main">
   <p:cSld>
     <p:spTree>
@@ -6259,7 +7004,7 @@
 </p:sld>
 </file>
 
-<file path=ppt/slides/slide12.xml><?xml version="1.0" encoding="utf-8"?>
+<file path=ppt/slides/slide13.xml><?xml version="1.0" encoding="utf-8"?>
 <p:sld xmlns:a="http://schemas.openxmlformats.org/drawingml/2006/main" xmlns:r="http://schemas.openxmlformats.org/officeDocument/2006/relationships" xmlns:p="http://schemas.openxmlformats.org/presentationml/2006/main">
   <p:cSld>
     <p:spTree>
@@ -6677,7 +7422,7 @@
 </p:sld>
 </file>
 
-<file path=ppt/slides/slide13.xml><?xml version="1.0" encoding="utf-8"?>
+<file path=ppt/slides/slide14.xml><?xml version="1.0" encoding="utf-8"?>
 <p:sld xmlns:a="http://schemas.openxmlformats.org/drawingml/2006/main" xmlns:r="http://schemas.openxmlformats.org/officeDocument/2006/relationships" xmlns:p="http://schemas.openxmlformats.org/presentationml/2006/main">
   <p:cSld>
     <p:spTree>
@@ -7328,7 +8073,7 @@
 </p:sld>
 </file>
 
-<file path=ppt/slides/slide14.xml><?xml version="1.0" encoding="utf-8"?>
+<file path=ppt/slides/slide15.xml><?xml version="1.0" encoding="utf-8"?>
 <p:sld xmlns:a="http://schemas.openxmlformats.org/drawingml/2006/main" xmlns:r="http://schemas.openxmlformats.org/officeDocument/2006/relationships" xmlns:p="http://schemas.openxmlformats.org/presentationml/2006/main">
   <p:cSld>
     <p:spTree>
@@ -7700,7 +8445,7 @@
 </p:sld>
 </file>
 
-<file path=ppt/slides/slide15.xml><?xml version="1.0" encoding="utf-8"?>
+<file path=ppt/slides/slide16.xml><?xml version="1.0" encoding="utf-8"?>
 <p:sld xmlns:a="http://schemas.openxmlformats.org/drawingml/2006/main" xmlns:r="http://schemas.openxmlformats.org/officeDocument/2006/relationships" xmlns:p="http://schemas.openxmlformats.org/presentationml/2006/main">
   <p:cSld>
     <p:spTree>
@@ -7981,7 +8726,7 @@
 </p:sld>
 </file>
 
-<file path=ppt/slides/slide16.xml><?xml version="1.0" encoding="utf-8"?>
+<file path=ppt/slides/slide17.xml><?xml version="1.0" encoding="utf-8"?>
 <p:sld xmlns:a="http://schemas.openxmlformats.org/drawingml/2006/main" xmlns:r="http://schemas.openxmlformats.org/officeDocument/2006/relationships" xmlns:p="http://schemas.openxmlformats.org/presentationml/2006/main">
   <p:cSld>
     <p:spTree>
@@ -8204,7 +8949,7 @@
 </p:sld>
 </file>
 
-<file path=ppt/slides/slide17.xml><?xml version="1.0" encoding="utf-8"?>
+<file path=ppt/slides/slide18.xml><?xml version="1.0" encoding="utf-8"?>
 <p:sld xmlns:a="http://schemas.openxmlformats.org/drawingml/2006/main" xmlns:r="http://schemas.openxmlformats.org/officeDocument/2006/relationships" xmlns:p="http://schemas.openxmlformats.org/presentationml/2006/main">
   <p:cSld>
     <p:spTree>
@@ -8444,279 +9189,6 @@
 </p:sld>
 </file>
 
-<file path=ppt/slides/slide18.xml><?xml version="1.0" encoding="utf-8"?>
-<p:sld xmlns:a="http://schemas.openxmlformats.org/drawingml/2006/main" xmlns:r="http://schemas.openxmlformats.org/officeDocument/2006/relationships" xmlns:p="http://schemas.openxmlformats.org/presentationml/2006/main">
-  <p:cSld>
-    <p:spTree>
-      <p:nvGrpSpPr>
-        <p:cNvPr id="1" name=""/>
-        <p:cNvGrpSpPr/>
-        <p:nvPr/>
-      </p:nvGrpSpPr>
-      <p:grpSpPr>
-        <a:xfrm>
-          <a:off x="0" y="0"/>
-          <a:ext cx="0" cy="0"/>
-          <a:chOff x="0" y="0"/>
-          <a:chExt cx="0" cy="0"/>
-        </a:xfrm>
-      </p:grpSpPr>
-      <p:sp>
-        <p:nvSpPr>
-          <p:cNvPr id="2" name="Title 1">
-            <a:extLst>
-              <a:ext uri="{FF2B5EF4-FFF2-40B4-BE49-F238E27FC236}">
-                <a16:creationId xmlns:a16="http://schemas.microsoft.com/office/drawing/2014/main" id="{0644FA54-3F5A-30E3-4868-7D48857C347E}"/>
-              </a:ext>
-            </a:extLst>
-          </p:cNvPr>
-          <p:cNvSpPr>
-            <a:spLocks noGrp="1"/>
-          </p:cNvSpPr>
-          <p:nvPr>
-            <p:ph type="title"/>
-          </p:nvPr>
-        </p:nvSpPr>
-        <p:spPr/>
-        <p:txBody>
-          <a:bodyPr/>
-          <a:lstStyle/>
-          <a:p>
-            <a:r>
-              <a:rPr lang="de-DE" dirty="0"/>
-              <a:t>Python Modules Dependencies „terminal.pyw“</a:t>
-            </a:r>
-          </a:p>
-        </p:txBody>
-      </p:sp>
-      <p:sp>
-        <p:nvSpPr>
-          <p:cNvPr id="3" name="Content Placeholder 2">
-            <a:extLst>
-              <a:ext uri="{FF2B5EF4-FFF2-40B4-BE49-F238E27FC236}">
-                <a16:creationId xmlns:a16="http://schemas.microsoft.com/office/drawing/2014/main" id="{69B0A739-0D8D-293F-CA27-09C5DE877038}"/>
-              </a:ext>
-            </a:extLst>
-          </p:cNvPr>
-          <p:cNvSpPr>
-            <a:spLocks noGrp="1"/>
-          </p:cNvSpPr>
-          <p:nvPr>
-            <p:ph sz="quarter" idx="13"/>
-          </p:nvPr>
-        </p:nvSpPr>
-        <p:spPr/>
-        <p:txBody>
-          <a:bodyPr>
-            <a:normAutofit fontScale="85000" lnSpcReduction="10000"/>
-          </a:bodyPr>
-          <a:lstStyle/>
-          <a:p>
-            <a:pPr marL="0" indent="0">
-              <a:buNone/>
-            </a:pPr>
-            <a:endParaRPr lang="de-DE" dirty="0"/>
-          </a:p>
-          <a:p>
-            <a:pPr marL="0" indent="0">
-              <a:buNone/>
-            </a:pPr>
-            <a:r>
-              <a:rPr lang="de-DE" dirty="0"/>
-              <a:t>pip install pyserial</a:t>
-            </a:r>
-          </a:p>
-          <a:p>
-            <a:pPr marL="0" indent="0">
-              <a:buNone/>
-            </a:pPr>
-            <a:endParaRPr lang="de-DE" dirty="0"/>
-          </a:p>
-          <a:p>
-            <a:pPr marL="0" indent="0">
-              <a:buNone/>
-            </a:pPr>
-            <a:endParaRPr lang="de-DE" dirty="0"/>
-          </a:p>
-          <a:p>
-            <a:pPr marL="0" indent="0" algn="ctr">
-              <a:buNone/>
-            </a:pPr>
-            <a:endParaRPr lang="de-DE" dirty="0">
-              <a:hlinkClick r:id="rId2"/>
-            </a:endParaRPr>
-          </a:p>
-          <a:p>
-            <a:pPr marL="0" indent="0" algn="ctr">
-              <a:buNone/>
-            </a:pPr>
-            <a:endParaRPr lang="de-DE" dirty="0">
-              <a:hlinkClick r:id="rId2"/>
-            </a:endParaRPr>
-          </a:p>
-          <a:p>
-            <a:pPr marL="0" indent="0" algn="ctr">
-              <a:buNone/>
-            </a:pPr>
-            <a:endParaRPr lang="de-DE" dirty="0">
-              <a:hlinkClick r:id="rId2"/>
-            </a:endParaRPr>
-          </a:p>
-          <a:p>
-            <a:pPr marL="0" indent="0" algn="ctr">
-              <a:buNone/>
-            </a:pPr>
-            <a:r>
-              <a:rPr lang="de-DE" dirty="0">
-                <a:hlinkClick r:id="rId2"/>
-              </a:rPr>
-              <a:t>https://pythonhosted.org/pyserial/index.html</a:t>
-            </a:r>
-            <a:endParaRPr lang="de-DE" dirty="0"/>
-          </a:p>
-          <a:p>
-            <a:pPr marL="0" indent="0" algn="ctr">
-              <a:buNone/>
-            </a:pPr>
-            <a:endParaRPr lang="de-DE" dirty="0"/>
-          </a:p>
-          <a:p>
-            <a:pPr marL="0" indent="0" algn="ctr">
-              <a:buNone/>
-            </a:pPr>
-            <a:r>
-              <a:rPr lang="en-US" b="0" i="0" dirty="0">
-                <a:solidFill>
-                  <a:srgbClr val="000000"/>
-                </a:solidFill>
-                <a:effectLst/>
-                <a:latin typeface="Arial" panose="020B0604020202020204" pitchFamily="34" charset="0"/>
-              </a:rPr>
-              <a:t>This module encapsulates the access for the serial port. It provides backends for </a:t>
-            </a:r>
-            <a:r>
-              <a:rPr lang="en-US" b="0" i="0" u="none" strike="noStrike" dirty="0">
-                <a:solidFill>
-                  <a:srgbClr val="355F7C"/>
-                </a:solidFill>
-                <a:effectLst/>
-                <a:latin typeface="Arial" panose="020B0604020202020204" pitchFamily="34" charset="0"/>
-                <a:hlinkClick r:id="rId3"/>
-              </a:rPr>
-              <a:t>Python</a:t>
-            </a:r>
-            <a:r>
-              <a:rPr lang="en-US" b="0" i="0" dirty="0">
-                <a:solidFill>
-                  <a:srgbClr val="000000"/>
-                </a:solidFill>
-                <a:effectLst/>
-                <a:latin typeface="Arial" panose="020B0604020202020204" pitchFamily="34" charset="0"/>
-              </a:rPr>
-              <a:t> running on Windows, OSX, Linux, BSD (possibly any POSIX compliant system) and </a:t>
-            </a:r>
-            <a:r>
-              <a:rPr lang="en-US" b="0" i="0" dirty="0" err="1">
-                <a:solidFill>
-                  <a:srgbClr val="000000"/>
-                </a:solidFill>
-                <a:effectLst/>
-                <a:latin typeface="Arial" panose="020B0604020202020204" pitchFamily="34" charset="0"/>
-              </a:rPr>
-              <a:t>IronPython</a:t>
-            </a:r>
-            <a:r>
-              <a:rPr lang="en-US" b="0" i="0" dirty="0">
-                <a:solidFill>
-                  <a:srgbClr val="000000"/>
-                </a:solidFill>
-                <a:effectLst/>
-                <a:latin typeface="Arial" panose="020B0604020202020204" pitchFamily="34" charset="0"/>
-              </a:rPr>
-              <a:t>. The module named “serial” automatically selects the appropriate backend.</a:t>
-            </a:r>
-            <a:endParaRPr lang="de-DE" dirty="0"/>
-          </a:p>
-          <a:p>
-            <a:pPr marL="0" indent="0">
-              <a:buNone/>
-            </a:pPr>
-            <a:endParaRPr lang="de-DE" dirty="0"/>
-          </a:p>
-          <a:p>
-            <a:pPr marL="0" indent="0">
-              <a:buNone/>
-            </a:pPr>
-            <a:endParaRPr lang="de-DE" dirty="0"/>
-          </a:p>
-          <a:p>
-            <a:pPr marL="0" indent="0">
-              <a:buNone/>
-            </a:pPr>
-            <a:endParaRPr lang="de-DE" dirty="0"/>
-          </a:p>
-        </p:txBody>
-      </p:sp>
-      <p:pic>
-        <p:nvPicPr>
-          <p:cNvPr id="1028" name="Picture 4" descr="Logo">
-            <a:extLst>
-              <a:ext uri="{FF2B5EF4-FFF2-40B4-BE49-F238E27FC236}">
-                <a16:creationId xmlns:a16="http://schemas.microsoft.com/office/drawing/2014/main" id="{7BAE9EFE-8097-ED49-A397-6C935BE8A6B5}"/>
-              </a:ext>
-            </a:extLst>
-          </p:cNvPr>
-          <p:cNvPicPr>
-            <a:picLocks noChangeAspect="1" noChangeArrowheads="1"/>
-          </p:cNvPicPr>
-          <p:nvPr/>
-        </p:nvPicPr>
-        <p:blipFill>
-          <a:blip r:embed="rId4">
-            <a:extLst>
-              <a:ext uri="{28A0092B-C50C-407E-A947-70E740481C1C}">
-                <a14:useLocalDpi xmlns:a14="http://schemas.microsoft.com/office/drawing/2010/main" val="0"/>
-              </a:ext>
-            </a:extLst>
-          </a:blip>
-          <a:srcRect/>
-          <a:stretch>
-            <a:fillRect/>
-          </a:stretch>
-        </p:blipFill>
-        <p:spPr bwMode="auto">
-          <a:xfrm>
-            <a:off x="4962508" y="2362200"/>
-            <a:ext cx="1962150" cy="1066800"/>
-          </a:xfrm>
-          <a:prstGeom prst="rect">
-            <a:avLst/>
-          </a:prstGeom>
-          <a:noFill/>
-          <a:extLst>
-            <a:ext uri="{909E8E84-426E-40DD-AFC4-6F175D3DCCD1}">
-              <a14:hiddenFill xmlns:a14="http://schemas.microsoft.com/office/drawing/2010/main">
-                <a:solidFill>
-                  <a:srgbClr val="FFFFFF"/>
-                </a:solidFill>
-              </a14:hiddenFill>
-            </a:ext>
-          </a:extLst>
-        </p:spPr>
-      </p:pic>
-    </p:spTree>
-    <p:extLst>
-      <p:ext uri="{BB962C8B-B14F-4D97-AF65-F5344CB8AC3E}">
-        <p14:creationId xmlns:p14="http://schemas.microsoft.com/office/powerpoint/2010/main" val="1991260888"/>
-      </p:ext>
-    </p:extLst>
-  </p:cSld>
-  <p:clrMapOvr>
-    <a:masterClrMapping/>
-  </p:clrMapOvr>
-</p:sld>
-</file>
-
 <file path=ppt/slides/slide19.xml><?xml version="1.0" encoding="utf-8"?>
 <p:sld xmlns:a="http://schemas.openxmlformats.org/drawingml/2006/main" xmlns:r="http://schemas.openxmlformats.org/officeDocument/2006/relationships" xmlns:p="http://schemas.openxmlformats.org/presentationml/2006/main">
   <p:cSld>
@@ -8781,7 +9253,7 @@
         <p:spPr/>
         <p:txBody>
           <a:bodyPr>
-            <a:normAutofit fontScale="92500" lnSpcReduction="20000"/>
+            <a:normAutofit fontScale="85000" lnSpcReduction="10000"/>
           </a:bodyPr>
           <a:lstStyle/>
           <a:p>
@@ -8796,7 +9268,7 @@
             </a:pPr>
             <a:r>
               <a:rPr lang="de-DE" dirty="0"/>
-              <a:t>pip install matplotlib</a:t>
+              <a:t>pip install pyserial</a:t>
             </a:r>
           </a:p>
           <a:p>
@@ -8841,9 +9313,9 @@
             </a:pPr>
             <a:r>
               <a:rPr lang="de-DE" dirty="0">
-                <a:hlinkClick r:id="rId3"/>
+                <a:hlinkClick r:id="rId2"/>
               </a:rPr>
-              <a:t>https://matplotlib.org/</a:t>
+              <a:t>https://pythonhosted.org/pyserial/index.html</a:t>
             </a:r>
             <a:endParaRPr lang="de-DE" dirty="0"/>
           </a:p>
@@ -8860,12 +9332,53 @@
             <a:r>
               <a:rPr lang="en-US" b="0" i="0" dirty="0">
                 <a:solidFill>
-                  <a:srgbClr val="333333"/>
+                  <a:srgbClr val="000000"/>
                 </a:solidFill>
                 <a:effectLst/>
-                <a:latin typeface="-apple-system"/>
+                <a:latin typeface="Arial" panose="020B0604020202020204" pitchFamily="34" charset="0"/>
               </a:rPr>
-              <a:t>Matplotlib is a comprehensive library for creating static, animated, and interactive visualizations in Python. Matplotlib makes easy things easy and hard things possible.</a:t>
+              <a:t>This module encapsulates the access for the serial port. It provides backends for </a:t>
+            </a:r>
+            <a:r>
+              <a:rPr lang="en-US" b="0" i="0" u="none" strike="noStrike" dirty="0">
+                <a:solidFill>
+                  <a:srgbClr val="355F7C"/>
+                </a:solidFill>
+                <a:effectLst/>
+                <a:latin typeface="Arial" panose="020B0604020202020204" pitchFamily="34" charset="0"/>
+                <a:hlinkClick r:id="rId3"/>
+              </a:rPr>
+              <a:t>Python</a:t>
+            </a:r>
+            <a:r>
+              <a:rPr lang="en-US" b="0" i="0" dirty="0">
+                <a:solidFill>
+                  <a:srgbClr val="000000"/>
+                </a:solidFill>
+                <a:effectLst/>
+                <a:latin typeface="Arial" panose="020B0604020202020204" pitchFamily="34" charset="0"/>
+              </a:rPr>
+              <a:t> running on Windows, OSX, Linux, BSD (possibly any POSIX compliant system) and </a:t>
+            </a:r>
+            <a:r>
+              <a:rPr lang="en-US" b="0" i="0" dirty="0" err="1">
+                <a:solidFill>
+                  <a:srgbClr val="000000"/>
+                </a:solidFill>
+                <a:effectLst/>
+                <a:latin typeface="Arial" panose="020B0604020202020204" pitchFamily="34" charset="0"/>
+              </a:rPr>
+              <a:t>IronPython</a:t>
+            </a:r>
+            <a:r>
+              <a:rPr lang="en-US" b="0" i="0" dirty="0">
+                <a:solidFill>
+                  <a:srgbClr val="000000"/>
+                </a:solidFill>
+                <a:effectLst/>
+                <a:latin typeface="Arial" panose="020B0604020202020204" pitchFamily="34" charset="0"/>
+              </a:rPr>
+              <a:t>. The module named “serial” automatically selects the appropriate backend.</a:t>
             </a:r>
             <a:endParaRPr lang="de-DE" dirty="0"/>
           </a:p>
@@ -8881,42 +9394,65 @@
             </a:pPr>
             <a:endParaRPr lang="de-DE" dirty="0"/>
           </a:p>
+          <a:p>
+            <a:pPr marL="0" indent="0">
+              <a:buNone/>
+            </a:pPr>
+            <a:endParaRPr lang="de-DE" dirty="0"/>
+          </a:p>
         </p:txBody>
       </p:sp>
       <p:pic>
         <p:nvPicPr>
-          <p:cNvPr id="6" name="Picture 5">
-            <a:extLst>
-              <a:ext uri="{FF2B5EF4-FFF2-40B4-BE49-F238E27FC236}">
-                <a16:creationId xmlns:a16="http://schemas.microsoft.com/office/drawing/2014/main" id="{A8E591E4-9D25-4B47-D824-6257B123C6AD}"/>
+          <p:cNvPr id="1028" name="Picture 4" descr="Logo">
+            <a:extLst>
+              <a:ext uri="{FF2B5EF4-FFF2-40B4-BE49-F238E27FC236}">
+                <a16:creationId xmlns:a16="http://schemas.microsoft.com/office/drawing/2014/main" id="{7BAE9EFE-8097-ED49-A397-6C935BE8A6B5}"/>
               </a:ext>
             </a:extLst>
           </p:cNvPr>
           <p:cNvPicPr>
-            <a:picLocks noChangeAspect="1"/>
+            <a:picLocks noChangeAspect="1" noChangeArrowheads="1"/>
           </p:cNvPicPr>
           <p:nvPr/>
         </p:nvPicPr>
         <p:blipFill>
-          <a:blip r:embed="rId4"/>
+          <a:blip r:embed="rId4">
+            <a:extLst>
+              <a:ext uri="{28A0092B-C50C-407E-A947-70E740481C1C}">
+                <a14:useLocalDpi xmlns:a14="http://schemas.microsoft.com/office/drawing/2010/main" val="0"/>
+              </a:ext>
+            </a:extLst>
+          </a:blip>
+          <a:srcRect/>
           <a:stretch>
             <a:fillRect/>
           </a:stretch>
         </p:blipFill>
-        <p:spPr>
-          <a:xfrm>
-            <a:off x="4523668" y="2571099"/>
-            <a:ext cx="2607069" cy="641083"/>
+        <p:spPr bwMode="auto">
+          <a:xfrm>
+            <a:off x="4962508" y="2362200"/>
+            <a:ext cx="1962150" cy="1066800"/>
           </a:xfrm>
           <a:prstGeom prst="rect">
             <a:avLst/>
           </a:prstGeom>
+          <a:noFill/>
+          <a:extLst>
+            <a:ext uri="{909E8E84-426E-40DD-AFC4-6F175D3DCCD1}">
+              <a14:hiddenFill xmlns:a14="http://schemas.microsoft.com/office/drawing/2010/main">
+                <a:solidFill>
+                  <a:srgbClr val="FFFFFF"/>
+                </a:solidFill>
+              </a14:hiddenFill>
+            </a:ext>
+          </a:extLst>
         </p:spPr>
       </p:pic>
     </p:spTree>
     <p:extLst>
       <p:ext uri="{BB962C8B-B14F-4D97-AF65-F5344CB8AC3E}">
-        <p14:creationId xmlns:p14="http://schemas.microsoft.com/office/powerpoint/2010/main" val="1015774141"/>
+        <p14:creationId xmlns:p14="http://schemas.microsoft.com/office/powerpoint/2010/main" val="1991260888"/>
       </p:ext>
     </p:extLst>
   </p:cSld>
@@ -9048,7 +9584,7 @@
           <a:p>
             <a:r>
               <a:rPr lang="en-US" dirty="0"/>
-              <a:t>This project is not about to create a Software Engineering Company within the Microchip Sales Organization. It is about to learn the processes, structures and vocabulary that our customer are dealing with</a:t>
+              <a:t>This project is not about creating a Software Engineering Company within the Microchip Sales Organization. It is about to learn the processes, structures and vocabulary that our customer are dealing with</a:t>
             </a:r>
             <a:br>
               <a:rPr lang="en-US" dirty="0"/>
@@ -9067,26 +9603,9 @@
           </a:p>
           <a:p>
             <a:r>
-              <a:rPr lang="de-DE"/>
-              <a:t>And maybe another result could be a </a:t>
-            </a:r>
-            <a:r>
               <a:rPr lang="de-DE" dirty="0"/>
-              <a:t>proof of concept </a:t>
-            </a:r>
-            <a:r>
-              <a:rPr lang="de-DE"/>
-              <a:t>for customers </a:t>
-            </a:r>
-            <a:r>
-              <a:rPr lang="de-DE" dirty="0"/>
-              <a:t>in the </a:t>
-            </a:r>
-            <a:r>
-              <a:rPr lang="de-DE"/>
-              <a:t>industrial area for an T1S autoconfiguration scenario</a:t>
-            </a:r>
-            <a:endParaRPr lang="de-DE" dirty="0"/>
+              <a:t>And maybe another result could be a proof of concept for customers in the industrial area for an T1S autoconfiguration scenario</a:t>
+            </a:r>
           </a:p>
         </p:txBody>
       </p:sp>
@@ -9104,6 +9623,215 @@
 </file>
 
 <file path=ppt/slides/slide20.xml><?xml version="1.0" encoding="utf-8"?>
+<p:sld xmlns:a="http://schemas.openxmlformats.org/drawingml/2006/main" xmlns:r="http://schemas.openxmlformats.org/officeDocument/2006/relationships" xmlns:p="http://schemas.openxmlformats.org/presentationml/2006/main">
+  <p:cSld>
+    <p:spTree>
+      <p:nvGrpSpPr>
+        <p:cNvPr id="1" name=""/>
+        <p:cNvGrpSpPr/>
+        <p:nvPr/>
+      </p:nvGrpSpPr>
+      <p:grpSpPr>
+        <a:xfrm>
+          <a:off x="0" y="0"/>
+          <a:ext cx="0" cy="0"/>
+          <a:chOff x="0" y="0"/>
+          <a:chExt cx="0" cy="0"/>
+        </a:xfrm>
+      </p:grpSpPr>
+      <p:sp>
+        <p:nvSpPr>
+          <p:cNvPr id="2" name="Title 1">
+            <a:extLst>
+              <a:ext uri="{FF2B5EF4-FFF2-40B4-BE49-F238E27FC236}">
+                <a16:creationId xmlns:a16="http://schemas.microsoft.com/office/drawing/2014/main" id="{0644FA54-3F5A-30E3-4868-7D48857C347E}"/>
+              </a:ext>
+            </a:extLst>
+          </p:cNvPr>
+          <p:cNvSpPr>
+            <a:spLocks noGrp="1"/>
+          </p:cNvSpPr>
+          <p:nvPr>
+            <p:ph type="title"/>
+          </p:nvPr>
+        </p:nvSpPr>
+        <p:spPr/>
+        <p:txBody>
+          <a:bodyPr/>
+          <a:lstStyle/>
+          <a:p>
+            <a:r>
+              <a:rPr lang="de-DE" dirty="0"/>
+              <a:t>Python Modules Dependencies „terminal.pyw“</a:t>
+            </a:r>
+          </a:p>
+        </p:txBody>
+      </p:sp>
+      <p:sp>
+        <p:nvSpPr>
+          <p:cNvPr id="3" name="Content Placeholder 2">
+            <a:extLst>
+              <a:ext uri="{FF2B5EF4-FFF2-40B4-BE49-F238E27FC236}">
+                <a16:creationId xmlns:a16="http://schemas.microsoft.com/office/drawing/2014/main" id="{69B0A739-0D8D-293F-CA27-09C5DE877038}"/>
+              </a:ext>
+            </a:extLst>
+          </p:cNvPr>
+          <p:cNvSpPr>
+            <a:spLocks noGrp="1"/>
+          </p:cNvSpPr>
+          <p:nvPr>
+            <p:ph sz="quarter" idx="13"/>
+          </p:nvPr>
+        </p:nvSpPr>
+        <p:spPr/>
+        <p:txBody>
+          <a:bodyPr>
+            <a:normAutofit fontScale="92500" lnSpcReduction="20000"/>
+          </a:bodyPr>
+          <a:lstStyle/>
+          <a:p>
+            <a:pPr marL="0" indent="0">
+              <a:buNone/>
+            </a:pPr>
+            <a:endParaRPr lang="de-DE" dirty="0"/>
+          </a:p>
+          <a:p>
+            <a:pPr marL="0" indent="0">
+              <a:buNone/>
+            </a:pPr>
+            <a:r>
+              <a:rPr lang="de-DE" dirty="0"/>
+              <a:t>pip install matplotlib</a:t>
+            </a:r>
+          </a:p>
+          <a:p>
+            <a:pPr marL="0" indent="0">
+              <a:buNone/>
+            </a:pPr>
+            <a:endParaRPr lang="de-DE" dirty="0"/>
+          </a:p>
+          <a:p>
+            <a:pPr marL="0" indent="0">
+              <a:buNone/>
+            </a:pPr>
+            <a:endParaRPr lang="de-DE" dirty="0"/>
+          </a:p>
+          <a:p>
+            <a:pPr marL="0" indent="0" algn="ctr">
+              <a:buNone/>
+            </a:pPr>
+            <a:endParaRPr lang="de-DE" dirty="0">
+              <a:hlinkClick r:id="rId2"/>
+            </a:endParaRPr>
+          </a:p>
+          <a:p>
+            <a:pPr marL="0" indent="0" algn="ctr">
+              <a:buNone/>
+            </a:pPr>
+            <a:endParaRPr lang="de-DE" dirty="0">
+              <a:hlinkClick r:id="rId2"/>
+            </a:endParaRPr>
+          </a:p>
+          <a:p>
+            <a:pPr marL="0" indent="0" algn="ctr">
+              <a:buNone/>
+            </a:pPr>
+            <a:endParaRPr lang="de-DE" dirty="0">
+              <a:hlinkClick r:id="rId2"/>
+            </a:endParaRPr>
+          </a:p>
+          <a:p>
+            <a:pPr marL="0" indent="0" algn="ctr">
+              <a:buNone/>
+            </a:pPr>
+            <a:r>
+              <a:rPr lang="de-DE" dirty="0">
+                <a:hlinkClick r:id="rId3"/>
+              </a:rPr>
+              <a:t>https://matplotlib.org/</a:t>
+            </a:r>
+            <a:endParaRPr lang="de-DE" dirty="0"/>
+          </a:p>
+          <a:p>
+            <a:pPr marL="0" indent="0" algn="ctr">
+              <a:buNone/>
+            </a:pPr>
+            <a:endParaRPr lang="de-DE" dirty="0"/>
+          </a:p>
+          <a:p>
+            <a:pPr marL="0" indent="0" algn="ctr">
+              <a:buNone/>
+            </a:pPr>
+            <a:r>
+              <a:rPr lang="en-US" b="0" i="0" dirty="0">
+                <a:solidFill>
+                  <a:srgbClr val="333333"/>
+                </a:solidFill>
+                <a:effectLst/>
+                <a:latin typeface="-apple-system"/>
+              </a:rPr>
+              <a:t>Matplotlib is a comprehensive library for creating static, animated, and interactive visualizations in Python. Matplotlib makes easy things easy and hard things possible.</a:t>
+            </a:r>
+            <a:endParaRPr lang="de-DE" dirty="0"/>
+          </a:p>
+          <a:p>
+            <a:pPr marL="0" indent="0">
+              <a:buNone/>
+            </a:pPr>
+            <a:endParaRPr lang="de-DE" dirty="0"/>
+          </a:p>
+          <a:p>
+            <a:pPr marL="0" indent="0">
+              <a:buNone/>
+            </a:pPr>
+            <a:endParaRPr lang="de-DE" dirty="0"/>
+          </a:p>
+        </p:txBody>
+      </p:sp>
+      <p:pic>
+        <p:nvPicPr>
+          <p:cNvPr id="6" name="Picture 5">
+            <a:extLst>
+              <a:ext uri="{FF2B5EF4-FFF2-40B4-BE49-F238E27FC236}">
+                <a16:creationId xmlns:a16="http://schemas.microsoft.com/office/drawing/2014/main" id="{A8E591E4-9D25-4B47-D824-6257B123C6AD}"/>
+              </a:ext>
+            </a:extLst>
+          </p:cNvPr>
+          <p:cNvPicPr>
+            <a:picLocks noChangeAspect="1"/>
+          </p:cNvPicPr>
+          <p:nvPr/>
+        </p:nvPicPr>
+        <p:blipFill>
+          <a:blip r:embed="rId4"/>
+          <a:stretch>
+            <a:fillRect/>
+          </a:stretch>
+        </p:blipFill>
+        <p:spPr>
+          <a:xfrm>
+            <a:off x="4523668" y="2571099"/>
+            <a:ext cx="2607069" cy="641083"/>
+          </a:xfrm>
+          <a:prstGeom prst="rect">
+            <a:avLst/>
+          </a:prstGeom>
+        </p:spPr>
+      </p:pic>
+    </p:spTree>
+    <p:extLst>
+      <p:ext uri="{BB962C8B-B14F-4D97-AF65-F5344CB8AC3E}">
+        <p14:creationId xmlns:p14="http://schemas.microsoft.com/office/powerpoint/2010/main" val="1015774141"/>
+      </p:ext>
+    </p:extLst>
+  </p:cSld>
+  <p:clrMapOvr>
+    <a:masterClrMapping/>
+  </p:clrMapOvr>
+</p:sld>
+</file>
+
+<file path=ppt/slides/slide21.xml><?xml version="1.0" encoding="utf-8"?>
 <p:sld xmlns:a="http://schemas.openxmlformats.org/drawingml/2006/main" xmlns:r="http://schemas.openxmlformats.org/officeDocument/2006/relationships" xmlns:p="http://schemas.openxmlformats.org/presentationml/2006/main">
   <p:cSld>
     <p:spTree>
@@ -10582,7 +11310,7 @@
 </p:sld>
 </file>
 
-<file path=ppt/slides/slide21.xml><?xml version="1.0" encoding="utf-8"?>
+<file path=ppt/slides/slide22.xml><?xml version="1.0" encoding="utf-8"?>
 <p:sld xmlns:a="http://schemas.openxmlformats.org/drawingml/2006/main" xmlns:r="http://schemas.openxmlformats.org/officeDocument/2006/relationships" xmlns:p="http://schemas.openxmlformats.org/presentationml/2006/main">
   <p:cSld>
     <p:spTree>
@@ -10855,7 +11583,7 @@
 </p:sld>
 </file>
 
-<file path=ppt/slides/slide22.xml><?xml version="1.0" encoding="utf-8"?>
+<file path=ppt/slides/slide23.xml><?xml version="1.0" encoding="utf-8"?>
 <p:sld xmlns:a="http://schemas.openxmlformats.org/drawingml/2006/main" xmlns:r="http://schemas.openxmlformats.org/officeDocument/2006/relationships" xmlns:p="http://schemas.openxmlformats.org/presentationml/2006/main">
   <p:cSld>
     <p:spTree>
@@ -11140,7 +11868,7 @@
 </p:sld>
 </file>
 
-<file path=ppt/slides/slide23.xml><?xml version="1.0" encoding="utf-8"?>
+<file path=ppt/slides/slide24.xml><?xml version="1.0" encoding="utf-8"?>
 <p:sld xmlns:a="http://schemas.openxmlformats.org/drawingml/2006/main" xmlns:r="http://schemas.openxmlformats.org/officeDocument/2006/relationships" xmlns:p="http://schemas.openxmlformats.org/presentationml/2006/main">
   <p:cSld>
     <p:spTree>
@@ -11425,7 +12153,7 @@
 </p:sld>
 </file>
 
-<file path=ppt/slides/slide24.xml><?xml version="1.0" encoding="utf-8"?>
+<file path=ppt/slides/slide25.xml><?xml version="1.0" encoding="utf-8"?>
 <p:sld xmlns:a="http://schemas.openxmlformats.org/drawingml/2006/main" xmlns:r="http://schemas.openxmlformats.org/officeDocument/2006/relationships" xmlns:p="http://schemas.openxmlformats.org/presentationml/2006/main">
   <p:cSld>
     <p:spTree>
@@ -11817,94 +12545,6 @@
 </p:sld>
 </file>
 
-<file path=ppt/slides/slide25.xml><?xml version="1.0" encoding="utf-8"?>
-<p:sld xmlns:a="http://schemas.openxmlformats.org/drawingml/2006/main" xmlns:r="http://schemas.openxmlformats.org/officeDocument/2006/relationships" xmlns:p="http://schemas.openxmlformats.org/presentationml/2006/main">
-  <p:cSld>
-    <p:spTree>
-      <p:nvGrpSpPr>
-        <p:cNvPr id="1" name=""/>
-        <p:cNvGrpSpPr/>
-        <p:nvPr/>
-      </p:nvGrpSpPr>
-      <p:grpSpPr>
-        <a:xfrm>
-          <a:off x="0" y="0"/>
-          <a:ext cx="0" cy="0"/>
-          <a:chOff x="0" y="0"/>
-          <a:chExt cx="0" cy="0"/>
-        </a:xfrm>
-      </p:grpSpPr>
-      <p:sp>
-        <p:nvSpPr>
-          <p:cNvPr id="2" name="Title 1">
-            <a:extLst>
-              <a:ext uri="{FF2B5EF4-FFF2-40B4-BE49-F238E27FC236}">
-                <a16:creationId xmlns:a16="http://schemas.microsoft.com/office/drawing/2014/main" id="{67300353-5A4C-37C1-93AA-7C733D82938C}"/>
-              </a:ext>
-            </a:extLst>
-          </p:cNvPr>
-          <p:cNvSpPr>
-            <a:spLocks noGrp="1"/>
-          </p:cNvSpPr>
-          <p:nvPr>
-            <p:ph type="title"/>
-          </p:nvPr>
-        </p:nvSpPr>
-        <p:spPr/>
-        <p:txBody>
-          <a:bodyPr/>
-          <a:lstStyle/>
-          <a:p>
-            <a:r>
-              <a:rPr lang="de-DE" dirty="0"/>
-              <a:t>Test 1: Configure Boards Successive</a:t>
-            </a:r>
-          </a:p>
-        </p:txBody>
-      </p:sp>
-      <p:pic>
-        <p:nvPicPr>
-          <p:cNvPr id="5" name="Picture 4">
-            <a:extLst>
-              <a:ext uri="{FF2B5EF4-FFF2-40B4-BE49-F238E27FC236}">
-                <a16:creationId xmlns:a16="http://schemas.microsoft.com/office/drawing/2014/main" id="{FD42B1BE-3FC9-8883-877F-F94551C67536}"/>
-              </a:ext>
-            </a:extLst>
-          </p:cNvPr>
-          <p:cNvPicPr>
-            <a:picLocks noChangeAspect="1"/>
-          </p:cNvPicPr>
-          <p:nvPr/>
-        </p:nvPicPr>
-        <p:blipFill>
-          <a:blip r:embed="rId2"/>
-          <a:stretch>
-            <a:fillRect/>
-          </a:stretch>
-        </p:blipFill>
-        <p:spPr>
-          <a:xfrm>
-            <a:off x="3217143" y="1602267"/>
-            <a:ext cx="5677392" cy="3955123"/>
-          </a:xfrm>
-          <a:prstGeom prst="rect">
-            <a:avLst/>
-          </a:prstGeom>
-        </p:spPr>
-      </p:pic>
-    </p:spTree>
-    <p:extLst>
-      <p:ext uri="{BB962C8B-B14F-4D97-AF65-F5344CB8AC3E}">
-        <p14:creationId xmlns:p14="http://schemas.microsoft.com/office/powerpoint/2010/main" val="2972643268"/>
-      </p:ext>
-    </p:extLst>
-  </p:cSld>
-  <p:clrMapOvr>
-    <a:masterClrMapping/>
-  </p:clrMapOvr>
-</p:sld>
-</file>
-
 <file path=ppt/slides/slide26.xml><?xml version="1.0" encoding="utf-8"?>
 <p:sld xmlns:a="http://schemas.openxmlformats.org/drawingml/2006/main" xmlns:r="http://schemas.openxmlformats.org/officeDocument/2006/relationships" xmlns:p="http://schemas.openxmlformats.org/presentationml/2006/main">
   <p:cSld>
@@ -11945,17 +12585,17 @@
           <a:p>
             <a:r>
               <a:rPr lang="de-DE" dirty="0"/>
-              <a:t>Test 1.2: Configure Boards Simultan</a:t>
+              <a:t>Test 1: Configure Boards Successive</a:t>
             </a:r>
           </a:p>
         </p:txBody>
       </p:sp>
       <p:pic>
         <p:nvPicPr>
-          <p:cNvPr id="4" name="Picture 3">
-            <a:extLst>
-              <a:ext uri="{FF2B5EF4-FFF2-40B4-BE49-F238E27FC236}">
-                <a16:creationId xmlns:a16="http://schemas.microsoft.com/office/drawing/2014/main" id="{73C9A4BC-8E15-0CEA-AFFD-F24627F58369}"/>
+          <p:cNvPr id="5" name="Picture 4">
+            <a:extLst>
+              <a:ext uri="{FF2B5EF4-FFF2-40B4-BE49-F238E27FC236}">
+                <a16:creationId xmlns:a16="http://schemas.microsoft.com/office/drawing/2014/main" id="{FD42B1BE-3FC9-8883-877F-F94551C67536}"/>
               </a:ext>
             </a:extLst>
           </p:cNvPr>
@@ -11972,8 +12612,8 @@
         </p:blipFill>
         <p:spPr>
           <a:xfrm>
-            <a:off x="3091402" y="1726742"/>
-            <a:ext cx="5928874" cy="3779848"/>
+            <a:off x="3217143" y="1602267"/>
+            <a:ext cx="5677392" cy="3955123"/>
           </a:xfrm>
           <a:prstGeom prst="rect">
             <a:avLst/>
@@ -11983,7 +12623,7 @@
     </p:spTree>
     <p:extLst>
       <p:ext uri="{BB962C8B-B14F-4D97-AF65-F5344CB8AC3E}">
-        <p14:creationId xmlns:p14="http://schemas.microsoft.com/office/powerpoint/2010/main" val="419535598"/>
+        <p14:creationId xmlns:p14="http://schemas.microsoft.com/office/powerpoint/2010/main" val="2972643268"/>
       </p:ext>
     </p:extLst>
   </p:cSld>
@@ -12033,6 +12673,94 @@
           <a:p>
             <a:r>
               <a:rPr lang="de-DE" dirty="0"/>
+              <a:t>Test 1.2: Configure Boards Simultan</a:t>
+            </a:r>
+          </a:p>
+        </p:txBody>
+      </p:sp>
+      <p:pic>
+        <p:nvPicPr>
+          <p:cNvPr id="4" name="Picture 3">
+            <a:extLst>
+              <a:ext uri="{FF2B5EF4-FFF2-40B4-BE49-F238E27FC236}">
+                <a16:creationId xmlns:a16="http://schemas.microsoft.com/office/drawing/2014/main" id="{73C9A4BC-8E15-0CEA-AFFD-F24627F58369}"/>
+              </a:ext>
+            </a:extLst>
+          </p:cNvPr>
+          <p:cNvPicPr>
+            <a:picLocks noChangeAspect="1"/>
+          </p:cNvPicPr>
+          <p:nvPr/>
+        </p:nvPicPr>
+        <p:blipFill>
+          <a:blip r:embed="rId2"/>
+          <a:stretch>
+            <a:fillRect/>
+          </a:stretch>
+        </p:blipFill>
+        <p:spPr>
+          <a:xfrm>
+            <a:off x="3091402" y="1726742"/>
+            <a:ext cx="5928874" cy="3779848"/>
+          </a:xfrm>
+          <a:prstGeom prst="rect">
+            <a:avLst/>
+          </a:prstGeom>
+        </p:spPr>
+      </p:pic>
+    </p:spTree>
+    <p:extLst>
+      <p:ext uri="{BB962C8B-B14F-4D97-AF65-F5344CB8AC3E}">
+        <p14:creationId xmlns:p14="http://schemas.microsoft.com/office/powerpoint/2010/main" val="419535598"/>
+      </p:ext>
+    </p:extLst>
+  </p:cSld>
+  <p:clrMapOvr>
+    <a:masterClrMapping/>
+  </p:clrMapOvr>
+</p:sld>
+</file>
+
+<file path=ppt/slides/slide28.xml><?xml version="1.0" encoding="utf-8"?>
+<p:sld xmlns:a="http://schemas.openxmlformats.org/drawingml/2006/main" xmlns:r="http://schemas.openxmlformats.org/officeDocument/2006/relationships" xmlns:p="http://schemas.openxmlformats.org/presentationml/2006/main">
+  <p:cSld>
+    <p:spTree>
+      <p:nvGrpSpPr>
+        <p:cNvPr id="1" name=""/>
+        <p:cNvGrpSpPr/>
+        <p:nvPr/>
+      </p:nvGrpSpPr>
+      <p:grpSpPr>
+        <a:xfrm>
+          <a:off x="0" y="0"/>
+          <a:ext cx="0" cy="0"/>
+          <a:chOff x="0" y="0"/>
+          <a:chExt cx="0" cy="0"/>
+        </a:xfrm>
+      </p:grpSpPr>
+      <p:sp>
+        <p:nvSpPr>
+          <p:cNvPr id="2" name="Title 1">
+            <a:extLst>
+              <a:ext uri="{FF2B5EF4-FFF2-40B4-BE49-F238E27FC236}">
+                <a16:creationId xmlns:a16="http://schemas.microsoft.com/office/drawing/2014/main" id="{67300353-5A4C-37C1-93AA-7C733D82938C}"/>
+              </a:ext>
+            </a:extLst>
+          </p:cNvPr>
+          <p:cNvSpPr>
+            <a:spLocks noGrp="1"/>
+          </p:cNvSpPr>
+          <p:nvPr>
+            <p:ph type="title"/>
+          </p:nvPr>
+        </p:nvSpPr>
+        <p:spPr/>
+        <p:txBody>
+          <a:bodyPr/>
+          <a:lstStyle/>
+          <a:p>
+            <a:r>
+              <a:rPr lang="de-DE" dirty="0"/>
               <a:t>Test 2: iperf between two boards and varying the Max Nodes value</a:t>
             </a:r>
           </a:p>
@@ -12201,7 +12929,7 @@
 </p:sld>
 </file>
 
-<file path=ppt/slides/slide28.xml><?xml version="1.0" encoding="utf-8"?>
+<file path=ppt/slides/slide29.xml><?xml version="1.0" encoding="utf-8"?>
 <p:sld xmlns:a="http://schemas.openxmlformats.org/drawingml/2006/main" xmlns:r="http://schemas.openxmlformats.org/officeDocument/2006/relationships" xmlns:p="http://schemas.openxmlformats.org/presentationml/2006/main">
   <p:cSld>
     <p:spTree>
@@ -12522,6 +13250,227 @@
 </file>
 
 <file path=ppt/slides/slide4.xml><?xml version="1.0" encoding="utf-8"?>
+<p:sld xmlns:a="http://schemas.openxmlformats.org/drawingml/2006/main" xmlns:r="http://schemas.openxmlformats.org/officeDocument/2006/relationships" xmlns:p="http://schemas.openxmlformats.org/presentationml/2006/main">
+  <p:cSld>
+    <p:spTree>
+      <p:nvGrpSpPr>
+        <p:cNvPr id="1" name=""/>
+        <p:cNvGrpSpPr/>
+        <p:nvPr/>
+      </p:nvGrpSpPr>
+      <p:grpSpPr>
+        <a:xfrm>
+          <a:off x="0" y="0"/>
+          <a:ext cx="0" cy="0"/>
+          <a:chOff x="0" y="0"/>
+          <a:chExt cx="0" cy="0"/>
+        </a:xfrm>
+      </p:grpSpPr>
+      <p:sp>
+        <p:nvSpPr>
+          <p:cNvPr id="2" name="Title 1">
+            <a:extLst>
+              <a:ext uri="{FF2B5EF4-FFF2-40B4-BE49-F238E27FC236}">
+                <a16:creationId xmlns:a16="http://schemas.microsoft.com/office/drawing/2014/main" id="{4AA33942-852B-E475-399A-829A3998827B}"/>
+              </a:ext>
+            </a:extLst>
+          </p:cNvPr>
+          <p:cNvSpPr>
+            <a:spLocks noGrp="1"/>
+          </p:cNvSpPr>
+          <p:nvPr>
+            <p:ph type="title"/>
+          </p:nvPr>
+        </p:nvSpPr>
+        <p:spPr>
+          <a:xfrm>
+            <a:off x="355509" y="96297"/>
+            <a:ext cx="11400661" cy="777240"/>
+          </a:xfrm>
+        </p:spPr>
+        <p:txBody>
+          <a:bodyPr vert="horz" lIns="121888" tIns="60944" rIns="121888" bIns="60944" rtlCol="0" anchor="t" anchorCtr="0">
+            <a:normAutofit/>
+          </a:bodyPr>
+          <a:lstStyle/>
+          <a:p>
+            <a:pPr>
+              <a:lnSpc>
+                <a:spcPct val="90000"/>
+              </a:lnSpc>
+            </a:pPr>
+            <a:r>
+              <a:rPr lang="en-US" b="1" kern="1200" normalizeH="0" baseline="0" dirty="0">
+                <a:latin typeface="+mj-lt"/>
+                <a:ea typeface="+mj-ea"/>
+                <a:cs typeface="+mj-cs"/>
+              </a:rPr>
+              <a:t>GOAL</a:t>
+            </a:r>
+          </a:p>
+        </p:txBody>
+      </p:sp>
+      <p:sp>
+        <p:nvSpPr>
+          <p:cNvPr id="8" name="TextBox 7">
+            <a:extLst>
+              <a:ext uri="{FF2B5EF4-FFF2-40B4-BE49-F238E27FC236}">
+                <a16:creationId xmlns:a16="http://schemas.microsoft.com/office/drawing/2014/main" id="{CA150BCA-6874-AD39-D378-3519A98F1789}"/>
+              </a:ext>
+            </a:extLst>
+          </p:cNvPr>
+          <p:cNvSpPr txBox="1"/>
+          <p:nvPr/>
+        </p:nvSpPr>
+        <p:spPr>
+          <a:xfrm>
+            <a:off x="355509" y="1561175"/>
+            <a:ext cx="5474567" cy="4795020"/>
+          </a:xfrm>
+          <a:prstGeom prst="rect">
+            <a:avLst/>
+          </a:prstGeom>
+        </p:spPr>
+        <p:txBody>
+          <a:bodyPr vert="horz" lIns="121888" tIns="60944" rIns="121888" bIns="60944" rtlCol="0">
+            <a:normAutofit/>
+          </a:bodyPr>
+          <a:lstStyle/>
+          <a:p>
+            <a:pPr marL="342900" indent="-342900">
+              <a:spcBef>
+                <a:spcPts val="300"/>
+              </a:spcBef>
+              <a:buFont typeface="Arial" panose="020B0604020202020204" pitchFamily="34" charset="0"/>
+              <a:buChar char="•"/>
+            </a:pPr>
+            <a:r>
+              <a:rPr lang="en-US" sz="3200">
+                <a:solidFill>
+                  <a:srgbClr val="070707"/>
+                </a:solidFill>
+              </a:rPr>
+              <a:t>One Firmeware for all boards</a:t>
+            </a:r>
+          </a:p>
+          <a:p>
+            <a:pPr marL="342900" indent="-342900">
+              <a:spcBef>
+                <a:spcPts val="300"/>
+              </a:spcBef>
+              <a:buFont typeface="Arial" panose="020B0604020202020204" pitchFamily="34" charset="0"/>
+              <a:buChar char="•"/>
+            </a:pPr>
+            <a:r>
+              <a:rPr lang="en-US" sz="3200">
+                <a:solidFill>
+                  <a:srgbClr val="070707"/>
+                </a:solidFill>
+              </a:rPr>
+              <a:t>Communication between boards should be visible in the OLED1 Extension</a:t>
+            </a:r>
+          </a:p>
+          <a:p>
+            <a:pPr marL="342900" indent="-342900">
+              <a:spcBef>
+                <a:spcPts val="300"/>
+              </a:spcBef>
+              <a:buFont typeface="Arial" panose="020B0604020202020204" pitchFamily="34" charset="0"/>
+              <a:buChar char="•"/>
+            </a:pPr>
+            <a:r>
+              <a:rPr lang="en-US" sz="3200">
+                <a:solidFill>
+                  <a:srgbClr val="070707"/>
+                </a:solidFill>
+              </a:rPr>
+              <a:t>Demo should be  controlable with only the OLED1 Extension</a:t>
+            </a:r>
+          </a:p>
+          <a:p>
+            <a:pPr marL="342900" indent="-342900">
+              <a:spcBef>
+                <a:spcPts val="300"/>
+              </a:spcBef>
+              <a:buFont typeface="Arial" panose="020B0604020202020204" pitchFamily="34" charset="0"/>
+              <a:buChar char="•"/>
+            </a:pPr>
+            <a:r>
+              <a:rPr lang="en-US" sz="3200">
+                <a:solidFill>
+                  <a:srgbClr val="070707"/>
+                </a:solidFill>
+              </a:rPr>
+              <a:t>More complex operations can be done via a terminal</a:t>
+            </a:r>
+          </a:p>
+          <a:p>
+            <a:pPr>
+              <a:spcBef>
+                <a:spcPts val="300"/>
+              </a:spcBef>
+              <a:buChar char="•"/>
+            </a:pPr>
+            <a:endParaRPr lang="en-US" sz="3200">
+              <a:solidFill>
+                <a:srgbClr val="070707"/>
+              </a:solidFill>
+            </a:endParaRPr>
+          </a:p>
+        </p:txBody>
+      </p:sp>
+      <p:pic>
+        <p:nvPicPr>
+          <p:cNvPr id="6" name="Content Placeholder 5" descr="A picture containing text, electronics&#10;&#10;Description automatically generated">
+            <a:extLst>
+              <a:ext uri="{FF2B5EF4-FFF2-40B4-BE49-F238E27FC236}">
+                <a16:creationId xmlns:a16="http://schemas.microsoft.com/office/drawing/2014/main" id="{DD6538F6-C6D1-AA84-3412-46616C238E32}"/>
+              </a:ext>
+            </a:extLst>
+          </p:cNvPr>
+          <p:cNvPicPr>
+            <a:picLocks noGrp="1" noChangeAspect="1"/>
+          </p:cNvPicPr>
+          <p:nvPr>
+            <p:ph sz="quarter" idx="16"/>
+          </p:nvPr>
+        </p:nvPicPr>
+        <p:blipFill rotWithShape="1">
+          <a:blip r:embed="rId2">
+            <a:extLst>
+              <a:ext uri="{28A0092B-C50C-407E-A947-70E740481C1C}">
+                <a14:useLocalDpi xmlns:a14="http://schemas.microsoft.com/office/drawing/2010/main" val="0"/>
+              </a:ext>
+            </a:extLst>
+          </a:blip>
+          <a:srcRect r="36798" b="-1"/>
+          <a:stretch/>
+        </p:blipFill>
+        <p:spPr>
+          <a:xfrm>
+            <a:off x="6385193" y="1561175"/>
+            <a:ext cx="5387630" cy="4795019"/>
+          </a:xfrm>
+          <a:prstGeom prst="rect">
+            <a:avLst/>
+          </a:prstGeom>
+          <a:noFill/>
+        </p:spPr>
+      </p:pic>
+    </p:spTree>
+    <p:extLst>
+      <p:ext uri="{BB962C8B-B14F-4D97-AF65-F5344CB8AC3E}">
+        <p14:creationId xmlns:p14="http://schemas.microsoft.com/office/powerpoint/2010/main" val="1459359035"/>
+      </p:ext>
+    </p:extLst>
+  </p:cSld>
+  <p:clrMapOvr>
+    <a:masterClrMapping/>
+  </p:clrMapOvr>
+</p:sld>
+</file>
+
+<file path=ppt/slides/slide5.xml><?xml version="1.0" encoding="utf-8"?>
 <p:sld xmlns:a="http://schemas.openxmlformats.org/drawingml/2006/main" xmlns:r="http://schemas.openxmlformats.org/officeDocument/2006/relationships" xmlns:p="http://schemas.openxmlformats.org/presentationml/2006/main">
   <p:cSld>
     <p:spTree>
@@ -13896,7 +14845,7 @@
 </p:sld>
 </file>
 
-<file path=ppt/slides/slide5.xml><?xml version="1.0" encoding="utf-8"?>
+<file path=ppt/slides/slide6.xml><?xml version="1.0" encoding="utf-8"?>
 <p:sld xmlns:a="http://schemas.openxmlformats.org/drawingml/2006/main" xmlns:r="http://schemas.openxmlformats.org/officeDocument/2006/relationships" xmlns:p="http://schemas.openxmlformats.org/presentationml/2006/main">
   <p:cSld>
     <p:spTree>
@@ -14053,7 +15002,7 @@
 </p:sld>
 </file>
 
-<file path=ppt/slides/slide6.xml><?xml version="1.0" encoding="utf-8"?>
+<file path=ppt/slides/slide7.xml><?xml version="1.0" encoding="utf-8"?>
 <p:sld xmlns:a="http://schemas.openxmlformats.org/drawingml/2006/main" xmlns:r="http://schemas.openxmlformats.org/officeDocument/2006/relationships" xmlns:p="http://schemas.openxmlformats.org/presentationml/2006/main">
   <p:cSld>
     <p:spTree>
@@ -14356,7 +15305,7 @@
 </p:sld>
 </file>
 
-<file path=ppt/slides/slide7.xml><?xml version="1.0" encoding="utf-8"?>
+<file path=ppt/slides/slide8.xml><?xml version="1.0" encoding="utf-8"?>
 <p:sld xmlns:a="http://schemas.openxmlformats.org/drawingml/2006/main" xmlns:r="http://schemas.openxmlformats.org/officeDocument/2006/relationships" xmlns:p="http://schemas.openxmlformats.org/presentationml/2006/main">
   <p:cSld>
     <p:spTree>
@@ -14789,7 +15738,7 @@
 </p:sld>
 </file>
 
-<file path=ppt/slides/slide8.xml><?xml version="1.0" encoding="utf-8"?>
+<file path=ppt/slides/slide9.xml><?xml version="1.0" encoding="utf-8"?>
 <p:sld xmlns:a="http://schemas.openxmlformats.org/drawingml/2006/main" xmlns:r="http://schemas.openxmlformats.org/officeDocument/2006/relationships" xmlns:p="http://schemas.openxmlformats.org/presentationml/2006/main">
   <p:cSld>
     <p:spTree>
@@ -15131,639 +16080,6 @@
     </p:tnLst>
     <p:bldLst>
       <p:bldP spid="28" grpId="0" animBg="1"/>
-    </p:bldLst>
-  </p:timing>
-</p:sld>
-</file>
-
-<file path=ppt/slides/slide9.xml><?xml version="1.0" encoding="utf-8"?>
-<p:sld xmlns:a="http://schemas.openxmlformats.org/drawingml/2006/main" xmlns:r="http://schemas.openxmlformats.org/officeDocument/2006/relationships" xmlns:p="http://schemas.openxmlformats.org/presentationml/2006/main">
-  <p:cSld>
-    <p:spTree>
-      <p:nvGrpSpPr>
-        <p:cNvPr id="1" name=""/>
-        <p:cNvGrpSpPr/>
-        <p:nvPr/>
-      </p:nvGrpSpPr>
-      <p:grpSpPr>
-        <a:xfrm>
-          <a:off x="0" y="0"/>
-          <a:ext cx="0" cy="0"/>
-          <a:chOff x="0" y="0"/>
-          <a:chExt cx="0" cy="0"/>
-        </a:xfrm>
-      </p:grpSpPr>
-      <p:pic>
-        <p:nvPicPr>
-          <p:cNvPr id="3" name="Picture 2">
-            <a:extLst>
-              <a:ext uri="{FF2B5EF4-FFF2-40B4-BE49-F238E27FC236}">
-                <a16:creationId xmlns:a16="http://schemas.microsoft.com/office/drawing/2014/main" id="{492953FD-C4A6-945C-CFBE-23CE8BD23EC6}"/>
-              </a:ext>
-            </a:extLst>
-          </p:cNvPr>
-          <p:cNvPicPr>
-            <a:picLocks noChangeAspect="1"/>
-          </p:cNvPicPr>
-          <p:nvPr/>
-        </p:nvPicPr>
-        <p:blipFill>
-          <a:blip r:embed="rId2"/>
-          <a:stretch>
-            <a:fillRect/>
-          </a:stretch>
-        </p:blipFill>
-        <p:spPr>
-          <a:xfrm>
-            <a:off x="3185549" y="1926106"/>
-            <a:ext cx="3035477" cy="4010375"/>
-          </a:xfrm>
-          <a:prstGeom prst="rect">
-            <a:avLst/>
-          </a:prstGeom>
-        </p:spPr>
-      </p:pic>
-      <p:sp>
-        <p:nvSpPr>
-          <p:cNvPr id="2" name="Title 1">
-            <a:extLst>
-              <a:ext uri="{FF2B5EF4-FFF2-40B4-BE49-F238E27FC236}">
-                <a16:creationId xmlns:a16="http://schemas.microsoft.com/office/drawing/2014/main" id="{DDFA33AF-EF16-A9A1-1FDA-0BA58D176E2A}"/>
-              </a:ext>
-            </a:extLst>
-          </p:cNvPr>
-          <p:cNvSpPr>
-            <a:spLocks noGrp="1"/>
-          </p:cNvSpPr>
-          <p:nvPr>
-            <p:ph type="title"/>
-          </p:nvPr>
-        </p:nvSpPr>
-        <p:spPr/>
-        <p:txBody>
-          <a:bodyPr/>
-          <a:lstStyle/>
-          <a:p>
-            <a:r>
-              <a:rPr lang="de-DE" dirty="0"/>
-              <a:t>Generate Makefiles</a:t>
-            </a:r>
-          </a:p>
-        </p:txBody>
-      </p:sp>
-      <p:pic>
-        <p:nvPicPr>
-          <p:cNvPr id="5" name="Picture 4">
-            <a:extLst>
-              <a:ext uri="{FF2B5EF4-FFF2-40B4-BE49-F238E27FC236}">
-                <a16:creationId xmlns:a16="http://schemas.microsoft.com/office/drawing/2014/main" id="{0B513042-A54B-3A27-E0C4-D3E93BE6ABB4}"/>
-              </a:ext>
-            </a:extLst>
-          </p:cNvPr>
-          <p:cNvPicPr>
-            <a:picLocks noChangeAspect="1"/>
-          </p:cNvPicPr>
-          <p:nvPr/>
-        </p:nvPicPr>
-        <p:blipFill>
-          <a:blip r:embed="rId3"/>
-          <a:stretch>
-            <a:fillRect/>
-          </a:stretch>
-        </p:blipFill>
-        <p:spPr>
-          <a:xfrm>
-            <a:off x="764437" y="2623055"/>
-            <a:ext cx="1896230" cy="2079736"/>
-          </a:xfrm>
-          <a:prstGeom prst="rect">
-            <a:avLst/>
-          </a:prstGeom>
-        </p:spPr>
-      </p:pic>
-      <p:sp>
-        <p:nvSpPr>
-          <p:cNvPr id="9" name="Rectangle 8">
-            <a:extLst>
-              <a:ext uri="{FF2B5EF4-FFF2-40B4-BE49-F238E27FC236}">
-                <a16:creationId xmlns:a16="http://schemas.microsoft.com/office/drawing/2014/main" id="{99D2AAEB-550E-CD78-4D50-EB22BB93B423}"/>
-              </a:ext>
-            </a:extLst>
-          </p:cNvPr>
-          <p:cNvSpPr/>
-          <p:nvPr/>
-        </p:nvSpPr>
-        <p:spPr>
-          <a:xfrm>
-            <a:off x="3067736" y="3047600"/>
-            <a:ext cx="3271101" cy="312663"/>
-          </a:xfrm>
-          <a:prstGeom prst="rect">
-            <a:avLst/>
-          </a:prstGeom>
-          <a:noFill/>
-          <a:ln/>
-        </p:spPr>
-        <p:style>
-          <a:lnRef idx="2">
-            <a:schemeClr val="accent2"/>
-          </a:lnRef>
-          <a:fillRef idx="1">
-            <a:schemeClr val="lt1"/>
-          </a:fillRef>
-          <a:effectRef idx="0">
-            <a:schemeClr val="accent2"/>
-          </a:effectRef>
-          <a:fontRef idx="minor">
-            <a:schemeClr val="dk1"/>
-          </a:fontRef>
-        </p:style>
-        <p:txBody>
-          <a:bodyPr rot="0" spcFirstLastPara="0" vertOverflow="overflow" horzOverflow="overflow" vert="horz" wrap="square" lIns="91440" tIns="45720" rIns="91440" bIns="45720" numCol="1" spcCol="0" rtlCol="0" fromWordArt="0" anchor="ctr" anchorCtr="0" forceAA="0" compatLnSpc="1">
-            <a:prstTxWarp prst="textNoShape">
-              <a:avLst/>
-            </a:prstTxWarp>
-            <a:noAutofit/>
-          </a:bodyPr>
-          <a:lstStyle/>
-          <a:p>
-            <a:pPr algn="ctr"/>
-            <a:endParaRPr lang="de-DE"/>
-          </a:p>
-        </p:txBody>
-      </p:sp>
-      <p:sp>
-        <p:nvSpPr>
-          <p:cNvPr id="17" name="TextBox 16">
-            <a:extLst>
-              <a:ext uri="{FF2B5EF4-FFF2-40B4-BE49-F238E27FC236}">
-                <a16:creationId xmlns:a16="http://schemas.microsoft.com/office/drawing/2014/main" id="{B535091C-88EB-9173-F05B-9F0627A2F16B}"/>
-              </a:ext>
-            </a:extLst>
-          </p:cNvPr>
-          <p:cNvSpPr txBox="1"/>
-          <p:nvPr/>
-        </p:nvSpPr>
-        <p:spPr>
-          <a:xfrm>
-            <a:off x="6745907" y="348792"/>
-            <a:ext cx="4406002" cy="3046988"/>
-          </a:xfrm>
-          <a:prstGeom prst="rect">
-            <a:avLst/>
-          </a:prstGeom>
-          <a:noFill/>
-        </p:spPr>
-        <p:txBody>
-          <a:bodyPr wrap="square" rtlCol="0">
-            <a:spAutoFit/>
-          </a:bodyPr>
-          <a:lstStyle/>
-          <a:p>
-            <a:r>
-              <a:rPr lang="de-DE" dirty="0"/>
-              <a:t>The script setup.bat calls the „prjMakefilesGenerator.bat“</a:t>
-            </a:r>
-          </a:p>
-          <a:p>
-            <a:endParaRPr lang="de-DE" dirty="0"/>
-          </a:p>
-          <a:p>
-            <a:r>
-              <a:rPr lang="de-DE" dirty="0"/>
-              <a:t>i.e. It creates all Makefiles. This is normally done by MPLABX when the project is opened. And allows to build the projects without using MPLABX</a:t>
-            </a:r>
-          </a:p>
-        </p:txBody>
-      </p:sp>
-      <p:pic>
-        <p:nvPicPr>
-          <p:cNvPr id="6" name="Picture 5">
-            <a:extLst>
-              <a:ext uri="{FF2B5EF4-FFF2-40B4-BE49-F238E27FC236}">
-                <a16:creationId xmlns:a16="http://schemas.microsoft.com/office/drawing/2014/main" id="{7BA6A497-C67D-DFCD-5F92-FEAED324A85C}"/>
-              </a:ext>
-            </a:extLst>
-          </p:cNvPr>
-          <p:cNvPicPr>
-            <a:picLocks noChangeAspect="1"/>
-          </p:cNvPicPr>
-          <p:nvPr/>
-        </p:nvPicPr>
-        <p:blipFill>
-          <a:blip r:embed="rId4"/>
-          <a:stretch>
-            <a:fillRect/>
-          </a:stretch>
-        </p:blipFill>
-        <p:spPr>
-          <a:xfrm>
-            <a:off x="6637416" y="3725599"/>
-            <a:ext cx="5118754" cy="2210882"/>
-          </a:xfrm>
-          <a:prstGeom prst="rect">
-            <a:avLst/>
-          </a:prstGeom>
-        </p:spPr>
-      </p:pic>
-      <p:sp>
-        <p:nvSpPr>
-          <p:cNvPr id="4" name="Rectangle 3">
-            <a:extLst>
-              <a:ext uri="{FF2B5EF4-FFF2-40B4-BE49-F238E27FC236}">
-                <a16:creationId xmlns:a16="http://schemas.microsoft.com/office/drawing/2014/main" id="{477CD761-2EF6-BE89-0D97-ABB4A7A770FB}"/>
-              </a:ext>
-            </a:extLst>
-          </p:cNvPr>
-          <p:cNvSpPr/>
-          <p:nvPr/>
-        </p:nvSpPr>
-        <p:spPr>
-          <a:xfrm>
-            <a:off x="9320785" y="5596128"/>
-            <a:ext cx="2377440" cy="166085"/>
-          </a:xfrm>
-          <a:prstGeom prst="rect">
-            <a:avLst/>
-          </a:prstGeom>
-          <a:noFill/>
-          <a:ln/>
-        </p:spPr>
-        <p:style>
-          <a:lnRef idx="2">
-            <a:schemeClr val="accent2"/>
-          </a:lnRef>
-          <a:fillRef idx="1">
-            <a:schemeClr val="lt1"/>
-          </a:fillRef>
-          <a:effectRef idx="0">
-            <a:schemeClr val="accent2"/>
-          </a:effectRef>
-          <a:fontRef idx="minor">
-            <a:schemeClr val="dk1"/>
-          </a:fontRef>
-        </p:style>
-        <p:txBody>
-          <a:bodyPr rot="0" spcFirstLastPara="0" vertOverflow="overflow" horzOverflow="overflow" vert="horz" wrap="square" lIns="91440" tIns="45720" rIns="91440" bIns="45720" numCol="1" spcCol="0" rtlCol="0" fromWordArt="0" anchor="ctr" anchorCtr="0" forceAA="0" compatLnSpc="1">
-            <a:prstTxWarp prst="textNoShape">
-              <a:avLst/>
-            </a:prstTxWarp>
-            <a:noAutofit/>
-          </a:bodyPr>
-          <a:lstStyle/>
-          <a:p>
-            <a:pPr algn="ctr"/>
-            <a:endParaRPr lang="de-DE"/>
-          </a:p>
-        </p:txBody>
-      </p:sp>
-      <p:sp>
-        <p:nvSpPr>
-          <p:cNvPr id="7" name="Rectangle 6">
-            <a:extLst>
-              <a:ext uri="{FF2B5EF4-FFF2-40B4-BE49-F238E27FC236}">
-                <a16:creationId xmlns:a16="http://schemas.microsoft.com/office/drawing/2014/main" id="{74B8477E-E393-F6B3-BD90-4D0B87149C77}"/>
-              </a:ext>
-            </a:extLst>
-          </p:cNvPr>
-          <p:cNvSpPr/>
-          <p:nvPr/>
-        </p:nvSpPr>
-        <p:spPr>
-          <a:xfrm>
-            <a:off x="9320785" y="3864865"/>
-            <a:ext cx="2377440" cy="1609344"/>
-          </a:xfrm>
-          <a:prstGeom prst="rect">
-            <a:avLst/>
-          </a:prstGeom>
-          <a:noFill/>
-          <a:ln/>
-        </p:spPr>
-        <p:style>
-          <a:lnRef idx="2">
-            <a:schemeClr val="accent2"/>
-          </a:lnRef>
-          <a:fillRef idx="1">
-            <a:schemeClr val="lt1"/>
-          </a:fillRef>
-          <a:effectRef idx="0">
-            <a:schemeClr val="accent2"/>
-          </a:effectRef>
-          <a:fontRef idx="minor">
-            <a:schemeClr val="dk1"/>
-          </a:fontRef>
-        </p:style>
-        <p:txBody>
-          <a:bodyPr rot="0" spcFirstLastPara="0" vertOverflow="overflow" horzOverflow="overflow" vert="horz" wrap="square" lIns="91440" tIns="45720" rIns="91440" bIns="45720" numCol="1" spcCol="0" rtlCol="0" fromWordArt="0" anchor="ctr" anchorCtr="0" forceAA="0" compatLnSpc="1">
-            <a:prstTxWarp prst="textNoShape">
-              <a:avLst/>
-            </a:prstTxWarp>
-            <a:noAutofit/>
-          </a:bodyPr>
-          <a:lstStyle/>
-          <a:p>
-            <a:pPr algn="ctr"/>
-            <a:endParaRPr lang="de-DE"/>
-          </a:p>
-        </p:txBody>
-      </p:sp>
-      <p:sp>
-        <p:nvSpPr>
-          <p:cNvPr id="11" name="Rectangle 10">
-            <a:extLst>
-              <a:ext uri="{FF2B5EF4-FFF2-40B4-BE49-F238E27FC236}">
-                <a16:creationId xmlns:a16="http://schemas.microsoft.com/office/drawing/2014/main" id="{4E43293E-0F77-4962-9BD7-E1A054466267}"/>
-              </a:ext>
-            </a:extLst>
-          </p:cNvPr>
-          <p:cNvSpPr/>
-          <p:nvPr/>
-        </p:nvSpPr>
-        <p:spPr>
-          <a:xfrm>
-            <a:off x="355509" y="1797031"/>
-            <a:ext cx="11603770" cy="2905760"/>
-          </a:xfrm>
-          <a:prstGeom prst="rect">
-            <a:avLst/>
-          </a:prstGeom>
-          <a:ln/>
-        </p:spPr>
-        <p:style>
-          <a:lnRef idx="2">
-            <a:schemeClr val="accent2"/>
-          </a:lnRef>
-          <a:fillRef idx="1">
-            <a:schemeClr val="lt1"/>
-          </a:fillRef>
-          <a:effectRef idx="0">
-            <a:schemeClr val="accent2"/>
-          </a:effectRef>
-          <a:fontRef idx="minor">
-            <a:schemeClr val="dk1"/>
-          </a:fontRef>
-        </p:style>
-        <p:txBody>
-          <a:bodyPr rot="0" spcFirstLastPara="0" vertOverflow="overflow" horzOverflow="overflow" vert="horz" wrap="square" lIns="91440" tIns="45720" rIns="91440" bIns="45720" numCol="1" spcCol="0" rtlCol="0" fromWordArt="0" anchor="t" anchorCtr="0" forceAA="0" compatLnSpc="1">
-            <a:prstTxWarp prst="textNoShape">
-              <a:avLst/>
-            </a:prstTxWarp>
-            <a:noAutofit/>
-          </a:bodyPr>
-          <a:lstStyle/>
-          <a:p>
-            <a:endParaRPr lang="de-DE" dirty="0"/>
-          </a:p>
-          <a:p>
-            <a:r>
-              <a:rPr lang="de-DE" dirty="0"/>
-              <a:t>If another MPLABX Version should be used than v6.15, this must be changed in the script</a:t>
-            </a:r>
-          </a:p>
-          <a:p>
-            <a:endParaRPr lang="de-DE" dirty="0"/>
-          </a:p>
-          <a:p>
-            <a:endParaRPr lang="de-DE" dirty="0"/>
-          </a:p>
-        </p:txBody>
-      </p:sp>
-      <p:pic>
-        <p:nvPicPr>
-          <p:cNvPr id="13" name="Picture 12">
-            <a:extLst>
-              <a:ext uri="{FF2B5EF4-FFF2-40B4-BE49-F238E27FC236}">
-                <a16:creationId xmlns:a16="http://schemas.microsoft.com/office/drawing/2014/main" id="{FB2E71D1-7C70-A297-8AA3-0D50045852DB}"/>
-              </a:ext>
-            </a:extLst>
-          </p:cNvPr>
-          <p:cNvPicPr>
-            <a:picLocks noChangeAspect="1"/>
-          </p:cNvPicPr>
-          <p:nvPr/>
-        </p:nvPicPr>
-        <p:blipFill>
-          <a:blip r:embed="rId5"/>
-          <a:stretch>
-            <a:fillRect/>
-          </a:stretch>
-        </p:blipFill>
-        <p:spPr>
-          <a:xfrm>
-            <a:off x="653261" y="2785054"/>
-            <a:ext cx="10882303" cy="1287892"/>
-          </a:xfrm>
-          <a:prstGeom prst="rect">
-            <a:avLst/>
-          </a:prstGeom>
-        </p:spPr>
-      </p:pic>
-    </p:spTree>
-    <p:extLst>
-      <p:ext uri="{BB962C8B-B14F-4D97-AF65-F5344CB8AC3E}">
-        <p14:creationId xmlns:p14="http://schemas.microsoft.com/office/powerpoint/2010/main" val="2483439385"/>
-      </p:ext>
-    </p:extLst>
-  </p:cSld>
-  <p:clrMapOvr>
-    <a:masterClrMapping/>
-  </p:clrMapOvr>
-  <p:timing>
-    <p:tnLst>
-      <p:par>
-        <p:cTn id="1" dur="indefinite" restart="never" nodeType="tmRoot">
-          <p:childTnLst>
-            <p:seq concurrent="1" nextAc="seek">
-              <p:cTn id="2" dur="indefinite" nodeType="mainSeq">
-                <p:childTnLst>
-                  <p:par>
-                    <p:cTn id="3" fill="hold">
-                      <p:stCondLst>
-                        <p:cond delay="indefinite"/>
-                      </p:stCondLst>
-                      <p:childTnLst>
-                        <p:par>
-                          <p:cTn id="4" fill="hold">
-                            <p:stCondLst>
-                              <p:cond delay="0"/>
-                            </p:stCondLst>
-                            <p:childTnLst>
-                              <p:par>
-                                <p:cTn id="5" presetID="1" presetClass="entr" presetSubtype="0" fill="hold" grpId="0" nodeType="clickEffect">
-                                  <p:stCondLst>
-                                    <p:cond delay="0"/>
-                                  </p:stCondLst>
-                                  <p:childTnLst>
-                                    <p:set>
-                                      <p:cBhvr>
-                                        <p:cTn id="6" dur="1" fill="hold">
-                                          <p:stCondLst>
-                                            <p:cond delay="0"/>
-                                          </p:stCondLst>
-                                        </p:cTn>
-                                        <p:tgtEl>
-                                          <p:spTgt spid="4"/>
-                                        </p:tgtEl>
-                                        <p:attrNameLst>
-                                          <p:attrName>style.visibility</p:attrName>
-                                        </p:attrNameLst>
-                                      </p:cBhvr>
-                                      <p:to>
-                                        <p:strVal val="visible"/>
-                                      </p:to>
-                                    </p:set>
-                                  </p:childTnLst>
-                                </p:cTn>
-                              </p:par>
-                            </p:childTnLst>
-                          </p:cTn>
-                        </p:par>
-                      </p:childTnLst>
-                    </p:cTn>
-                  </p:par>
-                  <p:par>
-                    <p:cTn id="7" fill="hold">
-                      <p:stCondLst>
-                        <p:cond delay="indefinite"/>
-                      </p:stCondLst>
-                      <p:childTnLst>
-                        <p:par>
-                          <p:cTn id="8" fill="hold">
-                            <p:stCondLst>
-                              <p:cond delay="0"/>
-                            </p:stCondLst>
-                            <p:childTnLst>
-                              <p:par>
-                                <p:cTn id="9" presetID="1" presetClass="entr" presetSubtype="0" fill="hold" grpId="0" nodeType="clickEffect">
-                                  <p:stCondLst>
-                                    <p:cond delay="0"/>
-                                  </p:stCondLst>
-                                  <p:childTnLst>
-                                    <p:set>
-                                      <p:cBhvr>
-                                        <p:cTn id="10" dur="1" fill="hold">
-                                          <p:stCondLst>
-                                            <p:cond delay="0"/>
-                                          </p:stCondLst>
-                                        </p:cTn>
-                                        <p:tgtEl>
-                                          <p:spTgt spid="7"/>
-                                        </p:tgtEl>
-                                        <p:attrNameLst>
-                                          <p:attrName>style.visibility</p:attrName>
-                                        </p:attrNameLst>
-                                      </p:cBhvr>
-                                      <p:to>
-                                        <p:strVal val="visible"/>
-                                      </p:to>
-                                    </p:set>
-                                  </p:childTnLst>
-                                </p:cTn>
-                              </p:par>
-                            </p:childTnLst>
-                          </p:cTn>
-                        </p:par>
-                      </p:childTnLst>
-                    </p:cTn>
-                  </p:par>
-                  <p:par>
-                    <p:cTn id="11" fill="hold">
-                      <p:stCondLst>
-                        <p:cond delay="indefinite"/>
-                      </p:stCondLst>
-                      <p:childTnLst>
-                        <p:par>
-                          <p:cTn id="12" fill="hold">
-                            <p:stCondLst>
-                              <p:cond delay="0"/>
-                            </p:stCondLst>
-                            <p:childTnLst>
-                              <p:par>
-                                <p:cTn id="13" presetID="1" presetClass="entr" presetSubtype="0" fill="hold" grpId="0" nodeType="clickEffect">
-                                  <p:stCondLst>
-                                    <p:cond delay="0"/>
-                                  </p:stCondLst>
-                                  <p:childTnLst>
-                                    <p:set>
-                                      <p:cBhvr>
-                                        <p:cTn id="14" dur="1" fill="hold">
-                                          <p:stCondLst>
-                                            <p:cond delay="0"/>
-                                          </p:stCondLst>
-                                        </p:cTn>
-                                        <p:tgtEl>
-                                          <p:spTgt spid="11"/>
-                                        </p:tgtEl>
-                                        <p:attrNameLst>
-                                          <p:attrName>style.visibility</p:attrName>
-                                        </p:attrNameLst>
-                                      </p:cBhvr>
-                                      <p:to>
-                                        <p:strVal val="visible"/>
-                                      </p:to>
-                                    </p:set>
-                                  </p:childTnLst>
-                                </p:cTn>
-                              </p:par>
-                              <p:par>
-                                <p:cTn id="15" presetID="1" presetClass="entr" presetSubtype="0" fill="hold" nodeType="withEffect">
-                                  <p:stCondLst>
-                                    <p:cond delay="0"/>
-                                  </p:stCondLst>
-                                  <p:childTnLst>
-                                    <p:set>
-                                      <p:cBhvr>
-                                        <p:cTn id="16" dur="1" fill="hold">
-                                          <p:stCondLst>
-                                            <p:cond delay="0"/>
-                                          </p:stCondLst>
-                                        </p:cTn>
-                                        <p:tgtEl>
-                                          <p:spTgt spid="13"/>
-                                        </p:tgtEl>
-                                        <p:attrNameLst>
-                                          <p:attrName>style.visibility</p:attrName>
-                                        </p:attrNameLst>
-                                      </p:cBhvr>
-                                      <p:to>
-                                        <p:strVal val="visible"/>
-                                      </p:to>
-                                    </p:set>
-                                  </p:childTnLst>
-                                </p:cTn>
-                              </p:par>
-                            </p:childTnLst>
-                          </p:cTn>
-                        </p:par>
-                      </p:childTnLst>
-                    </p:cTn>
-                  </p:par>
-                </p:childTnLst>
-              </p:cTn>
-              <p:prevCondLst>
-                <p:cond evt="onPrev" delay="0">
-                  <p:tgtEl>
-                    <p:sldTgt/>
-                  </p:tgtEl>
-                </p:cond>
-              </p:prevCondLst>
-              <p:nextCondLst>
-                <p:cond evt="onNext" delay="0">
-                  <p:tgtEl>
-                    <p:sldTgt/>
-                  </p:tgtEl>
-                </p:cond>
-              </p:nextCondLst>
-            </p:seq>
-          </p:childTnLst>
-        </p:cTn>
-      </p:par>
-    </p:tnLst>
-    <p:bldLst>
-      <p:bldP spid="4" grpId="0" animBg="1"/>
-      <p:bldP spid="7" grpId="0" animBg="1"/>
-      <p:bldP spid="11" grpId="0" animBg="1"/>
     </p:bldLst>
   </p:timing>
 </p:sld>
@@ -16703,15 +17019,6 @@
 
 <file path=customXml/item1.xml><?xml version="1.0" encoding="utf-8"?>
 <?mso-contentType ?>
-<FormTemplates xmlns="http://schemas.microsoft.com/sharepoint/v3/contenttype/forms">
-  <Display>DocumentLibraryForm</Display>
-  <Edit>DocumentLibraryForm</Edit>
-  <New>DocumentLibraryForm</New>
-</FormTemplates>
-</file>
-
-<file path=customXml/item2.xml><?xml version="1.0" encoding="utf-8"?>
-<?mso-contentType ?>
 <spe:Receivers xmlns:spe="http://schemas.microsoft.com/sharepoint/events">
   <Receiver>
     <Name>Document ID Generator</Name>
@@ -16756,7 +17063,29 @@
 </spe:Receivers>
 </file>
 
+<file path=customXml/item2.xml><?xml version="1.0" encoding="utf-8"?>
+<?mso-contentType ?>
+<FormTemplates xmlns="http://schemas.microsoft.com/sharepoint/v3/contenttype/forms">
+  <Display>DocumentLibraryForm</Display>
+  <Edit>DocumentLibraryForm</Edit>
+  <New>DocumentLibraryForm</New>
+</FormTemplates>
+</file>
+
 <file path=customXml/item3.xml><?xml version="1.0" encoding="utf-8"?>
+<p:properties xmlns:p="http://schemas.microsoft.com/office/2006/metadata/properties" xmlns:xsi="http://www.w3.org/2001/XMLSchema-instance" xmlns:pc="http://schemas.microsoft.com/office/infopath/2007/PartnerControls">
+  <documentManagement>
+    <Content_x0020_Archived xmlns="df7acb31-37ac-40e2-81bb-c44e3630f613">false</Content_x0020_Archived>
+    <_dlc_DocId xmlns="38ef598d-997c-498b-b737-2f6b2c50ccab">SV5CHKDEWJXD-84-133</_dlc_DocId>
+    <_dlc_DocIdUrl xmlns="38ef598d-997c-498b-b737-2f6b2c50ccab">
+      <Url>http://mchpweb-2010/marcom/home/Resources/_layouts/DocIdRedir.aspx?ID=SV5CHKDEWJXD-84-133</Url>
+      <Description>SV5CHKDEWJXD-84-133</Description>
+    </_dlc_DocIdUrl>
+  </documentManagement>
+</p:properties>
+</file>
+
+<file path=customXml/item4.xml><?xml version="1.0" encoding="utf-8"?>
 <ct:contentTypeSchema xmlns:ct="http://schemas.microsoft.com/office/2006/metadata/contentType" xmlns:ma="http://schemas.microsoft.com/office/2006/metadata/properties/metaAttributes" ct:_="" ma:_="" ma:contentTypeName="Document" ma:contentTypeID="0x01010006EF9829FE6FB94D84D3D1D5B1820991" ma:contentTypeVersion="2" ma:contentTypeDescription="Create a new document." ma:contentTypeScope="" ma:versionID="84d427fd2fb92a215479da5b0fe5e4ad">
   <xsd:schema xmlns:xsd="http://www.w3.org/2001/XMLSchema" xmlns:xs="http://www.w3.org/2001/XMLSchema" xmlns:p="http://schemas.microsoft.com/office/2006/metadata/properties" xmlns:ns2="38ef598d-997c-498b-b737-2f6b2c50ccab" xmlns:ns3="df7acb31-37ac-40e2-81bb-c44e3630f613" targetNamespace="http://schemas.microsoft.com/office/2006/metadata/properties" ma:root="true" ma:fieldsID="156788901a84a305ff90b9b24ba2d9fb" ns2:_="" ns3:_="">
     <xsd:import namespace="38ef598d-997c-498b-b737-2f6b2c50ccab"/>
@@ -16912,20 +17241,15 @@
 </ct:contentTypeSchema>
 </file>
 
-<file path=customXml/item4.xml><?xml version="1.0" encoding="utf-8"?>
-<p:properties xmlns:p="http://schemas.microsoft.com/office/2006/metadata/properties" xmlns:xsi="http://www.w3.org/2001/XMLSchema-instance" xmlns:pc="http://schemas.microsoft.com/office/infopath/2007/PartnerControls">
-  <documentManagement>
-    <Content_x0020_Archived xmlns="df7acb31-37ac-40e2-81bb-c44e3630f613">false</Content_x0020_Archived>
-    <_dlc_DocId xmlns="38ef598d-997c-498b-b737-2f6b2c50ccab">SV5CHKDEWJXD-84-133</_dlc_DocId>
-    <_dlc_DocIdUrl xmlns="38ef598d-997c-498b-b737-2f6b2c50ccab">
-      <Url>http://mchpweb-2010/marcom/home/Resources/_layouts/DocIdRedir.aspx?ID=SV5CHKDEWJXD-84-133</Url>
-      <Description>SV5CHKDEWJXD-84-133</Description>
-    </_dlc_DocIdUrl>
-  </documentManagement>
-</p:properties>
+<file path=customXml/itemProps1.xml><?xml version="1.0" encoding="utf-8"?>
+<ds:datastoreItem xmlns:ds="http://schemas.openxmlformats.org/officeDocument/2006/customXml" ds:itemID="{36ECED7C-7E24-4B80-B6AD-5BF0A508FB7B}">
+  <ds:schemaRefs>
+    <ds:schemaRef ds:uri="http://schemas.microsoft.com/sharepoint/events"/>
+  </ds:schemaRefs>
+</ds:datastoreItem>
 </file>
 
-<file path=customXml/itemProps1.xml><?xml version="1.0" encoding="utf-8"?>
+<file path=customXml/itemProps2.xml><?xml version="1.0" encoding="utf-8"?>
 <ds:datastoreItem xmlns:ds="http://schemas.openxmlformats.org/officeDocument/2006/customXml" ds:itemID="{0CE24DD7-9317-4AD8-82D4-5A6998DA79C7}">
   <ds:schemaRefs>
     <ds:schemaRef ds:uri="http://schemas.microsoft.com/sharepoint/v3/contenttype/forms"/>
@@ -16933,15 +17257,18 @@
 </ds:datastoreItem>
 </file>
 
-<file path=customXml/itemProps2.xml><?xml version="1.0" encoding="utf-8"?>
-<ds:datastoreItem xmlns:ds="http://schemas.openxmlformats.org/officeDocument/2006/customXml" ds:itemID="{36ECED7C-7E24-4B80-B6AD-5BF0A508FB7B}">
+<file path=customXml/itemProps3.xml><?xml version="1.0" encoding="utf-8"?>
+<ds:datastoreItem xmlns:ds="http://schemas.openxmlformats.org/officeDocument/2006/customXml" ds:itemID="{15774815-801A-4D0C-AAC8-304A8EA5EAE0}">
   <ds:schemaRefs>
-    <ds:schemaRef ds:uri="http://schemas.microsoft.com/sharepoint/events"/>
+    <ds:schemaRef ds:uri="38ef598d-997c-498b-b737-2f6b2c50ccab"/>
+    <ds:schemaRef ds:uri="df7acb31-37ac-40e2-81bb-c44e3630f613"/>
+    <ds:schemaRef ds:uri="http://schemas.microsoft.com/office/2006/metadata/properties"/>
+    <ds:schemaRef ds:uri="http://schemas.microsoft.com/office/infopath/2007/PartnerControls"/>
   </ds:schemaRefs>
 </ds:datastoreItem>
 </file>
 
-<file path=customXml/itemProps3.xml><?xml version="1.0" encoding="utf-8"?>
+<file path=customXml/itemProps4.xml><?xml version="1.0" encoding="utf-8"?>
 <ds:datastoreItem xmlns:ds="http://schemas.openxmlformats.org/officeDocument/2006/customXml" ds:itemID="{AF9647E8-EA5A-4469-8198-396AF1DA17E0}">
   <ds:schemaRefs>
     <ds:schemaRef ds:uri="38ef598d-997c-498b-b737-2f6b2c50ccab"/>
@@ -16958,15 +17285,4 @@
     <ds:schemaRef ds:uri="http://www.w3.org/2001/XMLSchema"/>
   </ds:schemaRefs>
 </ds:datastoreItem>
-</file>
-
-<file path=customXml/itemProps4.xml><?xml version="1.0" encoding="utf-8"?>
-<ds:datastoreItem xmlns:ds="http://schemas.openxmlformats.org/officeDocument/2006/customXml" ds:itemID="{15774815-801A-4D0C-AAC8-304A8EA5EAE0}">
-  <ds:schemaRefs>
-    <ds:schemaRef ds:uri="38ef598d-997c-498b-b737-2f6b2c50ccab"/>
-    <ds:schemaRef ds:uri="df7acb31-37ac-40e2-81bb-c44e3630f613"/>
-    <ds:schemaRef ds:uri="http://schemas.microsoft.com/office/2006/metadata/properties"/>
-    <ds:schemaRef ds:uri="http://schemas.microsoft.com/office/infopath/2007/PartnerControls"/>
-  </ds:schemaRefs>
-</ds:datastoreItem>
 </file>
</xml_diff>